<commit_message>
correct color of font for some code sections
</commit_message>
<xml_diff>
--- a/scheduling_jobs/scheduling_jobs.pptx
+++ b/scheduling_jobs/scheduling_jobs.pptx
@@ -239,7 +239,7 @@
           <a:p>
             <a:fld id="{EFDA08D6-E137-3341-A5EE-84219A24203E}" type="datetimeFigureOut">
               <a:rPr lang="en-US" smtClean="0"/>
-              <a:t>8/9/24</a:t>
+              <a:t>8/12/24</a:t>
             </a:fld>
             <a:endParaRPr lang="en-US"/>
           </a:p>
@@ -8693,7 +8693,11 @@
               </a:rPr>
               <a:t>sbatch</a:t>
             </a:r>
-            <a:endParaRPr lang="en-US" dirty="0"/>
+            <a:endParaRPr lang="en-US" dirty="0">
+              <a:solidFill>
+                <a:srgbClr val="0070C0"/>
+              </a:solidFill>
+            </a:endParaRPr>
           </a:p>
           <a:p>
             <a:r>
@@ -9204,10 +9208,10 @@
             <a:r>
               <a:rPr lang="en-US" sz="2300" i="0" u="none" strike="noStrike" cap="none" dirty="0">
                 <a:solidFill>
-                  <a:schemeClr val="accent5"/>
-                </a:solidFill>
-              </a:rPr>
-              <a:t>--output</a:t>
+                  <a:srgbClr val="0070C0"/>
+                </a:solidFill>
+              </a:rPr>
+              <a:t>--output </a:t>
             </a:r>
             <a:r>
               <a:rPr lang="en-US" sz="2300" i="0" u="none" strike="noStrike" cap="none" dirty="0">
@@ -9215,7 +9219,7 @@
                   <a:schemeClr val="dk1"/>
                 </a:solidFill>
               </a:rPr>
-              <a:t> directive.</a:t>
+              <a:t>directive.</a:t>
             </a:r>
             <a:endParaRPr lang="en-US" sz="1300" dirty="0"/>
           </a:p>
@@ -9255,10 +9259,10 @@
             <a:r>
               <a:rPr lang="en-US" sz="2300" i="0" u="none" strike="noStrike" cap="none" dirty="0">
                 <a:solidFill>
-                  <a:schemeClr val="accent5"/>
-                </a:solidFill>
-              </a:rPr>
-              <a:t>--output</a:t>
+                  <a:srgbClr val="0070C0"/>
+                </a:solidFill>
+              </a:rPr>
+              <a:t>--output </a:t>
             </a:r>
             <a:r>
               <a:rPr lang="en-US" sz="2300" i="0" u="none" strike="noStrike" cap="none" dirty="0">
@@ -9266,7 +9270,7 @@
                   <a:schemeClr val="dk1"/>
                 </a:solidFill>
               </a:rPr>
-              <a:t> is not provided, then a generic file name will be used (</a:t>
+              <a:t>is not provided, then a generic file name will be used (</a:t>
             </a:r>
             <a:r>
               <a:rPr lang="en-US" sz="2300" i="0" u="none" strike="noStrike" cap="none" dirty="0" err="1">
@@ -12174,7 +12178,7 @@
             <a:r>
               <a:rPr lang="en-US" sz="2000" b="1" dirty="0">
                 <a:solidFill>
-                  <a:schemeClr val="accent5"/>
+                  <a:srgbClr val="0070C0"/>
                 </a:solidFill>
                 <a:latin typeface="Consolas"/>
                 <a:ea typeface="Consolas"/>
@@ -12186,7 +12190,7 @@
             <a:r>
               <a:rPr lang="en-US" sz="2000" b="1" dirty="0" err="1">
                 <a:solidFill>
-                  <a:schemeClr val="accent5"/>
+                  <a:srgbClr val="0070C0"/>
                 </a:solidFill>
                 <a:latin typeface="Consolas"/>
                 <a:ea typeface="Consolas"/>
@@ -12198,7 +12202,7 @@
             <a:r>
               <a:rPr lang="en-US" sz="2000" b="1" dirty="0">
                 <a:solidFill>
-                  <a:schemeClr val="accent5"/>
+                  <a:srgbClr val="0070C0"/>
                 </a:solidFill>
                 <a:latin typeface="Consolas"/>
                 <a:ea typeface="Consolas"/>
@@ -12210,7 +12214,7 @@
             <a:r>
               <a:rPr lang="en-US" sz="2000" b="1" dirty="0" err="1">
                 <a:solidFill>
-                  <a:schemeClr val="accent5"/>
+                  <a:srgbClr val="0070C0"/>
                 </a:solidFill>
                 <a:latin typeface="Consolas"/>
                 <a:ea typeface="Consolas"/>
@@ -12222,7 +12226,7 @@
             <a:r>
               <a:rPr lang="en-US" sz="2000" b="1" dirty="0">
                 <a:solidFill>
-                  <a:schemeClr val="accent5"/>
+                  <a:srgbClr val="0070C0"/>
                 </a:solidFill>
                 <a:latin typeface="Consolas"/>
                 <a:ea typeface="Consolas"/>
@@ -12234,7 +12238,7 @@
             <a:r>
               <a:rPr lang="en-US" sz="2000" b="1" dirty="0" err="1">
                 <a:solidFill>
-                  <a:schemeClr val="accent5"/>
+                  <a:srgbClr val="0070C0"/>
                 </a:solidFill>
                 <a:latin typeface="Consolas"/>
                 <a:ea typeface="Consolas"/>
@@ -12246,7 +12250,7 @@
             <a:r>
               <a:rPr lang="en-US" sz="2000" b="1" dirty="0">
                 <a:solidFill>
-                  <a:schemeClr val="accent5"/>
+                  <a:srgbClr val="0070C0"/>
                 </a:solidFill>
                 <a:latin typeface="Consolas"/>
                 <a:ea typeface="Consolas"/>
@@ -12257,7 +12261,7 @@
             </a:r>
             <a:endParaRPr sz="2000" b="1" dirty="0">
               <a:solidFill>
-                <a:schemeClr val="accent5"/>
+                <a:srgbClr val="0070C0"/>
               </a:solidFill>
               <a:latin typeface="Consolas"/>
               <a:ea typeface="Consolas"/>
@@ -12316,7 +12320,7 @@
             <a:r>
               <a:rPr lang="en-US" sz="2000" b="1" dirty="0">
                 <a:solidFill>
-                  <a:schemeClr val="accent5"/>
+                  <a:srgbClr val="0070C0"/>
                 </a:solidFill>
                 <a:latin typeface="Consolas"/>
                 <a:ea typeface="Consolas"/>
@@ -12325,7 +12329,11 @@
               </a:rPr>
               <a:t>$ module load anaconda  </a:t>
             </a:r>
-            <a:endParaRPr b="1" dirty="0"/>
+            <a:endParaRPr b="1" dirty="0">
+              <a:solidFill>
+                <a:srgbClr val="0070C0"/>
+              </a:solidFill>
+            </a:endParaRPr>
           </a:p>
           <a:p>
             <a:pPr marL="0" marR="0" lvl="0" indent="0" algn="l" rtl="0">
@@ -12340,7 +12348,7 @@
             <a:r>
               <a:rPr lang="en-US" sz="2000" b="1" dirty="0">
                 <a:solidFill>
-                  <a:schemeClr val="accent5"/>
+                  <a:srgbClr val="0070C0"/>
                 </a:solidFill>
                 <a:latin typeface="Consolas"/>
                 <a:ea typeface="Consolas"/>
@@ -12352,7 +12360,7 @@
             <a:r>
               <a:rPr lang="en-US" sz="2000" b="1" dirty="0" err="1">
                 <a:solidFill>
-                  <a:schemeClr val="accent5"/>
+                  <a:srgbClr val="0070C0"/>
                 </a:solidFill>
                 <a:latin typeface="Consolas"/>
                 <a:ea typeface="Consolas"/>
@@ -12363,7 +12371,7 @@
             </a:r>
             <a:endParaRPr sz="2000" b="1" dirty="0">
               <a:solidFill>
-                <a:schemeClr val="accent5"/>
+                <a:srgbClr val="0070C0"/>
               </a:solidFill>
               <a:latin typeface="Consolas"/>
               <a:ea typeface="Consolas"/>
@@ -12422,7 +12430,7 @@
             <a:r>
               <a:rPr lang="en-US" sz="2000" b="1" dirty="0">
                 <a:solidFill>
-                  <a:schemeClr val="accent5"/>
+                  <a:srgbClr val="0070C0"/>
                 </a:solidFill>
                 <a:latin typeface="Consolas"/>
                 <a:ea typeface="Consolas"/>
@@ -12431,7 +12439,11 @@
               </a:rPr>
               <a:t>$ exit</a:t>
             </a:r>
-            <a:endParaRPr b="1" dirty="0"/>
+            <a:endParaRPr b="1" dirty="0">
+              <a:solidFill>
+                <a:srgbClr val="0070C0"/>
+              </a:solidFill>
+            </a:endParaRPr>
           </a:p>
         </p:txBody>
       </p:sp>
@@ -16173,6 +16185,15 @@
 </file>
 
 <file path=customXml/item1.xml><?xml version="1.0" encoding="utf-8"?>
+<?mso-contentType ?>
+<FormTemplates xmlns="http://schemas.microsoft.com/sharepoint/v3/contenttype/forms">
+  <Display>DocumentLibraryForm</Display>
+  <Edit>DocumentLibraryForm</Edit>
+  <New>DocumentLibraryForm</New>
+</FormTemplates>
+</file>
+
+<file path=customXml/item2.xml><?xml version="1.0" encoding="utf-8"?>
 <ct:contentTypeSchema xmlns:ct="http://schemas.microsoft.com/office/2006/metadata/contentType" xmlns:ma="http://schemas.microsoft.com/office/2006/metadata/properties/metaAttributes" ct:_="" ma:_="" ma:contentTypeName="Document" ma:contentTypeID="0x010100DC7320DB280744439FF1CC777D09ECA4" ma:contentTypeVersion="15" ma:contentTypeDescription="Create a new document." ma:contentTypeScope="" ma:versionID="e50b92032c956cc777cf00ac7d475189">
   <xsd:schema xmlns:xsd="http://www.w3.org/2001/XMLSchema" xmlns:xs="http://www.w3.org/2001/XMLSchema" xmlns:p="http://schemas.microsoft.com/office/2006/metadata/properties" xmlns:ns2="7e49f7d3-8802-46ca-9604-495ce27f67f4" xmlns:ns3="a1519f9a-9d6a-41c1-afc9-552e4069f82f" xmlns:ns4="92c16b9d-8c83-445e-a4f4-1fe3d2f43f13" targetNamespace="http://schemas.microsoft.com/office/2006/metadata/properties" ma:root="true" ma:fieldsID="fcd7cab68a23f1df7b42ced4f3edf141" ns2:_="" ns3:_="" ns4:_="">
     <xsd:import namespace="7e49f7d3-8802-46ca-9604-495ce27f67f4"/>
@@ -16414,15 +16435,6 @@
 </ct:contentTypeSchema>
 </file>
 
-<file path=customXml/item2.xml><?xml version="1.0" encoding="utf-8"?>
-<?mso-contentType ?>
-<FormTemplates xmlns="http://schemas.microsoft.com/sharepoint/v3/contenttype/forms">
-  <Display>DocumentLibraryForm</Display>
-  <Edit>DocumentLibraryForm</Edit>
-  <New>DocumentLibraryForm</New>
-</FormTemplates>
-</file>
-
 <file path=customXml/item3.xml><?xml version="1.0" encoding="utf-8"?>
 <p:properties xmlns:p="http://schemas.microsoft.com/office/2006/metadata/properties" xmlns:xsi="http://www.w3.org/2001/XMLSchema-instance" xmlns:pc="http://schemas.microsoft.com/office/infopath/2007/PartnerControls">
   <documentManagement>
@@ -16435,6 +16447,14 @@
 </file>
 
 <file path=customXml/itemProps1.xml><?xml version="1.0" encoding="utf-8"?>
+<ds:datastoreItem xmlns:ds="http://schemas.openxmlformats.org/officeDocument/2006/customXml" ds:itemID="{06B4C708-AA43-4CE7-BE2D-F9D9A02F4940}">
+  <ds:schemaRefs>
+    <ds:schemaRef ds:uri="http://schemas.microsoft.com/sharepoint/v3/contenttype/forms"/>
+  </ds:schemaRefs>
+</ds:datastoreItem>
+</file>
+
+<file path=customXml/itemProps2.xml><?xml version="1.0" encoding="utf-8"?>
 <ds:datastoreItem xmlns:ds="http://schemas.openxmlformats.org/officeDocument/2006/customXml" ds:itemID="{6BBC22CE-40EC-4545-8FE9-90326628051D}">
   <ds:schemaRefs>
     <ds:schemaRef ds:uri="7e49f7d3-8802-46ca-9604-495ce27f67f4"/>
@@ -16450,14 +16470,6 @@
     <ds:schemaRef ds:uri="http://schemas.microsoft.com/office/infopath/2007/PartnerControls"/>
     <ds:schemaRef ds:uri="http://schemas.openxmlformats.org/package/2006/metadata/core-properties"/>
     <ds:schemaRef ds:uri="http://www.w3.org/2001/XMLSchema"/>
-  </ds:schemaRefs>
-</ds:datastoreItem>
-</file>
-
-<file path=customXml/itemProps2.xml><?xml version="1.0" encoding="utf-8"?>
-<ds:datastoreItem xmlns:ds="http://schemas.openxmlformats.org/officeDocument/2006/customXml" ds:itemID="{06B4C708-AA43-4CE7-BE2D-F9D9A02F4940}">
-  <ds:schemaRefs>
-    <ds:schemaRef ds:uri="http://schemas.microsoft.com/sharepoint/v3/contenttype/forms"/>
   </ds:schemaRefs>
 </ds:datastoreItem>
 </file>

</xml_diff>

<commit_message>
incorporate changes John suggested
</commit_message>
<xml_diff>
--- a/scheduling_jobs/scheduling_jobs.pptx
+++ b/scheduling_jobs/scheduling_jobs.pptx
@@ -1802,7 +1802,7 @@
         <p:spPr>
           <a:xfrm>
             <a:off x="838200" y="1894367"/>
-            <a:ext cx="6424964" cy="3472489"/>
+            <a:ext cx="9519914" cy="3472489"/>
           </a:xfrm>
           <a:prstGeom prst="rect">
             <a:avLst/>
@@ -1924,7 +1924,7 @@
                   <a:srgbClr val="2F2B20"/>
                 </a:solidFill>
               </a:rPr>
-              <a:t>Quality of service (QoS) – A type of constraint for a job</a:t>
+              <a:t>Quality of service (QoS) – System defined constraints for a job (more on this later!)</a:t>
             </a:r>
           </a:p>
           <a:p>
@@ -7474,7 +7474,7 @@
         </p:nvSpPr>
         <p:spPr>
           <a:xfrm>
-            <a:off x="838200" y="1883400"/>
+            <a:off x="838200" y="2765827"/>
             <a:ext cx="10515600" cy="3091200"/>
           </a:xfrm>
           <a:prstGeom prst="rect">
@@ -7751,6 +7751,45 @@
               <a:t> &lt;command&gt;</a:t>
             </a:r>
             <a:endParaRPr sz="2000" b="1" dirty="0"/>
+          </a:p>
+        </p:txBody>
+      </p:sp>
+      <p:sp>
+        <p:nvSpPr>
+          <p:cNvPr id="3" name="TextBox 2">
+            <a:extLst>
+              <a:ext uri="{FF2B5EF4-FFF2-40B4-BE49-F238E27FC236}">
+                <a16:creationId xmlns:a16="http://schemas.microsoft.com/office/drawing/2014/main" id="{E38DAB9D-E6A7-0BD1-C9EF-1650233020F3}"/>
+              </a:ext>
+            </a:extLst>
+          </p:cNvPr>
+          <p:cNvSpPr txBox="1"/>
+          <p:nvPr/>
+        </p:nvSpPr>
+        <p:spPr>
+          <a:xfrm>
+            <a:off x="838200" y="1766592"/>
+            <a:ext cx="7636258" cy="461665"/>
+          </a:xfrm>
+          <a:prstGeom prst="rect">
+            <a:avLst/>
+          </a:prstGeom>
+          <a:noFill/>
+        </p:spPr>
+        <p:txBody>
+          <a:bodyPr wrap="none" rtlCol="0">
+            <a:spAutoFit/>
+          </a:bodyPr>
+          <a:lstStyle/>
+          <a:p>
+            <a:pPr marL="285750" indent="-285750">
+              <a:buFont typeface="Arial" panose="020B0604020202020204" pitchFamily="34" charset="0"/>
+              <a:buChar char="•"/>
+            </a:pPr>
+            <a:r>
+              <a:rPr lang="en-US" sz="2400" dirty="0"/>
+              <a:t>It’s just a bash script with SLURM specific directives!</a:t>
+            </a:r>
           </a:p>
         </p:txBody>
       </p:sp>
@@ -9482,16 +9521,12 @@
             </a:pPr>
             <a:r>
               <a:rPr lang="en-US" b="1" dirty="0">
+                <a:solidFill>
+                  <a:srgbClr val="0070C0"/>
+                </a:solidFill>
                 <a:latin typeface="Century Gothic"/>
-                <a:hlinkClick r:id="rId2"/>
-              </a:rPr>
-              <a:t>https://github.com/ResearchComputing/hpc_fundamentals_micro_credential</a:t>
-            </a:r>
-            <a:r>
-              <a:rPr lang="en-US" b="1" dirty="0">
-                <a:latin typeface="Century Gothic"/>
-              </a:rPr>
-              <a:t> </a:t>
+              </a:rPr>
+              <a:t>https://github.com/ResearchComputing/hpc_fundamentals_micro_credential </a:t>
             </a:r>
           </a:p>
           <a:p>
@@ -9531,7 +9566,7 @@
           <p:nvPr/>
         </p:nvPicPr>
         <p:blipFill>
-          <a:blip r:embed="rId3"/>
+          <a:blip r:embed="rId2"/>
           <a:stretch>
             <a:fillRect/>
           </a:stretch>
@@ -10374,11 +10409,11 @@
           <a:p>
             <a:r>
               <a:rPr lang="en-US" sz="2800" dirty="0"/>
-              <a:t>To check the efficiency of a job </a:t>
+              <a:t>To check the percentage of CPU and memory usage of a job </a:t>
             </a:r>
             <a:r>
               <a:rPr lang="en-US" sz="2800" b="1" dirty="0"/>
-              <a:t>after it completes </a:t>
+              <a:t>after it completes, </a:t>
             </a:r>
             <a:r>
               <a:rPr lang="en-US" sz="2800" dirty="0"/>
@@ -10472,7 +10507,7 @@
         </p:nvSpPr>
         <p:spPr>
           <a:xfrm>
-            <a:off x="1589616" y="3532831"/>
+            <a:off x="1589766" y="3675706"/>
             <a:ext cx="7263450" cy="400110"/>
           </a:xfrm>
           <a:prstGeom prst="rect">
@@ -10578,7 +10613,7 @@
         </p:nvSpPr>
         <p:spPr>
           <a:xfrm>
-            <a:off x="1589691" y="5151224"/>
+            <a:off x="1589766" y="5417212"/>
             <a:ext cx="7263300" cy="738900"/>
           </a:xfrm>
           <a:prstGeom prst="rect">
@@ -10827,6 +10862,13 @@
             <a:r>
               <a:rPr lang="en-US" dirty="0"/>
               <a:t>Any non-GUI related commands you would run from the command line can be put in your job script!</a:t>
+            </a:r>
+          </a:p>
+          <a:p>
+            <a:pPr lvl="1"/>
+            <a:r>
+              <a:rPr lang="en-US" dirty="0"/>
+              <a:t>If you would like to use GUI applications, you will need X11 forwarding and an interactive job</a:t>
             </a:r>
           </a:p>
         </p:txBody>
@@ -12699,7 +12741,7 @@
               <a:rPr lang="en-US" sz="3200" dirty="0">
                 <a:latin typeface="Century Gothic"/>
               </a:rPr>
-              <a:t>Obtain a clear overview of job submission on an HPC</a:t>
+              <a:t>Obtain a clear overview of job submission on an HPC system</a:t>
             </a:r>
           </a:p>
           <a:p>

</xml_diff>

<commit_message>
update date, add testing partitions slide, add compile qos, add interactive GUI job slide at end per request
</commit_message>
<xml_diff>
--- a/scheduling_jobs/scheduling_jobs.pptx
+++ b/scheduling_jobs/scheduling_jobs.pptx
@@ -5,7 +5,7 @@
     <p:sldMasterId id="2147483660" r:id="rId4"/>
   </p:sldMasterIdLst>
   <p:notesMasterIdLst>
-    <p:notesMasterId r:id="rId31"/>
+    <p:notesMasterId r:id="rId33"/>
   </p:notesMasterIdLst>
   <p:sldIdLst>
     <p:sldId id="260" r:id="rId5"/>
@@ -20,20 +20,22 @@
     <p:sldId id="367" r:id="rId14"/>
     <p:sldId id="357" r:id="rId15"/>
     <p:sldId id="366" r:id="rId16"/>
-    <p:sldId id="368" r:id="rId17"/>
-    <p:sldId id="354" r:id="rId18"/>
-    <p:sldId id="355" r:id="rId19"/>
-    <p:sldId id="358" r:id="rId20"/>
-    <p:sldId id="369" r:id="rId21"/>
-    <p:sldId id="359" r:id="rId22"/>
-    <p:sldId id="360" r:id="rId23"/>
-    <p:sldId id="361" r:id="rId24"/>
-    <p:sldId id="362" r:id="rId25"/>
-    <p:sldId id="363" r:id="rId26"/>
-    <p:sldId id="364" r:id="rId27"/>
-    <p:sldId id="370" r:id="rId28"/>
-    <p:sldId id="371" r:id="rId29"/>
-    <p:sldId id="266" r:id="rId30"/>
+    <p:sldId id="372" r:id="rId17"/>
+    <p:sldId id="368" r:id="rId18"/>
+    <p:sldId id="354" r:id="rId19"/>
+    <p:sldId id="355" r:id="rId20"/>
+    <p:sldId id="358" r:id="rId21"/>
+    <p:sldId id="369" r:id="rId22"/>
+    <p:sldId id="359" r:id="rId23"/>
+    <p:sldId id="360" r:id="rId24"/>
+    <p:sldId id="361" r:id="rId25"/>
+    <p:sldId id="362" r:id="rId26"/>
+    <p:sldId id="363" r:id="rId27"/>
+    <p:sldId id="364" r:id="rId28"/>
+    <p:sldId id="370" r:id="rId29"/>
+    <p:sldId id="371" r:id="rId30"/>
+    <p:sldId id="373" r:id="rId31"/>
+    <p:sldId id="266" r:id="rId32"/>
   </p:sldIdLst>
   <p:sldSz cx="12192000" cy="6858000"/>
   <p:notesSz cx="6858000" cy="9144000"/>
@@ -239,7 +241,7 @@
           <a:p>
             <a:fld id="{EFDA08D6-E137-3341-A5EE-84219A24203E}" type="datetimeFigureOut">
               <a:rPr lang="en-US" smtClean="0"/>
-              <a:t>8/12/24</a:t>
+              <a:t>1/6/25</a:t>
             </a:fld>
             <a:endParaRPr lang="en-US"/>
           </a:p>
@@ -746,7 +748,7 @@
             <a:pPr algn="ctr"/>
             <a:r>
               <a:rPr lang="en-US"/>
-              <a:t>8/14/24</a:t>
+              <a:t>1/9/25</a:t>
             </a:r>
           </a:p>
         </p:txBody>
@@ -927,7 +929,7 @@
             <a:pPr algn="ctr"/>
             <a:r>
               <a:rPr lang="en-US"/>
-              <a:t>8/14/24</a:t>
+              <a:t>1/9/25</a:t>
             </a:r>
           </a:p>
         </p:txBody>
@@ -1220,7 +1222,7 @@
             <a:pPr algn="ctr"/>
             <a:r>
               <a:rPr lang="en-US"/>
-              <a:t>8/14/24</a:t>
+              <a:t>1/9/25</a:t>
             </a:r>
           </a:p>
         </p:txBody>
@@ -1666,7 +1668,7 @@
               <a:rPr lang="en-US" sz="2800" dirty="0">
                 <a:latin typeface="Century Gothic" panose="020B0502020202020204" pitchFamily="34" charset="0"/>
               </a:rPr>
-              <a:t>August 14, 2024</a:t>
+              <a:t>January 9, 2025</a:t>
             </a:r>
           </a:p>
         </p:txBody>
@@ -1753,7 +1755,7 @@
             <a:pPr algn="ctr"/>
             <a:r>
               <a:rPr lang="en-US"/>
-              <a:t>8/14/24</a:t>
+              <a:t>1/9/25</a:t>
             </a:r>
           </a:p>
         </p:txBody>
@@ -1858,7 +1860,7 @@
               <a:buChar char="•"/>
             </a:pPr>
             <a:r>
-              <a:rPr lang="en-US" sz="1800" b="1" dirty="0">
+              <a:rPr lang="en-US" sz="1800" dirty="0">
                 <a:solidFill>
                   <a:srgbClr val="0070C0"/>
                 </a:solidFill>
@@ -1870,7 +1872,7 @@
               <a:t>--partition=</a:t>
             </a:r>
             <a:r>
-              <a:rPr lang="en-US" sz="1800" b="1" dirty="0">
+              <a:rPr lang="en-US" sz="1800" dirty="0">
                 <a:solidFill>
                   <a:schemeClr val="accent2"/>
                 </a:solidFill>
@@ -1882,7 +1884,7 @@
               <a:t>&lt;</a:t>
             </a:r>
             <a:r>
-              <a:rPr lang="en-US" sz="1800" b="1" dirty="0" err="1">
+              <a:rPr lang="en-US" sz="1800" dirty="0" err="1">
                 <a:solidFill>
                   <a:schemeClr val="accent2"/>
                 </a:solidFill>
@@ -1894,7 +1896,7 @@
               <a:t>partition_name</a:t>
             </a:r>
             <a:r>
-              <a:rPr lang="en-US" sz="1800" b="1" dirty="0">
+              <a:rPr lang="en-US" sz="1800" dirty="0">
                 <a:solidFill>
                   <a:schemeClr val="accent2"/>
                 </a:solidFill>
@@ -2385,7 +2387,7 @@
             <a:pPr algn="ctr"/>
             <a:r>
               <a:rPr lang="en-US"/>
-              <a:t>8/14/24</a:t>
+              <a:t>1/9/25</a:t>
             </a:r>
           </a:p>
         </p:txBody>
@@ -2915,7 +2917,7 @@
             <a:pPr algn="ctr"/>
             <a:r>
               <a:rPr lang="en-US"/>
-              <a:t>8/14/24</a:t>
+              <a:t>1/9/25</a:t>
             </a:r>
           </a:p>
         </p:txBody>
@@ -2962,7 +2964,7 @@
           <p:nvPr>
             <p:extLst>
               <p:ext uri="{D42A27DB-BD31-4B8C-83A1-F6EECF244321}">
-                <p14:modId xmlns:p14="http://schemas.microsoft.com/office/powerpoint/2010/main" val="2491704134"/>
+                <p14:modId xmlns:p14="http://schemas.microsoft.com/office/powerpoint/2010/main" val="2213664949"/>
               </p:ext>
             </p:extLst>
           </p:nvPr>
@@ -3597,7 +3599,7 @@
                       </a:pPr>
                       <a:r>
                         <a:rPr lang="en-US" sz="1800" u="none" strike="noStrike" cap="none" dirty="0"/>
-                        <a:t>347</a:t>
+                        <a:t>376</a:t>
                       </a:r>
                       <a:endParaRPr sz="1800" u="none" strike="noStrike" cap="none" dirty="0"/>
                     </a:p>
@@ -3656,10 +3658,10 @@
                         <a:buNone/>
                       </a:pPr>
                       <a:r>
-                        <a:rPr lang="en-US" sz="1800"/>
-                        <a:t>3.74</a:t>
+                        <a:rPr lang="en-US" sz="1800" dirty="0"/>
+                        <a:t>3.75</a:t>
                       </a:r>
-                      <a:endParaRPr sz="1800" b="0" i="0" u="none" strike="noStrike" cap="none">
+                      <a:endParaRPr sz="1800" b="0" i="0" u="none" strike="noStrike" cap="none" dirty="0">
                         <a:solidFill>
                           <a:srgbClr val="000000"/>
                         </a:solidFill>
@@ -3724,10 +3726,10 @@
                         <a:buNone/>
                       </a:pPr>
                       <a:r>
-                        <a:rPr lang="en-US" sz="1800"/>
-                        <a:t>64</a:t>
+                        <a:rPr lang="en-US" sz="1800" dirty="0"/>
+                        <a:t>32,48,64</a:t>
                       </a:r>
-                      <a:endParaRPr sz="1800" u="none" strike="noStrike" cap="none"/>
+                      <a:endParaRPr sz="1800" u="none" strike="noStrike" cap="none" dirty="0"/>
                     </a:p>
                   </a:txBody>
                   <a:tcPr marL="43100" marR="43100" marT="43100" marB="43100">
@@ -4075,10 +4077,10 @@
                         <a:buNone/>
                       </a:pPr>
                       <a:r>
-                        <a:rPr lang="en-US" sz="1800"/>
-                        <a:t>3.74</a:t>
+                        <a:rPr lang="en-US" sz="1800" dirty="0"/>
+                        <a:t>3.75</a:t>
                       </a:r>
-                      <a:endParaRPr sz="1800" b="0" i="0" u="none" strike="noStrike" cap="none">
+                      <a:endParaRPr sz="1800" b="0" i="0" u="none" strike="noStrike" cap="none" dirty="0">
                         <a:solidFill>
                           <a:srgbClr val="000000"/>
                         </a:solidFill>
@@ -4467,7 +4469,7 @@
                       </a:pPr>
                       <a:r>
                         <a:rPr lang="en-US" sz="1800" dirty="0"/>
-                        <a:t>3.74</a:t>
+                        <a:t>3.75</a:t>
                       </a:r>
                       <a:endParaRPr sz="1800" b="0" i="0" u="none" strike="noStrike" cap="none" dirty="0">
                         <a:solidFill>
@@ -4782,7 +4784,7 @@
                       </a:pPr>
                       <a:r>
                         <a:rPr lang="en-US" sz="1800" u="none" strike="noStrike" cap="none" dirty="0"/>
-                        <a:t>22</a:t>
+                        <a:t>24</a:t>
                       </a:r>
                       <a:endParaRPr sz="1800" u="none" strike="noStrike" cap="none" dirty="0"/>
                     </a:p>
@@ -4918,7 +4920,7 @@
                       </a:pPr>
                       <a:r>
                         <a:rPr lang="en-US" sz="1800" u="none" strike="noStrike" cap="none" dirty="0"/>
-                        <a:t>48</a:t>
+                        <a:t>48,64</a:t>
                       </a:r>
                       <a:endParaRPr sz="1800" u="none" strike="noStrike" cap="none" dirty="0"/>
                     </a:p>
@@ -5061,6 +5063,2269 @@
   <p:cSld>
     <p:spTree>
       <p:nvGrpSpPr>
+        <p:cNvPr id="1" name="">
+          <a:extLst>
+            <a:ext uri="{FF2B5EF4-FFF2-40B4-BE49-F238E27FC236}">
+              <a16:creationId xmlns:a16="http://schemas.microsoft.com/office/drawing/2014/main" id="{9CDF72F4-AC02-54B3-90D1-BED586865FEA}"/>
+            </a:ext>
+          </a:extLst>
+        </p:cNvPr>
+        <p:cNvGrpSpPr/>
+        <p:nvPr/>
+      </p:nvGrpSpPr>
+      <p:grpSpPr>
+        <a:xfrm>
+          <a:off x="0" y="0"/>
+          <a:ext cx="0" cy="0"/>
+          <a:chOff x="0" y="0"/>
+          <a:chExt cx="0" cy="0"/>
+        </a:xfrm>
+      </p:grpSpPr>
+      <p:sp>
+        <p:nvSpPr>
+          <p:cNvPr id="2" name="Title 1">
+            <a:extLst>
+              <a:ext uri="{FF2B5EF4-FFF2-40B4-BE49-F238E27FC236}">
+                <a16:creationId xmlns:a16="http://schemas.microsoft.com/office/drawing/2014/main" id="{7F4A3909-28CE-59E4-61B3-932570CC80C5}"/>
+              </a:ext>
+            </a:extLst>
+          </p:cNvPr>
+          <p:cNvSpPr>
+            <a:spLocks noGrp="1"/>
+          </p:cNvSpPr>
+          <p:nvPr>
+            <p:ph type="title"/>
+          </p:nvPr>
+        </p:nvSpPr>
+        <p:spPr>
+          <a:xfrm>
+            <a:off x="838200" y="136525"/>
+            <a:ext cx="10515600" cy="1325563"/>
+          </a:xfrm>
+        </p:spPr>
+        <p:txBody>
+          <a:bodyPr/>
+          <a:lstStyle/>
+          <a:p>
+            <a:r>
+              <a:rPr lang="en-US" dirty="0">
+                <a:latin typeface="Helvetica Neue Light"/>
+                <a:cs typeface="Helvetica Neue Light"/>
+                <a:sym typeface="Helvetica Neue Light"/>
+              </a:rPr>
+              <a:t>Alpine Testing Partitions</a:t>
+            </a:r>
+            <a:endParaRPr lang="en-US" dirty="0"/>
+          </a:p>
+        </p:txBody>
+      </p:sp>
+      <p:sp>
+        <p:nvSpPr>
+          <p:cNvPr id="3" name="Content Placeholder 2">
+            <a:extLst>
+              <a:ext uri="{FF2B5EF4-FFF2-40B4-BE49-F238E27FC236}">
+                <a16:creationId xmlns:a16="http://schemas.microsoft.com/office/drawing/2014/main" id="{21B9EBED-13AB-034F-CFD7-00FB1DAC0B86}"/>
+              </a:ext>
+            </a:extLst>
+          </p:cNvPr>
+          <p:cNvSpPr>
+            <a:spLocks noGrp="1"/>
+          </p:cNvSpPr>
+          <p:nvPr>
+            <p:ph idx="1"/>
+          </p:nvPr>
+        </p:nvSpPr>
+        <p:spPr>
+          <a:xfrm>
+            <a:off x="838200" y="1378805"/>
+            <a:ext cx="10515600" cy="1549034"/>
+          </a:xfrm>
+        </p:spPr>
+        <p:txBody>
+          <a:bodyPr>
+            <a:normAutofit fontScale="92500" lnSpcReduction="10000"/>
+          </a:bodyPr>
+          <a:lstStyle/>
+          <a:p>
+            <a:r>
+              <a:rPr lang="en-US" dirty="0"/>
+              <a:t>For many of the partitions we have testing partitions that provide quicker access to resources. </a:t>
+            </a:r>
+          </a:p>
+          <a:p>
+            <a:pPr marL="0" indent="0">
+              <a:buNone/>
+            </a:pPr>
+            <a:r>
+              <a:rPr lang="en-US" b="1" u="sng" dirty="0"/>
+              <a:t>Note: </a:t>
+            </a:r>
+            <a:r>
+              <a:rPr lang="en-US" dirty="0"/>
+              <a:t>there are restrictions on the amount of resources you can request. These restrictions can be found in our documentation.  </a:t>
+            </a:r>
+          </a:p>
+        </p:txBody>
+      </p:sp>
+      <p:sp>
+        <p:nvSpPr>
+          <p:cNvPr id="4" name="Date Placeholder 3">
+            <a:extLst>
+              <a:ext uri="{FF2B5EF4-FFF2-40B4-BE49-F238E27FC236}">
+                <a16:creationId xmlns:a16="http://schemas.microsoft.com/office/drawing/2014/main" id="{CE63D458-0B66-49A0-502A-DCE4C7E0AF0A}"/>
+              </a:ext>
+            </a:extLst>
+          </p:cNvPr>
+          <p:cNvSpPr>
+            <a:spLocks noGrp="1"/>
+          </p:cNvSpPr>
+          <p:nvPr>
+            <p:ph type="dt" sz="half" idx="10"/>
+          </p:nvPr>
+        </p:nvSpPr>
+        <p:spPr/>
+        <p:txBody>
+          <a:bodyPr/>
+          <a:lstStyle/>
+          <a:p>
+            <a:pPr algn="ctr"/>
+            <a:r>
+              <a:rPr lang="en-US"/>
+              <a:t>1/9/25</a:t>
+            </a:r>
+          </a:p>
+        </p:txBody>
+      </p:sp>
+      <p:sp>
+        <p:nvSpPr>
+          <p:cNvPr id="5" name="Slide Number Placeholder 4">
+            <a:extLst>
+              <a:ext uri="{FF2B5EF4-FFF2-40B4-BE49-F238E27FC236}">
+                <a16:creationId xmlns:a16="http://schemas.microsoft.com/office/drawing/2014/main" id="{9F9D8319-47C3-5F6F-C07C-46B390B3683D}"/>
+              </a:ext>
+            </a:extLst>
+          </p:cNvPr>
+          <p:cNvSpPr>
+            <a:spLocks noGrp="1"/>
+          </p:cNvSpPr>
+          <p:nvPr>
+            <p:ph type="sldNum" sz="quarter" idx="12"/>
+          </p:nvPr>
+        </p:nvSpPr>
+        <p:spPr/>
+        <p:txBody>
+          <a:bodyPr/>
+          <a:lstStyle/>
+          <a:p>
+            <a:fld id="{ABDA560F-461C-6043-9BC4-489BA92F7161}" type="slidenum">
+              <a:rPr lang="en-US" smtClean="0"/>
+              <a:t>13</a:t>
+            </a:fld>
+            <a:endParaRPr lang="en-US"/>
+          </a:p>
+        </p:txBody>
+      </p:sp>
+      <p:graphicFrame>
+        <p:nvGraphicFramePr>
+          <p:cNvPr id="6" name="Google Shape;833;p68">
+            <a:extLst>
+              <a:ext uri="{FF2B5EF4-FFF2-40B4-BE49-F238E27FC236}">
+                <a16:creationId xmlns:a16="http://schemas.microsoft.com/office/drawing/2014/main" id="{EC46FB0D-D7D1-CB1A-6CBD-5805716EE2C3}"/>
+              </a:ext>
+            </a:extLst>
+          </p:cNvPr>
+          <p:cNvGraphicFramePr/>
+          <p:nvPr>
+            <p:extLst>
+              <p:ext uri="{D42A27DB-BD31-4B8C-83A1-F6EECF244321}">
+                <p14:modId xmlns:p14="http://schemas.microsoft.com/office/powerpoint/2010/main" val="626028612"/>
+              </p:ext>
+            </p:extLst>
+          </p:nvPr>
+        </p:nvGraphicFramePr>
+        <p:xfrm>
+          <a:off x="838200" y="3107748"/>
+          <a:ext cx="10218825" cy="3174200"/>
+        </p:xfrm>
+        <a:graphic>
+          <a:graphicData uri="http://schemas.openxmlformats.org/drawingml/2006/table">
+            <a:tbl>
+              <a:tblPr>
+                <a:noFill/>
+              </a:tblPr>
+              <a:tblGrid>
+                <a:gridCol w="2165750">
+                  <a:extLst>
+                    <a:ext uri="{9D8B030D-6E8A-4147-A177-3AD203B41FA5}">
+                      <a16:colId xmlns:a16="http://schemas.microsoft.com/office/drawing/2014/main" val="20000"/>
+                    </a:ext>
+                  </a:extLst>
+                </a:gridCol>
+                <a:gridCol w="2173000">
+                  <a:extLst>
+                    <a:ext uri="{9D8B030D-6E8A-4147-A177-3AD203B41FA5}">
+                      <a16:colId xmlns:a16="http://schemas.microsoft.com/office/drawing/2014/main" val="20001"/>
+                    </a:ext>
+                  </a:extLst>
+                </a:gridCol>
+                <a:gridCol w="1190700">
+                  <a:extLst>
+                    <a:ext uri="{9D8B030D-6E8A-4147-A177-3AD203B41FA5}">
+                      <a16:colId xmlns:a16="http://schemas.microsoft.com/office/drawing/2014/main" val="20002"/>
+                    </a:ext>
+                  </a:extLst>
+                </a:gridCol>
+                <a:gridCol w="1326775">
+                  <a:extLst>
+                    <a:ext uri="{9D8B030D-6E8A-4147-A177-3AD203B41FA5}">
+                      <a16:colId xmlns:a16="http://schemas.microsoft.com/office/drawing/2014/main" val="20003"/>
+                    </a:ext>
+                  </a:extLst>
+                </a:gridCol>
+                <a:gridCol w="1326775">
+                  <a:extLst>
+                    <a:ext uri="{9D8B030D-6E8A-4147-A177-3AD203B41FA5}">
+                      <a16:colId xmlns:a16="http://schemas.microsoft.com/office/drawing/2014/main" val="20004"/>
+                    </a:ext>
+                  </a:extLst>
+                </a:gridCol>
+                <a:gridCol w="2035825">
+                  <a:extLst>
+                    <a:ext uri="{9D8B030D-6E8A-4147-A177-3AD203B41FA5}">
+                      <a16:colId xmlns:a16="http://schemas.microsoft.com/office/drawing/2014/main" val="20005"/>
+                    </a:ext>
+                  </a:extLst>
+                </a:gridCol>
+              </a:tblGrid>
+              <a:tr h="300800">
+                <a:tc>
+                  <a:txBody>
+                    <a:bodyPr/>
+                    <a:lstStyle/>
+                    <a:p>
+                      <a:pPr marL="0" marR="0" lvl="0" indent="0" algn="l" rtl="0">
+                        <a:spcBef>
+                          <a:spcPts val="0"/>
+                        </a:spcBef>
+                        <a:spcAft>
+                          <a:spcPts val="0"/>
+                        </a:spcAft>
+                        <a:buNone/>
+                      </a:pPr>
+                      <a:r>
+                        <a:rPr lang="en-US" sz="1800" b="1" i="0" u="none" strike="noStrike" cap="none" dirty="0">
+                          <a:solidFill>
+                            <a:srgbClr val="000000"/>
+                          </a:solidFill>
+                          <a:latin typeface="Arial"/>
+                          <a:ea typeface="Arial"/>
+                          <a:cs typeface="Arial"/>
+                          <a:sym typeface="Arial"/>
+                        </a:rPr>
+                        <a:t>Partition</a:t>
+                      </a:r>
+                      <a:endParaRPr dirty="0"/>
+                    </a:p>
+                  </a:txBody>
+                  <a:tcPr marL="43100" marR="43100" marT="43100" marB="43100">
+                    <a:lnL w="9525" cap="flat" cmpd="sng">
+                      <a:solidFill>
+                        <a:srgbClr val="000000"/>
+                      </a:solidFill>
+                      <a:prstDash val="solid"/>
+                      <a:round/>
+                      <a:headEnd type="none" w="sm" len="sm"/>
+                      <a:tailEnd type="none" w="sm" len="sm"/>
+                    </a:lnL>
+                    <a:lnR w="9525" cap="flat" cmpd="sng">
+                      <a:solidFill>
+                        <a:srgbClr val="000000"/>
+                      </a:solidFill>
+                      <a:prstDash val="solid"/>
+                      <a:round/>
+                      <a:headEnd type="none" w="sm" len="sm"/>
+                      <a:tailEnd type="none" w="sm" len="sm"/>
+                    </a:lnR>
+                    <a:lnT w="9525" cap="flat" cmpd="sng">
+                      <a:solidFill>
+                        <a:srgbClr val="000000"/>
+                      </a:solidFill>
+                      <a:prstDash val="solid"/>
+                      <a:round/>
+                      <a:headEnd type="none" w="sm" len="sm"/>
+                      <a:tailEnd type="none" w="sm" len="sm"/>
+                    </a:lnT>
+                    <a:lnB w="9525" cap="flat" cmpd="sng">
+                      <a:solidFill>
+                        <a:srgbClr val="000000"/>
+                      </a:solidFill>
+                      <a:prstDash val="solid"/>
+                      <a:round/>
+                      <a:headEnd type="none" w="sm" len="sm"/>
+                      <a:tailEnd type="none" w="sm" len="sm"/>
+                    </a:lnB>
+                  </a:tcPr>
+                </a:tc>
+                <a:tc>
+                  <a:txBody>
+                    <a:bodyPr/>
+                    <a:lstStyle/>
+                    <a:p>
+                      <a:pPr marL="0" marR="0" lvl="0" indent="0" algn="l" rtl="0">
+                        <a:spcBef>
+                          <a:spcPts val="0"/>
+                        </a:spcBef>
+                        <a:spcAft>
+                          <a:spcPts val="0"/>
+                        </a:spcAft>
+                        <a:buNone/>
+                      </a:pPr>
+                      <a:r>
+                        <a:rPr lang="en-US" sz="1800" b="1" i="0" u="none" strike="noStrike" cap="none">
+                          <a:solidFill>
+                            <a:srgbClr val="000000"/>
+                          </a:solidFill>
+                          <a:latin typeface="Arial"/>
+                          <a:ea typeface="Arial"/>
+                          <a:cs typeface="Arial"/>
+                          <a:sym typeface="Arial"/>
+                        </a:rPr>
+                        <a:t>Description</a:t>
+                      </a:r>
+                      <a:endParaRPr sz="1800" b="1" u="none" strike="noStrike" cap="none"/>
+                    </a:p>
+                  </a:txBody>
+                  <a:tcPr marL="43100" marR="43100" marT="43100" marB="43100">
+                    <a:lnL w="9525" cap="flat" cmpd="sng">
+                      <a:solidFill>
+                        <a:srgbClr val="000000"/>
+                      </a:solidFill>
+                      <a:prstDash val="solid"/>
+                      <a:round/>
+                      <a:headEnd type="none" w="sm" len="sm"/>
+                      <a:tailEnd type="none" w="sm" len="sm"/>
+                    </a:lnL>
+                    <a:lnR w="9525" cap="flat" cmpd="sng">
+                      <a:solidFill>
+                        <a:srgbClr val="000000"/>
+                      </a:solidFill>
+                      <a:prstDash val="solid"/>
+                      <a:round/>
+                      <a:headEnd type="none" w="sm" len="sm"/>
+                      <a:tailEnd type="none" w="sm" len="sm"/>
+                    </a:lnR>
+                    <a:lnT w="9525" cap="flat" cmpd="sng">
+                      <a:solidFill>
+                        <a:srgbClr val="000000"/>
+                      </a:solidFill>
+                      <a:prstDash val="solid"/>
+                      <a:round/>
+                      <a:headEnd type="none" w="sm" len="sm"/>
+                      <a:tailEnd type="none" w="sm" len="sm"/>
+                    </a:lnT>
+                    <a:lnB w="9525" cap="flat" cmpd="sng">
+                      <a:solidFill>
+                        <a:srgbClr val="000000"/>
+                      </a:solidFill>
+                      <a:prstDash val="solid"/>
+                      <a:round/>
+                      <a:headEnd type="none" w="sm" len="sm"/>
+                      <a:tailEnd type="none" w="sm" len="sm"/>
+                    </a:lnB>
+                  </a:tcPr>
+                </a:tc>
+                <a:tc>
+                  <a:txBody>
+                    <a:bodyPr/>
+                    <a:lstStyle/>
+                    <a:p>
+                      <a:pPr marL="0" marR="0" lvl="0" indent="0" algn="l" rtl="0">
+                        <a:spcBef>
+                          <a:spcPts val="0"/>
+                        </a:spcBef>
+                        <a:spcAft>
+                          <a:spcPts val="0"/>
+                        </a:spcAft>
+                        <a:buNone/>
+                      </a:pPr>
+                      <a:r>
+                        <a:rPr lang="en-US" sz="1800" b="1" i="0" u="none" strike="noStrike" cap="none">
+                          <a:solidFill>
+                            <a:srgbClr val="000000"/>
+                          </a:solidFill>
+                          <a:latin typeface="Arial"/>
+                          <a:ea typeface="Arial"/>
+                          <a:cs typeface="Arial"/>
+                          <a:sym typeface="Arial"/>
+                        </a:rPr>
+                        <a:t># of nodes</a:t>
+                      </a:r>
+                      <a:endParaRPr sz="1800" b="1" u="none" strike="noStrike" cap="none"/>
+                    </a:p>
+                  </a:txBody>
+                  <a:tcPr marL="43100" marR="43100" marT="43100" marB="43100">
+                    <a:lnL w="9525" cap="flat" cmpd="sng">
+                      <a:solidFill>
+                        <a:srgbClr val="000000"/>
+                      </a:solidFill>
+                      <a:prstDash val="solid"/>
+                      <a:round/>
+                      <a:headEnd type="none" w="sm" len="sm"/>
+                      <a:tailEnd type="none" w="sm" len="sm"/>
+                    </a:lnL>
+                    <a:lnR w="9525" cap="flat" cmpd="sng">
+                      <a:solidFill>
+                        <a:srgbClr val="000000"/>
+                      </a:solidFill>
+                      <a:prstDash val="solid"/>
+                      <a:round/>
+                      <a:headEnd type="none" w="sm" len="sm"/>
+                      <a:tailEnd type="none" w="sm" len="sm"/>
+                    </a:lnR>
+                    <a:lnT w="9525" cap="flat" cmpd="sng">
+                      <a:solidFill>
+                        <a:srgbClr val="000000"/>
+                      </a:solidFill>
+                      <a:prstDash val="solid"/>
+                      <a:round/>
+                      <a:headEnd type="none" w="sm" len="sm"/>
+                      <a:tailEnd type="none" w="sm" len="sm"/>
+                    </a:lnT>
+                    <a:lnB w="9525" cap="flat" cmpd="sng">
+                      <a:solidFill>
+                        <a:srgbClr val="000000"/>
+                      </a:solidFill>
+                      <a:prstDash val="solid"/>
+                      <a:round/>
+                      <a:headEnd type="none" w="sm" len="sm"/>
+                      <a:tailEnd type="none" w="sm" len="sm"/>
+                    </a:lnB>
+                  </a:tcPr>
+                </a:tc>
+                <a:tc>
+                  <a:txBody>
+                    <a:bodyPr/>
+                    <a:lstStyle/>
+                    <a:p>
+                      <a:pPr marL="0" marR="0" lvl="0" indent="0" algn="l" rtl="0">
+                        <a:spcBef>
+                          <a:spcPts val="0"/>
+                        </a:spcBef>
+                        <a:spcAft>
+                          <a:spcPts val="0"/>
+                        </a:spcAft>
+                        <a:buNone/>
+                      </a:pPr>
+                      <a:r>
+                        <a:rPr lang="en-US" sz="1800" b="1"/>
+                        <a:t>RAM/core (GB)</a:t>
+                      </a:r>
+                      <a:endParaRPr sz="1800" b="1" i="0" u="none" strike="noStrike" cap="none">
+                        <a:solidFill>
+                          <a:srgbClr val="000000"/>
+                        </a:solidFill>
+                        <a:latin typeface="Arial"/>
+                        <a:ea typeface="Arial"/>
+                        <a:cs typeface="Arial"/>
+                        <a:sym typeface="Arial"/>
+                      </a:endParaRPr>
+                    </a:p>
+                  </a:txBody>
+                  <a:tcPr marL="43100" marR="43100" marT="43100" marB="43100">
+                    <a:lnL w="9525" cap="flat" cmpd="sng">
+                      <a:solidFill>
+                        <a:srgbClr val="000000"/>
+                      </a:solidFill>
+                      <a:prstDash val="solid"/>
+                      <a:round/>
+                      <a:headEnd type="none" w="sm" len="sm"/>
+                      <a:tailEnd type="none" w="sm" len="sm"/>
+                    </a:lnL>
+                    <a:lnR w="9525" cap="flat" cmpd="sng">
+                      <a:solidFill>
+                        <a:srgbClr val="000000"/>
+                      </a:solidFill>
+                      <a:prstDash val="solid"/>
+                      <a:round/>
+                      <a:headEnd type="none" w="sm" len="sm"/>
+                      <a:tailEnd type="none" w="sm" len="sm"/>
+                    </a:lnR>
+                    <a:lnT w="9525" cap="flat" cmpd="sng">
+                      <a:solidFill>
+                        <a:srgbClr val="000000"/>
+                      </a:solidFill>
+                      <a:prstDash val="solid"/>
+                      <a:round/>
+                      <a:headEnd type="none" w="sm" len="sm"/>
+                      <a:tailEnd type="none" w="sm" len="sm"/>
+                    </a:lnT>
+                    <a:lnB w="9525" cap="flat" cmpd="sng">
+                      <a:solidFill>
+                        <a:srgbClr val="000000"/>
+                      </a:solidFill>
+                      <a:prstDash val="solid"/>
+                      <a:round/>
+                      <a:headEnd type="none" w="sm" len="sm"/>
+                      <a:tailEnd type="none" w="sm" len="sm"/>
+                    </a:lnB>
+                  </a:tcPr>
+                </a:tc>
+                <a:tc>
+                  <a:txBody>
+                    <a:bodyPr/>
+                    <a:lstStyle/>
+                    <a:p>
+                      <a:pPr marL="0" marR="0" lvl="0" indent="0" algn="l" rtl="0">
+                        <a:spcBef>
+                          <a:spcPts val="0"/>
+                        </a:spcBef>
+                        <a:spcAft>
+                          <a:spcPts val="0"/>
+                        </a:spcAft>
+                        <a:buNone/>
+                      </a:pPr>
+                      <a:r>
+                        <a:rPr lang="en-US" sz="1800" b="1" i="0" u="none" strike="noStrike" cap="none">
+                          <a:solidFill>
+                            <a:srgbClr val="000000"/>
+                          </a:solidFill>
+                          <a:latin typeface="Arial"/>
+                          <a:ea typeface="Arial"/>
+                          <a:cs typeface="Arial"/>
+                          <a:sym typeface="Arial"/>
+                        </a:rPr>
+                        <a:t>cores/node</a:t>
+                      </a:r>
+                      <a:endParaRPr sz="1800" b="1" u="none" strike="noStrike" cap="none"/>
+                    </a:p>
+                  </a:txBody>
+                  <a:tcPr marL="43100" marR="43100" marT="43100" marB="43100">
+                    <a:lnL w="9525" cap="flat" cmpd="sng">
+                      <a:solidFill>
+                        <a:srgbClr val="000000"/>
+                      </a:solidFill>
+                      <a:prstDash val="solid"/>
+                      <a:round/>
+                      <a:headEnd type="none" w="sm" len="sm"/>
+                      <a:tailEnd type="none" w="sm" len="sm"/>
+                    </a:lnL>
+                    <a:lnR w="9525" cap="flat" cmpd="sng">
+                      <a:solidFill>
+                        <a:srgbClr val="000000"/>
+                      </a:solidFill>
+                      <a:prstDash val="solid"/>
+                      <a:round/>
+                      <a:headEnd type="none" w="sm" len="sm"/>
+                      <a:tailEnd type="none" w="sm" len="sm"/>
+                    </a:lnR>
+                    <a:lnT w="9525" cap="flat" cmpd="sng">
+                      <a:solidFill>
+                        <a:srgbClr val="000000"/>
+                      </a:solidFill>
+                      <a:prstDash val="solid"/>
+                      <a:round/>
+                      <a:headEnd type="none" w="sm" len="sm"/>
+                      <a:tailEnd type="none" w="sm" len="sm"/>
+                    </a:lnT>
+                    <a:lnB w="9525" cap="flat" cmpd="sng">
+                      <a:solidFill>
+                        <a:srgbClr val="000000"/>
+                      </a:solidFill>
+                      <a:prstDash val="solid"/>
+                      <a:round/>
+                      <a:headEnd type="none" w="sm" len="sm"/>
+                      <a:tailEnd type="none" w="sm" len="sm"/>
+                    </a:lnB>
+                  </a:tcPr>
+                </a:tc>
+                <a:tc>
+                  <a:txBody>
+                    <a:bodyPr/>
+                    <a:lstStyle/>
+                    <a:p>
+                      <a:pPr marL="0" marR="0" lvl="0" indent="0" algn="l" rtl="0">
+                        <a:spcBef>
+                          <a:spcPts val="0"/>
+                        </a:spcBef>
+                        <a:spcAft>
+                          <a:spcPts val="0"/>
+                        </a:spcAft>
+                        <a:buNone/>
+                      </a:pPr>
+                      <a:r>
+                        <a:rPr lang="en-US" sz="1800" b="1" i="0" u="none" strike="noStrike" cap="none" dirty="0">
+                          <a:solidFill>
+                            <a:srgbClr val="000000"/>
+                          </a:solidFill>
+                          <a:latin typeface="Arial"/>
+                          <a:ea typeface="Arial"/>
+                          <a:cs typeface="Arial"/>
+                          <a:sym typeface="Arial"/>
+                        </a:rPr>
+                        <a:t>GPUs/node</a:t>
+                      </a:r>
+                      <a:endParaRPr sz="1800" b="1" u="none" strike="noStrike" cap="none" dirty="0"/>
+                    </a:p>
+                  </a:txBody>
+                  <a:tcPr marL="43100" marR="43100" marT="43100" marB="43100">
+                    <a:lnL w="9525" cap="flat" cmpd="sng">
+                      <a:solidFill>
+                        <a:srgbClr val="000000"/>
+                      </a:solidFill>
+                      <a:prstDash val="solid"/>
+                      <a:round/>
+                      <a:headEnd type="none" w="sm" len="sm"/>
+                      <a:tailEnd type="none" w="sm" len="sm"/>
+                    </a:lnL>
+                    <a:lnR w="9525" cap="flat" cmpd="sng">
+                      <a:solidFill>
+                        <a:srgbClr val="000000"/>
+                      </a:solidFill>
+                      <a:prstDash val="solid"/>
+                      <a:round/>
+                      <a:headEnd type="none" w="sm" len="sm"/>
+                      <a:tailEnd type="none" w="sm" len="sm"/>
+                    </a:lnR>
+                    <a:lnT w="9525" cap="flat" cmpd="sng">
+                      <a:solidFill>
+                        <a:srgbClr val="000000"/>
+                      </a:solidFill>
+                      <a:prstDash val="solid"/>
+                      <a:round/>
+                      <a:headEnd type="none" w="sm" len="sm"/>
+                      <a:tailEnd type="none" w="sm" len="sm"/>
+                    </a:lnT>
+                    <a:lnB w="9525" cap="flat" cmpd="sng">
+                      <a:solidFill>
+                        <a:srgbClr val="000000"/>
+                      </a:solidFill>
+                      <a:prstDash val="solid"/>
+                      <a:round/>
+                      <a:headEnd type="none" w="sm" len="sm"/>
+                      <a:tailEnd type="none" w="sm" len="sm"/>
+                    </a:lnB>
+                  </a:tcPr>
+                </a:tc>
+                <a:extLst>
+                  <a:ext uri="{0D108BD9-81ED-4DB2-BD59-A6C34878D82A}">
+                    <a16:rowId xmlns:a16="http://schemas.microsoft.com/office/drawing/2014/main" val="10000"/>
+                  </a:ext>
+                </a:extLst>
+              </a:tr>
+              <a:tr h="495175">
+                <a:tc>
+                  <a:txBody>
+                    <a:bodyPr/>
+                    <a:lstStyle/>
+                    <a:p>
+                      <a:pPr marL="0" marR="0" lvl="0" indent="0" algn="l" rtl="0">
+                        <a:spcBef>
+                          <a:spcPts val="0"/>
+                        </a:spcBef>
+                        <a:spcAft>
+                          <a:spcPts val="0"/>
+                        </a:spcAft>
+                        <a:buNone/>
+                      </a:pPr>
+                      <a:r>
+                        <a:rPr lang="en-US" sz="1800" dirty="0" err="1"/>
+                        <a:t>atesting</a:t>
+                      </a:r>
+                      <a:endParaRPr dirty="0"/>
+                    </a:p>
+                  </a:txBody>
+                  <a:tcPr marL="43100" marR="43100" marT="43100" marB="43100">
+                    <a:lnL w="9525" cap="flat" cmpd="sng">
+                      <a:solidFill>
+                        <a:srgbClr val="000000"/>
+                      </a:solidFill>
+                      <a:prstDash val="solid"/>
+                      <a:round/>
+                      <a:headEnd type="none" w="sm" len="sm"/>
+                      <a:tailEnd type="none" w="sm" len="sm"/>
+                    </a:lnL>
+                    <a:lnR w="9525" cap="flat" cmpd="sng">
+                      <a:solidFill>
+                        <a:srgbClr val="000000"/>
+                      </a:solidFill>
+                      <a:prstDash val="solid"/>
+                      <a:round/>
+                      <a:headEnd type="none" w="sm" len="sm"/>
+                      <a:tailEnd type="none" w="sm" len="sm"/>
+                    </a:lnR>
+                    <a:lnT w="9525" cap="flat" cmpd="sng">
+                      <a:solidFill>
+                        <a:srgbClr val="000000"/>
+                      </a:solidFill>
+                      <a:prstDash val="solid"/>
+                      <a:round/>
+                      <a:headEnd type="none" w="sm" len="sm"/>
+                      <a:tailEnd type="none" w="sm" len="sm"/>
+                    </a:lnT>
+                    <a:lnB w="9525" cap="flat" cmpd="sng">
+                      <a:solidFill>
+                        <a:srgbClr val="000000"/>
+                      </a:solidFill>
+                      <a:prstDash val="solid"/>
+                      <a:round/>
+                      <a:headEnd type="none" w="sm" len="sm"/>
+                      <a:tailEnd type="none" w="sm" len="sm"/>
+                    </a:lnB>
+                  </a:tcPr>
+                </a:tc>
+                <a:tc>
+                  <a:txBody>
+                    <a:bodyPr/>
+                    <a:lstStyle/>
+                    <a:p>
+                      <a:pPr marL="0" marR="0" lvl="0" indent="0" algn="l" rtl="0">
+                        <a:spcBef>
+                          <a:spcPts val="0"/>
+                        </a:spcBef>
+                        <a:spcAft>
+                          <a:spcPts val="0"/>
+                        </a:spcAft>
+                        <a:buNone/>
+                      </a:pPr>
+                      <a:r>
+                        <a:rPr lang="en-US" sz="1800" b="0" i="0" u="none" strike="noStrike" cap="none">
+                          <a:solidFill>
+                            <a:srgbClr val="000000"/>
+                          </a:solidFill>
+                          <a:latin typeface="Arial"/>
+                          <a:ea typeface="Arial"/>
+                          <a:cs typeface="Arial"/>
+                          <a:sym typeface="Arial"/>
+                        </a:rPr>
+                        <a:t>General Compute Node</a:t>
+                      </a:r>
+                      <a:r>
+                        <a:rPr lang="en-US" sz="1800"/>
+                        <a:t>: AMD Milan</a:t>
+                      </a:r>
+                      <a:r>
+                        <a:rPr lang="en-US" sz="1800" b="0" i="0" u="none" strike="noStrike" cap="none">
+                          <a:solidFill>
+                            <a:srgbClr val="000000"/>
+                          </a:solidFill>
+                          <a:latin typeface="Arial"/>
+                          <a:ea typeface="Arial"/>
+                          <a:cs typeface="Arial"/>
+                          <a:sym typeface="Arial"/>
+                        </a:rPr>
+                        <a:t> </a:t>
+                      </a:r>
+                      <a:endParaRPr sz="1800" u="none" strike="noStrike" cap="none"/>
+                    </a:p>
+                  </a:txBody>
+                  <a:tcPr marL="43100" marR="43100" marT="43100" marB="43100">
+                    <a:lnL w="9525" cap="flat" cmpd="sng">
+                      <a:solidFill>
+                        <a:srgbClr val="000000"/>
+                      </a:solidFill>
+                      <a:prstDash val="solid"/>
+                      <a:round/>
+                      <a:headEnd type="none" w="sm" len="sm"/>
+                      <a:tailEnd type="none" w="sm" len="sm"/>
+                    </a:lnL>
+                    <a:lnR w="9525" cap="flat" cmpd="sng">
+                      <a:solidFill>
+                        <a:srgbClr val="000000"/>
+                      </a:solidFill>
+                      <a:prstDash val="solid"/>
+                      <a:round/>
+                      <a:headEnd type="none" w="sm" len="sm"/>
+                      <a:tailEnd type="none" w="sm" len="sm"/>
+                    </a:lnR>
+                    <a:lnT w="9525" cap="flat" cmpd="sng">
+                      <a:solidFill>
+                        <a:srgbClr val="000000"/>
+                      </a:solidFill>
+                      <a:prstDash val="solid"/>
+                      <a:round/>
+                      <a:headEnd type="none" w="sm" len="sm"/>
+                      <a:tailEnd type="none" w="sm" len="sm"/>
+                    </a:lnT>
+                    <a:lnB w="9525" cap="flat" cmpd="sng">
+                      <a:solidFill>
+                        <a:srgbClr val="000000"/>
+                      </a:solidFill>
+                      <a:prstDash val="solid"/>
+                      <a:round/>
+                      <a:headEnd type="none" w="sm" len="sm"/>
+                      <a:tailEnd type="none" w="sm" len="sm"/>
+                    </a:lnB>
+                  </a:tcPr>
+                </a:tc>
+                <a:tc>
+                  <a:txBody>
+                    <a:bodyPr/>
+                    <a:lstStyle/>
+                    <a:p>
+                      <a:pPr marL="0" marR="0" lvl="0" indent="0" algn="l" rtl="0">
+                        <a:spcBef>
+                          <a:spcPts val="0"/>
+                        </a:spcBef>
+                        <a:spcAft>
+                          <a:spcPts val="0"/>
+                        </a:spcAft>
+                        <a:buNone/>
+                      </a:pPr>
+                      <a:r>
+                        <a:rPr lang="en-US" sz="1800" u="none" strike="noStrike" cap="none" dirty="0"/>
+                        <a:t>2</a:t>
+                      </a:r>
+                      <a:endParaRPr sz="1800" u="none" strike="noStrike" cap="none" dirty="0"/>
+                    </a:p>
+                  </a:txBody>
+                  <a:tcPr marL="43100" marR="43100" marT="43100" marB="43100">
+                    <a:lnL w="9525" cap="flat" cmpd="sng">
+                      <a:solidFill>
+                        <a:srgbClr val="000000"/>
+                      </a:solidFill>
+                      <a:prstDash val="solid"/>
+                      <a:round/>
+                      <a:headEnd type="none" w="sm" len="sm"/>
+                      <a:tailEnd type="none" w="sm" len="sm"/>
+                    </a:lnL>
+                    <a:lnR w="9525" cap="flat" cmpd="sng">
+                      <a:solidFill>
+                        <a:srgbClr val="000000"/>
+                      </a:solidFill>
+                      <a:prstDash val="solid"/>
+                      <a:round/>
+                      <a:headEnd type="none" w="sm" len="sm"/>
+                      <a:tailEnd type="none" w="sm" len="sm"/>
+                    </a:lnR>
+                    <a:lnT w="9525" cap="flat" cmpd="sng">
+                      <a:solidFill>
+                        <a:srgbClr val="000000"/>
+                      </a:solidFill>
+                      <a:prstDash val="solid"/>
+                      <a:round/>
+                      <a:headEnd type="none" w="sm" len="sm"/>
+                      <a:tailEnd type="none" w="sm" len="sm"/>
+                    </a:lnT>
+                    <a:lnB w="9525" cap="flat" cmpd="sng">
+                      <a:solidFill>
+                        <a:srgbClr val="000000"/>
+                      </a:solidFill>
+                      <a:prstDash val="solid"/>
+                      <a:round/>
+                      <a:headEnd type="none" w="sm" len="sm"/>
+                      <a:tailEnd type="none" w="sm" len="sm"/>
+                    </a:lnB>
+                  </a:tcPr>
+                </a:tc>
+                <a:tc>
+                  <a:txBody>
+                    <a:bodyPr/>
+                    <a:lstStyle/>
+                    <a:p>
+                      <a:pPr marL="0" marR="0" lvl="0" indent="0" algn="l" rtl="0">
+                        <a:spcBef>
+                          <a:spcPts val="0"/>
+                        </a:spcBef>
+                        <a:spcAft>
+                          <a:spcPts val="0"/>
+                        </a:spcAft>
+                        <a:buNone/>
+                      </a:pPr>
+                      <a:r>
+                        <a:rPr lang="en-US" sz="1800" dirty="0"/>
+                        <a:t>3.75</a:t>
+                      </a:r>
+                      <a:endParaRPr sz="1800" b="0" i="0" u="none" strike="noStrike" cap="none" dirty="0">
+                        <a:solidFill>
+                          <a:srgbClr val="000000"/>
+                        </a:solidFill>
+                        <a:latin typeface="Arial"/>
+                        <a:ea typeface="Arial"/>
+                        <a:cs typeface="Arial"/>
+                        <a:sym typeface="Arial"/>
+                      </a:endParaRPr>
+                    </a:p>
+                  </a:txBody>
+                  <a:tcPr marL="43100" marR="43100" marT="43100" marB="43100">
+                    <a:lnL w="9525" cap="flat" cmpd="sng">
+                      <a:solidFill>
+                        <a:srgbClr val="000000"/>
+                      </a:solidFill>
+                      <a:prstDash val="solid"/>
+                      <a:round/>
+                      <a:headEnd type="none" w="sm" len="sm"/>
+                      <a:tailEnd type="none" w="sm" len="sm"/>
+                    </a:lnL>
+                    <a:lnR w="9525" cap="flat" cmpd="sng">
+                      <a:solidFill>
+                        <a:srgbClr val="000000"/>
+                      </a:solidFill>
+                      <a:prstDash val="solid"/>
+                      <a:round/>
+                      <a:headEnd type="none" w="sm" len="sm"/>
+                      <a:tailEnd type="none" w="sm" len="sm"/>
+                    </a:lnR>
+                    <a:lnT w="9525" cap="flat" cmpd="sng">
+                      <a:solidFill>
+                        <a:srgbClr val="000000"/>
+                      </a:solidFill>
+                      <a:prstDash val="solid"/>
+                      <a:round/>
+                      <a:headEnd type="none" w="sm" len="sm"/>
+                      <a:tailEnd type="none" w="sm" len="sm"/>
+                    </a:lnT>
+                    <a:lnB w="9525" cap="flat" cmpd="sng">
+                      <a:solidFill>
+                        <a:srgbClr val="000000"/>
+                      </a:solidFill>
+                      <a:prstDash val="solid"/>
+                      <a:round/>
+                      <a:headEnd type="none" w="sm" len="sm"/>
+                      <a:tailEnd type="none" w="sm" len="sm"/>
+                    </a:lnB>
+                  </a:tcPr>
+                </a:tc>
+                <a:tc>
+                  <a:txBody>
+                    <a:bodyPr/>
+                    <a:lstStyle/>
+                    <a:p>
+                      <a:pPr marL="0" marR="0" lvl="0" indent="0" algn="l" rtl="0">
+                        <a:spcBef>
+                          <a:spcPts val="0"/>
+                        </a:spcBef>
+                        <a:spcAft>
+                          <a:spcPts val="0"/>
+                        </a:spcAft>
+                        <a:buNone/>
+                      </a:pPr>
+                      <a:r>
+                        <a:rPr lang="en-US" sz="1800" dirty="0"/>
+                        <a:t>64</a:t>
+                      </a:r>
+                      <a:endParaRPr sz="1800" u="none" strike="noStrike" cap="none" dirty="0"/>
+                    </a:p>
+                  </a:txBody>
+                  <a:tcPr marL="43100" marR="43100" marT="43100" marB="43100">
+                    <a:lnL w="9525" cap="flat" cmpd="sng">
+                      <a:solidFill>
+                        <a:srgbClr val="000000"/>
+                      </a:solidFill>
+                      <a:prstDash val="solid"/>
+                      <a:round/>
+                      <a:headEnd type="none" w="sm" len="sm"/>
+                      <a:tailEnd type="none" w="sm" len="sm"/>
+                    </a:lnL>
+                    <a:lnR w="9525" cap="flat" cmpd="sng">
+                      <a:solidFill>
+                        <a:srgbClr val="000000"/>
+                      </a:solidFill>
+                      <a:prstDash val="solid"/>
+                      <a:round/>
+                      <a:headEnd type="none" w="sm" len="sm"/>
+                      <a:tailEnd type="none" w="sm" len="sm"/>
+                    </a:lnR>
+                    <a:lnT w="9525" cap="flat" cmpd="sng">
+                      <a:solidFill>
+                        <a:srgbClr val="000000"/>
+                      </a:solidFill>
+                      <a:prstDash val="solid"/>
+                      <a:round/>
+                      <a:headEnd type="none" w="sm" len="sm"/>
+                      <a:tailEnd type="none" w="sm" len="sm"/>
+                    </a:lnT>
+                    <a:lnB w="9525" cap="flat" cmpd="sng">
+                      <a:solidFill>
+                        <a:srgbClr val="000000"/>
+                      </a:solidFill>
+                      <a:prstDash val="solid"/>
+                      <a:round/>
+                      <a:headEnd type="none" w="sm" len="sm"/>
+                      <a:tailEnd type="none" w="sm" len="sm"/>
+                    </a:lnB>
+                  </a:tcPr>
+                </a:tc>
+                <a:tc>
+                  <a:txBody>
+                    <a:bodyPr/>
+                    <a:lstStyle/>
+                    <a:p>
+                      <a:pPr marL="0" marR="0" lvl="0" indent="0" algn="l" rtl="0">
+                        <a:spcBef>
+                          <a:spcPts val="0"/>
+                        </a:spcBef>
+                        <a:spcAft>
+                          <a:spcPts val="0"/>
+                        </a:spcAft>
+                        <a:buNone/>
+                      </a:pPr>
+                      <a:r>
+                        <a:rPr lang="en-US" sz="1800" b="0" i="0" u="none" strike="noStrike" cap="none" dirty="0">
+                          <a:solidFill>
+                            <a:srgbClr val="000000"/>
+                          </a:solidFill>
+                          <a:latin typeface="Arial"/>
+                          <a:ea typeface="Arial"/>
+                          <a:cs typeface="Arial"/>
+                          <a:sym typeface="Arial"/>
+                        </a:rPr>
+                        <a:t>0</a:t>
+                      </a:r>
+                      <a:endParaRPr sz="1800" u="none" strike="noStrike" cap="none" dirty="0"/>
+                    </a:p>
+                  </a:txBody>
+                  <a:tcPr marL="43100" marR="43100" marT="43100" marB="43100">
+                    <a:lnL w="9525" cap="flat" cmpd="sng">
+                      <a:solidFill>
+                        <a:srgbClr val="000000"/>
+                      </a:solidFill>
+                      <a:prstDash val="solid"/>
+                      <a:round/>
+                      <a:headEnd type="none" w="sm" len="sm"/>
+                      <a:tailEnd type="none" w="sm" len="sm"/>
+                    </a:lnL>
+                    <a:lnR w="9525" cap="flat" cmpd="sng">
+                      <a:solidFill>
+                        <a:srgbClr val="000000"/>
+                      </a:solidFill>
+                      <a:prstDash val="solid"/>
+                      <a:round/>
+                      <a:headEnd type="none" w="sm" len="sm"/>
+                      <a:tailEnd type="none" w="sm" len="sm"/>
+                    </a:lnR>
+                    <a:lnT w="9525" cap="flat" cmpd="sng">
+                      <a:solidFill>
+                        <a:srgbClr val="000000"/>
+                      </a:solidFill>
+                      <a:prstDash val="solid"/>
+                      <a:round/>
+                      <a:headEnd type="none" w="sm" len="sm"/>
+                      <a:tailEnd type="none" w="sm" len="sm"/>
+                    </a:lnT>
+                    <a:lnB w="9525" cap="flat" cmpd="sng">
+                      <a:solidFill>
+                        <a:srgbClr val="000000"/>
+                      </a:solidFill>
+                      <a:prstDash val="solid"/>
+                      <a:round/>
+                      <a:headEnd type="none" w="sm" len="sm"/>
+                      <a:tailEnd type="none" w="sm" len="sm"/>
+                    </a:lnB>
+                  </a:tcPr>
+                </a:tc>
+                <a:extLst>
+                  <a:ext uri="{0D108BD9-81ED-4DB2-BD59-A6C34878D82A}">
+                    <a16:rowId xmlns:a16="http://schemas.microsoft.com/office/drawing/2014/main" val="10001"/>
+                  </a:ext>
+                </a:extLst>
+              </a:tr>
+              <a:tr h="495175">
+                <a:tc>
+                  <a:txBody>
+                    <a:bodyPr/>
+                    <a:lstStyle/>
+                    <a:p>
+                      <a:pPr marL="0" marR="0" lvl="0" indent="0" algn="l" rtl="0">
+                        <a:spcBef>
+                          <a:spcPts val="0"/>
+                        </a:spcBef>
+                        <a:spcAft>
+                          <a:spcPts val="0"/>
+                        </a:spcAft>
+                        <a:buNone/>
+                      </a:pPr>
+                      <a:r>
+                        <a:rPr lang="en-US" dirty="0" err="1"/>
+                        <a:t>acompile</a:t>
+                      </a:r>
+                      <a:endParaRPr dirty="0"/>
+                    </a:p>
+                  </a:txBody>
+                  <a:tcPr marL="43100" marR="43100" marT="43100" marB="43100">
+                    <a:lnL w="9525" cap="flat" cmpd="sng">
+                      <a:solidFill>
+                        <a:srgbClr val="000000"/>
+                      </a:solidFill>
+                      <a:prstDash val="solid"/>
+                      <a:round/>
+                      <a:headEnd type="none" w="sm" len="sm"/>
+                      <a:tailEnd type="none" w="sm" len="sm"/>
+                    </a:lnL>
+                    <a:lnR w="9525" cap="flat" cmpd="sng" algn="ctr">
+                      <a:solidFill>
+                        <a:srgbClr val="000000"/>
+                      </a:solidFill>
+                      <a:prstDash val="solid"/>
+                      <a:round/>
+                      <a:headEnd type="none" w="sm" len="sm"/>
+                      <a:tailEnd type="none" w="sm" len="sm"/>
+                    </a:lnR>
+                    <a:lnT w="9525" cap="flat" cmpd="sng" algn="ctr">
+                      <a:solidFill>
+                        <a:srgbClr val="000000"/>
+                      </a:solidFill>
+                      <a:prstDash val="solid"/>
+                      <a:round/>
+                      <a:headEnd type="none" w="sm" len="sm"/>
+                      <a:tailEnd type="none" w="sm" len="sm"/>
+                    </a:lnT>
+                    <a:lnB w="9525" cap="flat" cmpd="sng">
+                      <a:solidFill>
+                        <a:srgbClr val="000000"/>
+                      </a:solidFill>
+                      <a:prstDash val="solid"/>
+                      <a:round/>
+                      <a:headEnd type="none" w="sm" len="sm"/>
+                      <a:tailEnd type="none" w="sm" len="sm"/>
+                    </a:lnB>
+                  </a:tcPr>
+                </a:tc>
+                <a:tc>
+                  <a:txBody>
+                    <a:bodyPr/>
+                    <a:lstStyle/>
+                    <a:p>
+                      <a:pPr marL="0" marR="0" lvl="0" indent="0" algn="l" rtl="0">
+                        <a:spcBef>
+                          <a:spcPts val="0"/>
+                        </a:spcBef>
+                        <a:spcAft>
+                          <a:spcPts val="0"/>
+                        </a:spcAft>
+                        <a:buNone/>
+                      </a:pPr>
+                      <a:r>
+                        <a:rPr lang="en-US" sz="1800" u="none" strike="noStrike" cap="none" dirty="0"/>
+                        <a:t>General Compute Node: AMD Milan</a:t>
+                      </a:r>
+                      <a:endParaRPr sz="1800" u="none" strike="noStrike" cap="none" dirty="0"/>
+                    </a:p>
+                  </a:txBody>
+                  <a:tcPr marL="43100" marR="43100" marT="43100" marB="43100">
+                    <a:lnL w="9525" cap="flat" cmpd="sng" algn="ctr">
+                      <a:solidFill>
+                        <a:srgbClr val="000000"/>
+                      </a:solidFill>
+                      <a:prstDash val="solid"/>
+                      <a:round/>
+                      <a:headEnd type="none" w="sm" len="sm"/>
+                      <a:tailEnd type="none" w="sm" len="sm"/>
+                    </a:lnL>
+                    <a:lnR w="9525" cap="flat" cmpd="sng" algn="ctr">
+                      <a:solidFill>
+                        <a:srgbClr val="000000"/>
+                      </a:solidFill>
+                      <a:prstDash val="solid"/>
+                      <a:round/>
+                      <a:headEnd type="none" w="sm" len="sm"/>
+                      <a:tailEnd type="none" w="sm" len="sm"/>
+                    </a:lnR>
+                    <a:lnT w="9525" cap="flat" cmpd="sng" algn="ctr">
+                      <a:solidFill>
+                        <a:srgbClr val="000000"/>
+                      </a:solidFill>
+                      <a:prstDash val="solid"/>
+                      <a:round/>
+                      <a:headEnd type="none" w="sm" len="sm"/>
+                      <a:tailEnd type="none" w="sm" len="sm"/>
+                    </a:lnT>
+                    <a:lnB w="9525" cap="flat" cmpd="sng">
+                      <a:solidFill>
+                        <a:srgbClr val="000000"/>
+                      </a:solidFill>
+                      <a:prstDash val="solid"/>
+                      <a:round/>
+                      <a:headEnd type="none" w="sm" len="sm"/>
+                      <a:tailEnd type="none" w="sm" len="sm"/>
+                    </a:lnB>
+                  </a:tcPr>
+                </a:tc>
+                <a:tc>
+                  <a:txBody>
+                    <a:bodyPr/>
+                    <a:lstStyle/>
+                    <a:p>
+                      <a:pPr marL="0" marR="0" lvl="0" indent="0" algn="l" rtl="0">
+                        <a:spcBef>
+                          <a:spcPts val="0"/>
+                        </a:spcBef>
+                        <a:spcAft>
+                          <a:spcPts val="0"/>
+                        </a:spcAft>
+                        <a:buNone/>
+                      </a:pPr>
+                      <a:r>
+                        <a:rPr lang="en-US" sz="1800" u="none" strike="noStrike" cap="none" dirty="0"/>
+                        <a:t>4</a:t>
+                      </a:r>
+                      <a:endParaRPr sz="1800" u="none" strike="noStrike" cap="none" dirty="0"/>
+                    </a:p>
+                  </a:txBody>
+                  <a:tcPr marL="43100" marR="43100" marT="43100" marB="43100">
+                    <a:lnL w="9525" cap="flat" cmpd="sng" algn="ctr">
+                      <a:solidFill>
+                        <a:srgbClr val="000000"/>
+                      </a:solidFill>
+                      <a:prstDash val="solid"/>
+                      <a:round/>
+                      <a:headEnd type="none" w="sm" len="sm"/>
+                      <a:tailEnd type="none" w="sm" len="sm"/>
+                    </a:lnL>
+                    <a:lnR w="9525" cap="flat" cmpd="sng" algn="ctr">
+                      <a:solidFill>
+                        <a:srgbClr val="000000"/>
+                      </a:solidFill>
+                      <a:prstDash val="solid"/>
+                      <a:round/>
+                      <a:headEnd type="none" w="sm" len="sm"/>
+                      <a:tailEnd type="none" w="sm" len="sm"/>
+                    </a:lnR>
+                    <a:lnT w="9525" cap="flat" cmpd="sng" algn="ctr">
+                      <a:solidFill>
+                        <a:srgbClr val="000000"/>
+                      </a:solidFill>
+                      <a:prstDash val="solid"/>
+                      <a:round/>
+                      <a:headEnd type="none" w="sm" len="sm"/>
+                      <a:tailEnd type="none" w="sm" len="sm"/>
+                    </a:lnT>
+                    <a:lnB w="9525" cap="flat" cmpd="sng">
+                      <a:solidFill>
+                        <a:srgbClr val="000000"/>
+                      </a:solidFill>
+                      <a:prstDash val="solid"/>
+                      <a:round/>
+                      <a:headEnd type="none" w="sm" len="sm"/>
+                      <a:tailEnd type="none" w="sm" len="sm"/>
+                    </a:lnB>
+                  </a:tcPr>
+                </a:tc>
+                <a:tc>
+                  <a:txBody>
+                    <a:bodyPr/>
+                    <a:lstStyle/>
+                    <a:p>
+                      <a:pPr marL="0" marR="0" lvl="0" indent="0" algn="l" rtl="0">
+                        <a:spcBef>
+                          <a:spcPts val="0"/>
+                        </a:spcBef>
+                        <a:spcAft>
+                          <a:spcPts val="0"/>
+                        </a:spcAft>
+                        <a:buNone/>
+                      </a:pPr>
+                      <a:r>
+                        <a:rPr lang="en-US" sz="1800" b="0" i="0" u="none" strike="noStrike" cap="none" dirty="0">
+                          <a:solidFill>
+                            <a:srgbClr val="000000"/>
+                          </a:solidFill>
+                          <a:latin typeface="Arial"/>
+                          <a:ea typeface="Arial"/>
+                          <a:cs typeface="Arial"/>
+                          <a:sym typeface="Arial"/>
+                        </a:rPr>
+                        <a:t>3.75</a:t>
+                      </a:r>
+                      <a:endParaRPr sz="1800" b="0" i="0" u="none" strike="noStrike" cap="none" dirty="0">
+                        <a:solidFill>
+                          <a:srgbClr val="000000"/>
+                        </a:solidFill>
+                        <a:latin typeface="Arial"/>
+                        <a:ea typeface="Arial"/>
+                        <a:cs typeface="Arial"/>
+                        <a:sym typeface="Arial"/>
+                      </a:endParaRPr>
+                    </a:p>
+                  </a:txBody>
+                  <a:tcPr marL="43100" marR="43100" marT="43100" marB="43100">
+                    <a:lnL w="9525" cap="flat" cmpd="sng" algn="ctr">
+                      <a:solidFill>
+                        <a:srgbClr val="000000"/>
+                      </a:solidFill>
+                      <a:prstDash val="solid"/>
+                      <a:round/>
+                      <a:headEnd type="none" w="sm" len="sm"/>
+                      <a:tailEnd type="none" w="sm" len="sm"/>
+                    </a:lnL>
+                    <a:lnR w="9525" cap="flat" cmpd="sng" algn="ctr">
+                      <a:solidFill>
+                        <a:srgbClr val="000000"/>
+                      </a:solidFill>
+                      <a:prstDash val="solid"/>
+                      <a:round/>
+                      <a:headEnd type="none" w="sm" len="sm"/>
+                      <a:tailEnd type="none" w="sm" len="sm"/>
+                    </a:lnR>
+                    <a:lnT w="9525" cap="flat" cmpd="sng" algn="ctr">
+                      <a:solidFill>
+                        <a:srgbClr val="000000"/>
+                      </a:solidFill>
+                      <a:prstDash val="solid"/>
+                      <a:round/>
+                      <a:headEnd type="none" w="sm" len="sm"/>
+                      <a:tailEnd type="none" w="sm" len="sm"/>
+                    </a:lnT>
+                    <a:lnB w="9525" cap="flat" cmpd="sng">
+                      <a:solidFill>
+                        <a:srgbClr val="000000"/>
+                      </a:solidFill>
+                      <a:prstDash val="solid"/>
+                      <a:round/>
+                      <a:headEnd type="none" w="sm" len="sm"/>
+                      <a:tailEnd type="none" w="sm" len="sm"/>
+                    </a:lnB>
+                  </a:tcPr>
+                </a:tc>
+                <a:tc>
+                  <a:txBody>
+                    <a:bodyPr/>
+                    <a:lstStyle/>
+                    <a:p>
+                      <a:pPr marL="0" marR="0" lvl="0" indent="0" algn="l" rtl="0">
+                        <a:spcBef>
+                          <a:spcPts val="0"/>
+                        </a:spcBef>
+                        <a:spcAft>
+                          <a:spcPts val="0"/>
+                        </a:spcAft>
+                        <a:buNone/>
+                      </a:pPr>
+                      <a:r>
+                        <a:rPr lang="en-US" sz="1800" u="none" strike="noStrike" cap="none" dirty="0"/>
+                        <a:t>64</a:t>
+                      </a:r>
+                      <a:endParaRPr sz="1800" u="none" strike="noStrike" cap="none" dirty="0"/>
+                    </a:p>
+                  </a:txBody>
+                  <a:tcPr marL="43100" marR="43100" marT="43100" marB="43100">
+                    <a:lnL w="9525" cap="flat" cmpd="sng" algn="ctr">
+                      <a:solidFill>
+                        <a:srgbClr val="000000"/>
+                      </a:solidFill>
+                      <a:prstDash val="solid"/>
+                      <a:round/>
+                      <a:headEnd type="none" w="sm" len="sm"/>
+                      <a:tailEnd type="none" w="sm" len="sm"/>
+                    </a:lnL>
+                    <a:lnR w="9525" cap="flat" cmpd="sng" algn="ctr">
+                      <a:solidFill>
+                        <a:srgbClr val="000000"/>
+                      </a:solidFill>
+                      <a:prstDash val="solid"/>
+                      <a:round/>
+                      <a:headEnd type="none" w="sm" len="sm"/>
+                      <a:tailEnd type="none" w="sm" len="sm"/>
+                    </a:lnR>
+                    <a:lnT w="9525" cap="flat" cmpd="sng" algn="ctr">
+                      <a:solidFill>
+                        <a:srgbClr val="000000"/>
+                      </a:solidFill>
+                      <a:prstDash val="solid"/>
+                      <a:round/>
+                      <a:headEnd type="none" w="sm" len="sm"/>
+                      <a:tailEnd type="none" w="sm" len="sm"/>
+                    </a:lnT>
+                    <a:lnB w="9525" cap="flat" cmpd="sng">
+                      <a:solidFill>
+                        <a:srgbClr val="000000"/>
+                      </a:solidFill>
+                      <a:prstDash val="solid"/>
+                      <a:round/>
+                      <a:headEnd type="none" w="sm" len="sm"/>
+                      <a:tailEnd type="none" w="sm" len="sm"/>
+                    </a:lnB>
+                  </a:tcPr>
+                </a:tc>
+                <a:tc>
+                  <a:txBody>
+                    <a:bodyPr/>
+                    <a:lstStyle/>
+                    <a:p>
+                      <a:pPr marL="0" marR="0" lvl="0" indent="0" algn="l" rtl="0">
+                        <a:spcBef>
+                          <a:spcPts val="0"/>
+                        </a:spcBef>
+                        <a:spcAft>
+                          <a:spcPts val="0"/>
+                        </a:spcAft>
+                        <a:buNone/>
+                      </a:pPr>
+                      <a:r>
+                        <a:rPr lang="en-US" sz="1800" u="none" strike="noStrike" cap="none" dirty="0"/>
+                        <a:t>0</a:t>
+                      </a:r>
+                      <a:endParaRPr sz="1800" u="none" strike="noStrike" cap="none" dirty="0"/>
+                    </a:p>
+                  </a:txBody>
+                  <a:tcPr marL="43100" marR="43100" marT="43100" marB="43100">
+                    <a:lnL w="9525" cap="flat" cmpd="sng" algn="ctr">
+                      <a:solidFill>
+                        <a:srgbClr val="000000"/>
+                      </a:solidFill>
+                      <a:prstDash val="solid"/>
+                      <a:round/>
+                      <a:headEnd type="none" w="sm" len="sm"/>
+                      <a:tailEnd type="none" w="sm" len="sm"/>
+                    </a:lnL>
+                    <a:lnR w="9525" cap="flat" cmpd="sng">
+                      <a:solidFill>
+                        <a:srgbClr val="000000"/>
+                      </a:solidFill>
+                      <a:prstDash val="solid"/>
+                      <a:round/>
+                      <a:headEnd type="none" w="sm" len="sm"/>
+                      <a:tailEnd type="none" w="sm" len="sm"/>
+                    </a:lnR>
+                    <a:lnT w="9525" cap="flat" cmpd="sng" algn="ctr">
+                      <a:solidFill>
+                        <a:srgbClr val="000000"/>
+                      </a:solidFill>
+                      <a:prstDash val="solid"/>
+                      <a:round/>
+                      <a:headEnd type="none" w="sm" len="sm"/>
+                      <a:tailEnd type="none" w="sm" len="sm"/>
+                    </a:lnT>
+                    <a:lnB w="9525" cap="flat" cmpd="sng">
+                      <a:solidFill>
+                        <a:srgbClr val="000000"/>
+                      </a:solidFill>
+                      <a:prstDash val="solid"/>
+                      <a:round/>
+                      <a:headEnd type="none" w="sm" len="sm"/>
+                      <a:tailEnd type="none" w="sm" len="sm"/>
+                    </a:lnB>
+                  </a:tcPr>
+                </a:tc>
+                <a:extLst>
+                  <a:ext uri="{0D108BD9-81ED-4DB2-BD59-A6C34878D82A}">
+                    <a16:rowId xmlns:a16="http://schemas.microsoft.com/office/drawing/2014/main" val="1275728692"/>
+                  </a:ext>
+                </a:extLst>
+              </a:tr>
+              <a:tr h="342475">
+                <a:tc>
+                  <a:txBody>
+                    <a:bodyPr/>
+                    <a:lstStyle/>
+                    <a:p>
+                      <a:pPr marL="0" marR="0" lvl="0" indent="0" algn="l" rtl="0">
+                        <a:spcBef>
+                          <a:spcPts val="0"/>
+                        </a:spcBef>
+                        <a:spcAft>
+                          <a:spcPts val="0"/>
+                        </a:spcAft>
+                        <a:buNone/>
+                      </a:pPr>
+                      <a:r>
+                        <a:rPr lang="en-US" sz="1800" dirty="0"/>
+                        <a:t>atesting_mi100</a:t>
+                      </a:r>
+                      <a:endParaRPr sz="1800" b="0" i="0" u="none" strike="noStrike" cap="none" dirty="0">
+                        <a:solidFill>
+                          <a:srgbClr val="000000"/>
+                        </a:solidFill>
+                        <a:latin typeface="Arial"/>
+                        <a:ea typeface="Arial"/>
+                        <a:cs typeface="Arial"/>
+                        <a:sym typeface="Arial"/>
+                      </a:endParaRPr>
+                    </a:p>
+                  </a:txBody>
+                  <a:tcPr marL="43100" marR="43100" marT="43100" marB="43100">
+                    <a:lnL w="9525" cap="flat" cmpd="sng">
+                      <a:solidFill>
+                        <a:srgbClr val="000000"/>
+                      </a:solidFill>
+                      <a:prstDash val="solid"/>
+                      <a:round/>
+                      <a:headEnd type="none" w="sm" len="sm"/>
+                      <a:tailEnd type="none" w="sm" len="sm"/>
+                    </a:lnL>
+                    <a:lnR w="9525" cap="flat" cmpd="sng">
+                      <a:solidFill>
+                        <a:srgbClr val="000000"/>
+                      </a:solidFill>
+                      <a:prstDash val="solid"/>
+                      <a:round/>
+                      <a:headEnd type="none" w="sm" len="sm"/>
+                      <a:tailEnd type="none" w="sm" len="sm"/>
+                    </a:lnR>
+                    <a:lnT w="9525" cap="flat" cmpd="sng">
+                      <a:solidFill>
+                        <a:srgbClr val="000000"/>
+                      </a:solidFill>
+                      <a:prstDash val="solid"/>
+                      <a:round/>
+                      <a:headEnd type="none" w="sm" len="sm"/>
+                      <a:tailEnd type="none" w="sm" len="sm"/>
+                    </a:lnT>
+                    <a:lnB w="9525" cap="flat" cmpd="sng">
+                      <a:solidFill>
+                        <a:srgbClr val="000000"/>
+                      </a:solidFill>
+                      <a:prstDash val="solid"/>
+                      <a:round/>
+                      <a:headEnd type="none" w="sm" len="sm"/>
+                      <a:tailEnd type="none" w="sm" len="sm"/>
+                    </a:lnB>
+                  </a:tcPr>
+                </a:tc>
+                <a:tc>
+                  <a:txBody>
+                    <a:bodyPr/>
+                    <a:lstStyle/>
+                    <a:p>
+                      <a:pPr marL="0" marR="0" lvl="0" indent="0" algn="l" rtl="0">
+                        <a:spcBef>
+                          <a:spcPts val="0"/>
+                        </a:spcBef>
+                        <a:spcAft>
+                          <a:spcPts val="0"/>
+                        </a:spcAft>
+                        <a:buNone/>
+                      </a:pPr>
+                      <a:r>
+                        <a:rPr lang="en-US" sz="1800" b="0" i="0" u="none" strike="noStrike" cap="none" dirty="0">
+                          <a:solidFill>
+                            <a:srgbClr val="000000"/>
+                          </a:solidFill>
+                          <a:latin typeface="Arial"/>
+                          <a:ea typeface="Arial"/>
+                          <a:cs typeface="Arial"/>
+                          <a:sym typeface="Arial"/>
+                        </a:rPr>
+                        <a:t>GPU </a:t>
+                      </a:r>
+                      <a:r>
+                        <a:rPr lang="en-US" sz="1800" dirty="0"/>
+                        <a:t>Node:</a:t>
+                      </a:r>
+                      <a:endParaRPr sz="1800" dirty="0"/>
+                    </a:p>
+                    <a:p>
+                      <a:pPr marL="0" marR="0" lvl="0" indent="0" algn="l" rtl="0">
+                        <a:spcBef>
+                          <a:spcPts val="0"/>
+                        </a:spcBef>
+                        <a:spcAft>
+                          <a:spcPts val="0"/>
+                        </a:spcAft>
+                        <a:buNone/>
+                      </a:pPr>
+                      <a:r>
+                        <a:rPr lang="en-US" sz="1800" dirty="0"/>
+                        <a:t>3x AMD MI100</a:t>
+                      </a:r>
+                      <a:endParaRPr sz="1800" dirty="0"/>
+                    </a:p>
+                  </a:txBody>
+                  <a:tcPr marL="43100" marR="43100" marT="43100" marB="43100">
+                    <a:lnL w="9525" cap="flat" cmpd="sng">
+                      <a:solidFill>
+                        <a:srgbClr val="000000"/>
+                      </a:solidFill>
+                      <a:prstDash val="solid"/>
+                      <a:round/>
+                      <a:headEnd type="none" w="sm" len="sm"/>
+                      <a:tailEnd type="none" w="sm" len="sm"/>
+                    </a:lnL>
+                    <a:lnR w="9525" cap="flat" cmpd="sng">
+                      <a:solidFill>
+                        <a:srgbClr val="000000"/>
+                      </a:solidFill>
+                      <a:prstDash val="solid"/>
+                      <a:round/>
+                      <a:headEnd type="none" w="sm" len="sm"/>
+                      <a:tailEnd type="none" w="sm" len="sm"/>
+                    </a:lnR>
+                    <a:lnT w="9525" cap="flat" cmpd="sng">
+                      <a:solidFill>
+                        <a:srgbClr val="000000"/>
+                      </a:solidFill>
+                      <a:prstDash val="solid"/>
+                      <a:round/>
+                      <a:headEnd type="none" w="sm" len="sm"/>
+                      <a:tailEnd type="none" w="sm" len="sm"/>
+                    </a:lnT>
+                    <a:lnB w="9525" cap="flat" cmpd="sng">
+                      <a:solidFill>
+                        <a:srgbClr val="000000"/>
+                      </a:solidFill>
+                      <a:prstDash val="solid"/>
+                      <a:round/>
+                      <a:headEnd type="none" w="sm" len="sm"/>
+                      <a:tailEnd type="none" w="sm" len="sm"/>
+                    </a:lnB>
+                  </a:tcPr>
+                </a:tc>
+                <a:tc>
+                  <a:txBody>
+                    <a:bodyPr/>
+                    <a:lstStyle/>
+                    <a:p>
+                      <a:pPr marL="0" marR="0" lvl="0" indent="0" algn="l" rtl="0">
+                        <a:spcBef>
+                          <a:spcPts val="0"/>
+                        </a:spcBef>
+                        <a:spcAft>
+                          <a:spcPts val="0"/>
+                        </a:spcAft>
+                        <a:buNone/>
+                      </a:pPr>
+                      <a:r>
+                        <a:rPr lang="en-US" sz="1800" u="none" strike="noStrike" cap="none" dirty="0"/>
+                        <a:t>1</a:t>
+                      </a:r>
+                      <a:endParaRPr sz="1800" u="none" strike="noStrike" cap="none" dirty="0"/>
+                    </a:p>
+                  </a:txBody>
+                  <a:tcPr marL="43100" marR="43100" marT="43100" marB="43100">
+                    <a:lnL w="9525" cap="flat" cmpd="sng">
+                      <a:solidFill>
+                        <a:srgbClr val="000000"/>
+                      </a:solidFill>
+                      <a:prstDash val="solid"/>
+                      <a:round/>
+                      <a:headEnd type="none" w="sm" len="sm"/>
+                      <a:tailEnd type="none" w="sm" len="sm"/>
+                    </a:lnL>
+                    <a:lnR w="9525" cap="flat" cmpd="sng">
+                      <a:solidFill>
+                        <a:srgbClr val="000000"/>
+                      </a:solidFill>
+                      <a:prstDash val="solid"/>
+                      <a:round/>
+                      <a:headEnd type="none" w="sm" len="sm"/>
+                      <a:tailEnd type="none" w="sm" len="sm"/>
+                    </a:lnR>
+                    <a:lnT w="9525" cap="flat" cmpd="sng">
+                      <a:solidFill>
+                        <a:srgbClr val="000000"/>
+                      </a:solidFill>
+                      <a:prstDash val="solid"/>
+                      <a:round/>
+                      <a:headEnd type="none" w="sm" len="sm"/>
+                      <a:tailEnd type="none" w="sm" len="sm"/>
+                    </a:lnT>
+                    <a:lnB w="9525" cap="flat" cmpd="sng">
+                      <a:solidFill>
+                        <a:srgbClr val="000000"/>
+                      </a:solidFill>
+                      <a:prstDash val="solid"/>
+                      <a:round/>
+                      <a:headEnd type="none" w="sm" len="sm"/>
+                      <a:tailEnd type="none" w="sm" len="sm"/>
+                    </a:lnB>
+                  </a:tcPr>
+                </a:tc>
+                <a:tc>
+                  <a:txBody>
+                    <a:bodyPr/>
+                    <a:lstStyle/>
+                    <a:p>
+                      <a:pPr marL="0" marR="0" lvl="0" indent="0" algn="l" rtl="0">
+                        <a:spcBef>
+                          <a:spcPts val="0"/>
+                        </a:spcBef>
+                        <a:spcAft>
+                          <a:spcPts val="0"/>
+                        </a:spcAft>
+                        <a:buNone/>
+                      </a:pPr>
+                      <a:r>
+                        <a:rPr lang="en-US" sz="1800" dirty="0"/>
+                        <a:t>3.75</a:t>
+                      </a:r>
+                      <a:endParaRPr sz="1800" b="0" i="0" u="none" strike="noStrike" cap="none" dirty="0">
+                        <a:solidFill>
+                          <a:srgbClr val="000000"/>
+                        </a:solidFill>
+                        <a:latin typeface="Arial"/>
+                        <a:ea typeface="Arial"/>
+                        <a:cs typeface="Arial"/>
+                        <a:sym typeface="Arial"/>
+                      </a:endParaRPr>
+                    </a:p>
+                  </a:txBody>
+                  <a:tcPr marL="43100" marR="43100" marT="43100" marB="43100">
+                    <a:lnL w="9525" cap="flat" cmpd="sng">
+                      <a:solidFill>
+                        <a:srgbClr val="000000"/>
+                      </a:solidFill>
+                      <a:prstDash val="solid"/>
+                      <a:round/>
+                      <a:headEnd type="none" w="sm" len="sm"/>
+                      <a:tailEnd type="none" w="sm" len="sm"/>
+                    </a:lnL>
+                    <a:lnR w="9525" cap="flat" cmpd="sng">
+                      <a:solidFill>
+                        <a:srgbClr val="000000"/>
+                      </a:solidFill>
+                      <a:prstDash val="solid"/>
+                      <a:round/>
+                      <a:headEnd type="none" w="sm" len="sm"/>
+                      <a:tailEnd type="none" w="sm" len="sm"/>
+                    </a:lnR>
+                    <a:lnT w="9525" cap="flat" cmpd="sng">
+                      <a:solidFill>
+                        <a:srgbClr val="000000"/>
+                      </a:solidFill>
+                      <a:prstDash val="solid"/>
+                      <a:round/>
+                      <a:headEnd type="none" w="sm" len="sm"/>
+                      <a:tailEnd type="none" w="sm" len="sm"/>
+                    </a:lnT>
+                    <a:lnB w="9525" cap="flat" cmpd="sng">
+                      <a:solidFill>
+                        <a:srgbClr val="000000"/>
+                      </a:solidFill>
+                      <a:prstDash val="solid"/>
+                      <a:round/>
+                      <a:headEnd type="none" w="sm" len="sm"/>
+                      <a:tailEnd type="none" w="sm" len="sm"/>
+                    </a:lnB>
+                  </a:tcPr>
+                </a:tc>
+                <a:tc>
+                  <a:txBody>
+                    <a:bodyPr/>
+                    <a:lstStyle/>
+                    <a:p>
+                      <a:pPr marL="0" marR="0" lvl="0" indent="0" algn="l" rtl="0">
+                        <a:spcBef>
+                          <a:spcPts val="0"/>
+                        </a:spcBef>
+                        <a:spcAft>
+                          <a:spcPts val="0"/>
+                        </a:spcAft>
+                        <a:buNone/>
+                      </a:pPr>
+                      <a:r>
+                        <a:rPr lang="en-US" sz="1800"/>
+                        <a:t>64</a:t>
+                      </a:r>
+                      <a:endParaRPr sz="1800" u="none" strike="noStrike" cap="none"/>
+                    </a:p>
+                  </a:txBody>
+                  <a:tcPr marL="43100" marR="43100" marT="43100" marB="43100">
+                    <a:lnL w="9525" cap="flat" cmpd="sng">
+                      <a:solidFill>
+                        <a:srgbClr val="000000"/>
+                      </a:solidFill>
+                      <a:prstDash val="solid"/>
+                      <a:round/>
+                      <a:headEnd type="none" w="sm" len="sm"/>
+                      <a:tailEnd type="none" w="sm" len="sm"/>
+                    </a:lnL>
+                    <a:lnR w="9525" cap="flat" cmpd="sng">
+                      <a:solidFill>
+                        <a:srgbClr val="000000"/>
+                      </a:solidFill>
+                      <a:prstDash val="solid"/>
+                      <a:round/>
+                      <a:headEnd type="none" w="sm" len="sm"/>
+                      <a:tailEnd type="none" w="sm" len="sm"/>
+                    </a:lnR>
+                    <a:lnT w="9525" cap="flat" cmpd="sng">
+                      <a:solidFill>
+                        <a:srgbClr val="000000"/>
+                      </a:solidFill>
+                      <a:prstDash val="solid"/>
+                      <a:round/>
+                      <a:headEnd type="none" w="sm" len="sm"/>
+                      <a:tailEnd type="none" w="sm" len="sm"/>
+                    </a:lnT>
+                    <a:lnB w="9525" cap="flat" cmpd="sng">
+                      <a:solidFill>
+                        <a:srgbClr val="000000"/>
+                      </a:solidFill>
+                      <a:prstDash val="solid"/>
+                      <a:round/>
+                      <a:headEnd type="none" w="sm" len="sm"/>
+                      <a:tailEnd type="none" w="sm" len="sm"/>
+                    </a:lnB>
+                  </a:tcPr>
+                </a:tc>
+                <a:tc>
+                  <a:txBody>
+                    <a:bodyPr/>
+                    <a:lstStyle/>
+                    <a:p>
+                      <a:pPr marL="0" marR="0" lvl="0" indent="0" algn="l" rtl="0">
+                        <a:spcBef>
+                          <a:spcPts val="0"/>
+                        </a:spcBef>
+                        <a:spcAft>
+                          <a:spcPts val="0"/>
+                        </a:spcAft>
+                        <a:buNone/>
+                      </a:pPr>
+                      <a:r>
+                        <a:rPr lang="en-US" sz="1800"/>
+                        <a:t>3</a:t>
+                      </a:r>
+                      <a:endParaRPr sz="1800" u="none" strike="noStrike" cap="none"/>
+                    </a:p>
+                  </a:txBody>
+                  <a:tcPr marL="43100" marR="43100" marT="43100" marB="43100">
+                    <a:lnL w="9525" cap="flat" cmpd="sng">
+                      <a:solidFill>
+                        <a:srgbClr val="000000"/>
+                      </a:solidFill>
+                      <a:prstDash val="solid"/>
+                      <a:round/>
+                      <a:headEnd type="none" w="sm" len="sm"/>
+                      <a:tailEnd type="none" w="sm" len="sm"/>
+                    </a:lnL>
+                    <a:lnR w="9525" cap="flat" cmpd="sng">
+                      <a:solidFill>
+                        <a:srgbClr val="000000"/>
+                      </a:solidFill>
+                      <a:prstDash val="solid"/>
+                      <a:round/>
+                      <a:headEnd type="none" w="sm" len="sm"/>
+                      <a:tailEnd type="none" w="sm" len="sm"/>
+                    </a:lnR>
+                    <a:lnT w="9525" cap="flat" cmpd="sng">
+                      <a:solidFill>
+                        <a:srgbClr val="000000"/>
+                      </a:solidFill>
+                      <a:prstDash val="solid"/>
+                      <a:round/>
+                      <a:headEnd type="none" w="sm" len="sm"/>
+                      <a:tailEnd type="none" w="sm" len="sm"/>
+                    </a:lnT>
+                    <a:lnB w="9525" cap="flat" cmpd="sng">
+                      <a:solidFill>
+                        <a:srgbClr val="000000"/>
+                      </a:solidFill>
+                      <a:prstDash val="solid"/>
+                      <a:round/>
+                      <a:headEnd type="none" w="sm" len="sm"/>
+                      <a:tailEnd type="none" w="sm" len="sm"/>
+                    </a:lnB>
+                  </a:tcPr>
+                </a:tc>
+                <a:extLst>
+                  <a:ext uri="{0D108BD9-81ED-4DB2-BD59-A6C34878D82A}">
+                    <a16:rowId xmlns:a16="http://schemas.microsoft.com/office/drawing/2014/main" val="10002"/>
+                  </a:ext>
+                </a:extLst>
+              </a:tr>
+              <a:tr h="347100">
+                <a:tc>
+                  <a:txBody>
+                    <a:bodyPr/>
+                    <a:lstStyle/>
+                    <a:p>
+                      <a:pPr marL="0" marR="0" lvl="0" indent="0" algn="l" rtl="0">
+                        <a:spcBef>
+                          <a:spcPts val="0"/>
+                        </a:spcBef>
+                        <a:spcAft>
+                          <a:spcPts val="0"/>
+                        </a:spcAft>
+                        <a:buNone/>
+                      </a:pPr>
+                      <a:r>
+                        <a:rPr lang="en-US" sz="1800" dirty="0"/>
+                        <a:t>atesting_a100</a:t>
+                      </a:r>
+                      <a:endParaRPr sz="1800" u="none" strike="noStrike" cap="none" dirty="0"/>
+                    </a:p>
+                  </a:txBody>
+                  <a:tcPr marL="43100" marR="43100" marT="43100" marB="43100">
+                    <a:lnL w="9525" cap="flat" cmpd="sng">
+                      <a:solidFill>
+                        <a:srgbClr val="000000"/>
+                      </a:solidFill>
+                      <a:prstDash val="solid"/>
+                      <a:round/>
+                      <a:headEnd type="none" w="sm" len="sm"/>
+                      <a:tailEnd type="none" w="sm" len="sm"/>
+                    </a:lnL>
+                    <a:lnR w="9525" cap="flat" cmpd="sng">
+                      <a:solidFill>
+                        <a:srgbClr val="000000"/>
+                      </a:solidFill>
+                      <a:prstDash val="solid"/>
+                      <a:round/>
+                      <a:headEnd type="none" w="sm" len="sm"/>
+                      <a:tailEnd type="none" w="sm" len="sm"/>
+                    </a:lnR>
+                    <a:lnT w="9525" cap="flat" cmpd="sng">
+                      <a:solidFill>
+                        <a:srgbClr val="000000"/>
+                      </a:solidFill>
+                      <a:prstDash val="solid"/>
+                      <a:round/>
+                      <a:headEnd type="none" w="sm" len="sm"/>
+                      <a:tailEnd type="none" w="sm" len="sm"/>
+                    </a:lnT>
+                    <a:lnB w="9525" cap="flat" cmpd="sng" algn="ctr">
+                      <a:solidFill>
+                        <a:srgbClr val="000000"/>
+                      </a:solidFill>
+                      <a:prstDash val="solid"/>
+                      <a:round/>
+                      <a:headEnd type="none" w="sm" len="sm"/>
+                      <a:tailEnd type="none" w="sm" len="sm"/>
+                    </a:lnB>
+                  </a:tcPr>
+                </a:tc>
+                <a:tc>
+                  <a:txBody>
+                    <a:bodyPr/>
+                    <a:lstStyle/>
+                    <a:p>
+                      <a:pPr marL="0" marR="0" lvl="0" indent="0" algn="l" rtl="0">
+                        <a:spcBef>
+                          <a:spcPts val="0"/>
+                        </a:spcBef>
+                        <a:spcAft>
+                          <a:spcPts val="0"/>
+                        </a:spcAft>
+                        <a:buNone/>
+                      </a:pPr>
+                      <a:r>
+                        <a:rPr lang="en-US" sz="1800" dirty="0"/>
+                        <a:t>GPU Node:</a:t>
+                      </a:r>
+                      <a:endParaRPr sz="1800" dirty="0"/>
+                    </a:p>
+                    <a:p>
+                      <a:pPr marL="0" marR="0" lvl="0" indent="0" algn="l" rtl="0">
+                        <a:spcBef>
+                          <a:spcPts val="0"/>
+                        </a:spcBef>
+                        <a:spcAft>
+                          <a:spcPts val="0"/>
+                        </a:spcAft>
+                        <a:buNone/>
+                      </a:pPr>
+                      <a:r>
+                        <a:rPr lang="en-US" sz="1800" dirty="0"/>
+                        <a:t>3x Nvidia A100</a:t>
+                      </a:r>
+                      <a:endParaRPr sz="1800" dirty="0"/>
+                    </a:p>
+                  </a:txBody>
+                  <a:tcPr marL="43100" marR="43100" marT="43100" marB="43100">
+                    <a:lnL w="9525" cap="flat" cmpd="sng">
+                      <a:solidFill>
+                        <a:srgbClr val="000000"/>
+                      </a:solidFill>
+                      <a:prstDash val="solid"/>
+                      <a:round/>
+                      <a:headEnd type="none" w="sm" len="sm"/>
+                      <a:tailEnd type="none" w="sm" len="sm"/>
+                    </a:lnL>
+                    <a:lnR w="9525" cap="flat" cmpd="sng">
+                      <a:solidFill>
+                        <a:srgbClr val="000000"/>
+                      </a:solidFill>
+                      <a:prstDash val="solid"/>
+                      <a:round/>
+                      <a:headEnd type="none" w="sm" len="sm"/>
+                      <a:tailEnd type="none" w="sm" len="sm"/>
+                    </a:lnR>
+                    <a:lnT w="9525" cap="flat" cmpd="sng">
+                      <a:solidFill>
+                        <a:srgbClr val="000000"/>
+                      </a:solidFill>
+                      <a:prstDash val="solid"/>
+                      <a:round/>
+                      <a:headEnd type="none" w="sm" len="sm"/>
+                      <a:tailEnd type="none" w="sm" len="sm"/>
+                    </a:lnT>
+                    <a:lnB w="9525" cap="flat" cmpd="sng" algn="ctr">
+                      <a:solidFill>
+                        <a:srgbClr val="000000"/>
+                      </a:solidFill>
+                      <a:prstDash val="solid"/>
+                      <a:round/>
+                      <a:headEnd type="none" w="sm" len="sm"/>
+                      <a:tailEnd type="none" w="sm" len="sm"/>
+                    </a:lnB>
+                  </a:tcPr>
+                </a:tc>
+                <a:tc>
+                  <a:txBody>
+                    <a:bodyPr/>
+                    <a:lstStyle/>
+                    <a:p>
+                      <a:pPr marL="0" marR="0" lvl="0" indent="0" algn="l" rtl="0">
+                        <a:spcBef>
+                          <a:spcPts val="0"/>
+                        </a:spcBef>
+                        <a:spcAft>
+                          <a:spcPts val="0"/>
+                        </a:spcAft>
+                        <a:buNone/>
+                      </a:pPr>
+                      <a:r>
+                        <a:rPr lang="en-US" sz="1800" u="none" strike="noStrike" cap="none" dirty="0"/>
+                        <a:t>1</a:t>
+                      </a:r>
+                      <a:endParaRPr sz="1800" u="none" strike="noStrike" cap="none" dirty="0"/>
+                    </a:p>
+                  </a:txBody>
+                  <a:tcPr marL="43100" marR="43100" marT="43100" marB="43100">
+                    <a:lnL w="9525" cap="flat" cmpd="sng">
+                      <a:solidFill>
+                        <a:srgbClr val="000000"/>
+                      </a:solidFill>
+                      <a:prstDash val="solid"/>
+                      <a:round/>
+                      <a:headEnd type="none" w="sm" len="sm"/>
+                      <a:tailEnd type="none" w="sm" len="sm"/>
+                    </a:lnL>
+                    <a:lnR w="9525" cap="flat" cmpd="sng">
+                      <a:solidFill>
+                        <a:srgbClr val="000000"/>
+                      </a:solidFill>
+                      <a:prstDash val="solid"/>
+                      <a:round/>
+                      <a:headEnd type="none" w="sm" len="sm"/>
+                      <a:tailEnd type="none" w="sm" len="sm"/>
+                    </a:lnR>
+                    <a:lnT w="9525" cap="flat" cmpd="sng">
+                      <a:solidFill>
+                        <a:srgbClr val="000000"/>
+                      </a:solidFill>
+                      <a:prstDash val="solid"/>
+                      <a:round/>
+                      <a:headEnd type="none" w="sm" len="sm"/>
+                      <a:tailEnd type="none" w="sm" len="sm"/>
+                    </a:lnT>
+                    <a:lnB w="9525" cap="flat" cmpd="sng" algn="ctr">
+                      <a:solidFill>
+                        <a:srgbClr val="000000"/>
+                      </a:solidFill>
+                      <a:prstDash val="solid"/>
+                      <a:round/>
+                      <a:headEnd type="none" w="sm" len="sm"/>
+                      <a:tailEnd type="none" w="sm" len="sm"/>
+                    </a:lnB>
+                  </a:tcPr>
+                </a:tc>
+                <a:tc>
+                  <a:txBody>
+                    <a:bodyPr/>
+                    <a:lstStyle/>
+                    <a:p>
+                      <a:pPr marL="0" marR="0" lvl="0" indent="0" algn="l" rtl="0">
+                        <a:spcBef>
+                          <a:spcPts val="0"/>
+                        </a:spcBef>
+                        <a:spcAft>
+                          <a:spcPts val="0"/>
+                        </a:spcAft>
+                        <a:buNone/>
+                      </a:pPr>
+                      <a:r>
+                        <a:rPr lang="en-US" sz="1800" dirty="0"/>
+                        <a:t>3.75</a:t>
+                      </a:r>
+                      <a:endParaRPr sz="1800" b="0" i="0" u="none" strike="noStrike" cap="none" dirty="0">
+                        <a:solidFill>
+                          <a:srgbClr val="000000"/>
+                        </a:solidFill>
+                        <a:latin typeface="Arial"/>
+                        <a:ea typeface="Arial"/>
+                        <a:cs typeface="Arial"/>
+                        <a:sym typeface="Arial"/>
+                      </a:endParaRPr>
+                    </a:p>
+                  </a:txBody>
+                  <a:tcPr marL="43100" marR="43100" marT="43100" marB="43100">
+                    <a:lnL w="9525" cap="flat" cmpd="sng">
+                      <a:solidFill>
+                        <a:srgbClr val="000000"/>
+                      </a:solidFill>
+                      <a:prstDash val="solid"/>
+                      <a:round/>
+                      <a:headEnd type="none" w="sm" len="sm"/>
+                      <a:tailEnd type="none" w="sm" len="sm"/>
+                    </a:lnL>
+                    <a:lnR w="9525" cap="flat" cmpd="sng">
+                      <a:solidFill>
+                        <a:srgbClr val="000000"/>
+                      </a:solidFill>
+                      <a:prstDash val="solid"/>
+                      <a:round/>
+                      <a:headEnd type="none" w="sm" len="sm"/>
+                      <a:tailEnd type="none" w="sm" len="sm"/>
+                    </a:lnR>
+                    <a:lnT w="9525" cap="flat" cmpd="sng">
+                      <a:solidFill>
+                        <a:srgbClr val="000000"/>
+                      </a:solidFill>
+                      <a:prstDash val="solid"/>
+                      <a:round/>
+                      <a:headEnd type="none" w="sm" len="sm"/>
+                      <a:tailEnd type="none" w="sm" len="sm"/>
+                    </a:lnT>
+                    <a:lnB w="9525" cap="flat" cmpd="sng" algn="ctr">
+                      <a:solidFill>
+                        <a:srgbClr val="000000"/>
+                      </a:solidFill>
+                      <a:prstDash val="solid"/>
+                      <a:round/>
+                      <a:headEnd type="none" w="sm" len="sm"/>
+                      <a:tailEnd type="none" w="sm" len="sm"/>
+                    </a:lnB>
+                  </a:tcPr>
+                </a:tc>
+                <a:tc>
+                  <a:txBody>
+                    <a:bodyPr/>
+                    <a:lstStyle/>
+                    <a:p>
+                      <a:pPr marL="0" marR="0" lvl="0" indent="0" algn="l" rtl="0">
+                        <a:spcBef>
+                          <a:spcPts val="0"/>
+                        </a:spcBef>
+                        <a:spcAft>
+                          <a:spcPts val="0"/>
+                        </a:spcAft>
+                        <a:buNone/>
+                      </a:pPr>
+                      <a:r>
+                        <a:rPr lang="en-US" sz="1800" dirty="0"/>
+                        <a:t>64</a:t>
+                      </a:r>
+                      <a:endParaRPr sz="1800" u="none" strike="noStrike" cap="none" dirty="0"/>
+                    </a:p>
+                  </a:txBody>
+                  <a:tcPr marL="43100" marR="43100" marT="43100" marB="43100">
+                    <a:lnL w="9525" cap="flat" cmpd="sng">
+                      <a:solidFill>
+                        <a:srgbClr val="000000"/>
+                      </a:solidFill>
+                      <a:prstDash val="solid"/>
+                      <a:round/>
+                      <a:headEnd type="none" w="sm" len="sm"/>
+                      <a:tailEnd type="none" w="sm" len="sm"/>
+                    </a:lnL>
+                    <a:lnR w="9525" cap="flat" cmpd="sng">
+                      <a:solidFill>
+                        <a:srgbClr val="000000"/>
+                      </a:solidFill>
+                      <a:prstDash val="solid"/>
+                      <a:round/>
+                      <a:headEnd type="none" w="sm" len="sm"/>
+                      <a:tailEnd type="none" w="sm" len="sm"/>
+                    </a:lnR>
+                    <a:lnT w="9525" cap="flat" cmpd="sng">
+                      <a:solidFill>
+                        <a:srgbClr val="000000"/>
+                      </a:solidFill>
+                      <a:prstDash val="solid"/>
+                      <a:round/>
+                      <a:headEnd type="none" w="sm" len="sm"/>
+                      <a:tailEnd type="none" w="sm" len="sm"/>
+                    </a:lnT>
+                    <a:lnB w="9525" cap="flat" cmpd="sng" algn="ctr">
+                      <a:solidFill>
+                        <a:srgbClr val="000000"/>
+                      </a:solidFill>
+                      <a:prstDash val="solid"/>
+                      <a:round/>
+                      <a:headEnd type="none" w="sm" len="sm"/>
+                      <a:tailEnd type="none" w="sm" len="sm"/>
+                    </a:lnB>
+                  </a:tcPr>
+                </a:tc>
+                <a:tc>
+                  <a:txBody>
+                    <a:bodyPr/>
+                    <a:lstStyle/>
+                    <a:p>
+                      <a:pPr marL="0" marR="0" lvl="0" indent="0" algn="l" rtl="0">
+                        <a:spcBef>
+                          <a:spcPts val="0"/>
+                        </a:spcBef>
+                        <a:spcAft>
+                          <a:spcPts val="0"/>
+                        </a:spcAft>
+                        <a:buNone/>
+                      </a:pPr>
+                      <a:r>
+                        <a:rPr lang="en-US" sz="1800" u="none" strike="noStrike" cap="none" dirty="0"/>
+                        <a:t>6 MIG instances</a:t>
+                      </a:r>
+                      <a:endParaRPr sz="1800" u="none" strike="noStrike" cap="none" dirty="0"/>
+                    </a:p>
+                  </a:txBody>
+                  <a:tcPr marL="43100" marR="43100" marT="43100" marB="43100">
+                    <a:lnL w="9525" cap="flat" cmpd="sng">
+                      <a:solidFill>
+                        <a:srgbClr val="000000"/>
+                      </a:solidFill>
+                      <a:prstDash val="solid"/>
+                      <a:round/>
+                      <a:headEnd type="none" w="sm" len="sm"/>
+                      <a:tailEnd type="none" w="sm" len="sm"/>
+                    </a:lnL>
+                    <a:lnR w="9525" cap="flat" cmpd="sng">
+                      <a:solidFill>
+                        <a:srgbClr val="000000"/>
+                      </a:solidFill>
+                      <a:prstDash val="solid"/>
+                      <a:round/>
+                      <a:headEnd type="none" w="sm" len="sm"/>
+                      <a:tailEnd type="none" w="sm" len="sm"/>
+                    </a:lnR>
+                    <a:lnT w="9525" cap="flat" cmpd="sng">
+                      <a:solidFill>
+                        <a:srgbClr val="000000"/>
+                      </a:solidFill>
+                      <a:prstDash val="solid"/>
+                      <a:round/>
+                      <a:headEnd type="none" w="sm" len="sm"/>
+                      <a:tailEnd type="none" w="sm" len="sm"/>
+                    </a:lnT>
+                    <a:lnB w="9525" cap="flat" cmpd="sng" algn="ctr">
+                      <a:solidFill>
+                        <a:srgbClr val="000000"/>
+                      </a:solidFill>
+                      <a:prstDash val="solid"/>
+                      <a:round/>
+                      <a:headEnd type="none" w="sm" len="sm"/>
+                      <a:tailEnd type="none" w="sm" len="sm"/>
+                    </a:lnB>
+                  </a:tcPr>
+                </a:tc>
+                <a:extLst>
+                  <a:ext uri="{0D108BD9-81ED-4DB2-BD59-A6C34878D82A}">
+                    <a16:rowId xmlns:a16="http://schemas.microsoft.com/office/drawing/2014/main" val="10003"/>
+                  </a:ext>
+                </a:extLst>
+              </a:tr>
+            </a:tbl>
+          </a:graphicData>
+        </a:graphic>
+      </p:graphicFrame>
+    </p:spTree>
+    <p:extLst>
+      <p:ext uri="{BB962C8B-B14F-4D97-AF65-F5344CB8AC3E}">
+        <p14:creationId xmlns:p14="http://schemas.microsoft.com/office/powerpoint/2010/main" val="415197255"/>
+      </p:ext>
+    </p:extLst>
+  </p:cSld>
+  <p:clrMapOvr>
+    <a:masterClrMapping/>
+  </p:clrMapOvr>
+</p:sld>
+</file>
+
+<file path=ppt/slides/slide14.xml><?xml version="1.0" encoding="utf-8"?>
+<p:sld xmlns:a="http://schemas.openxmlformats.org/drawingml/2006/main" xmlns:r="http://schemas.openxmlformats.org/officeDocument/2006/relationships" xmlns:p="http://schemas.openxmlformats.org/presentationml/2006/main">
+  <p:cSld>
+    <p:spTree>
+      <p:nvGrpSpPr>
         <p:cNvPr id="1" name=""/>
         <p:cNvGrpSpPr/>
         <p:nvPr/>
@@ -5186,7 +7451,7 @@
             <a:pPr algn="ctr"/>
             <a:r>
               <a:rPr lang="en-US"/>
-              <a:t>8/14/24</a:t>
+              <a:t>1/9/25</a:t>
             </a:r>
           </a:p>
         </p:txBody>
@@ -5214,7 +7479,7 @@
           <a:p>
             <a:fld id="{ABDA560F-461C-6043-9BC4-489BA92F7161}" type="slidenum">
               <a:rPr lang="en-US" smtClean="0"/>
-              <a:t>13</a:t>
+              <a:t>14</a:t>
             </a:fld>
             <a:endParaRPr lang="en-US"/>
           </a:p>
@@ -5233,14 +7498,14 @@
           <p:nvPr>
             <p:extLst>
               <p:ext uri="{D42A27DB-BD31-4B8C-83A1-F6EECF244321}">
-                <p14:modId xmlns:p14="http://schemas.microsoft.com/office/powerpoint/2010/main" val="2903609493"/>
+                <p14:modId xmlns:p14="http://schemas.microsoft.com/office/powerpoint/2010/main" val="2423258061"/>
               </p:ext>
             </p:extLst>
           </p:nvPr>
         </p:nvGraphicFramePr>
         <p:xfrm>
-          <a:off x="1351606" y="3324225"/>
-          <a:ext cx="9488788" cy="2656039"/>
+          <a:off x="838200" y="3137262"/>
+          <a:ext cx="10204937" cy="2986080"/>
         </p:xfrm>
         <a:graphic>
           <a:graphicData uri="http://schemas.openxmlformats.org/drawingml/2006/table">
@@ -5249,35 +7514,35 @@
                 <a:noFill/>
               </a:tblPr>
               <a:tblGrid>
-                <a:gridCol w="1230261">
+                <a:gridCol w="1323113">
                   <a:extLst>
                     <a:ext uri="{9D8B030D-6E8A-4147-A177-3AD203B41FA5}">
                       <a16:colId xmlns:a16="http://schemas.microsoft.com/office/drawing/2014/main" val="20000"/>
                     </a:ext>
                   </a:extLst>
                 </a:gridCol>
-                <a:gridCol w="2620801">
+                <a:gridCol w="2818602">
                   <a:extLst>
                     <a:ext uri="{9D8B030D-6E8A-4147-A177-3AD203B41FA5}">
                       <a16:colId xmlns:a16="http://schemas.microsoft.com/office/drawing/2014/main" val="20001"/>
                     </a:ext>
                   </a:extLst>
                 </a:gridCol>
-                <a:gridCol w="1673936">
+                <a:gridCol w="1800273">
                   <a:extLst>
                     <a:ext uri="{9D8B030D-6E8A-4147-A177-3AD203B41FA5}">
                       <a16:colId xmlns:a16="http://schemas.microsoft.com/office/drawing/2014/main" val="20002"/>
                     </a:ext>
                   </a:extLst>
                 </a:gridCol>
-                <a:gridCol w="1821577">
+                <a:gridCol w="1959057">
                   <a:extLst>
                     <a:ext uri="{9D8B030D-6E8A-4147-A177-3AD203B41FA5}">
                       <a16:colId xmlns:a16="http://schemas.microsoft.com/office/drawing/2014/main" val="20003"/>
                     </a:ext>
                   </a:extLst>
                 </a:gridCol>
-                <a:gridCol w="2142213">
+                <a:gridCol w="2303892">
                   <a:extLst>
                     <a:ext uri="{9D8B030D-6E8A-4147-A177-3AD203B41FA5}">
                       <a16:colId xmlns:a16="http://schemas.microsoft.com/office/drawing/2014/main" val="20004"/>
@@ -5285,7 +7550,7 @@
                   </a:extLst>
                 </a:gridCol>
               </a:tblGrid>
-              <a:tr h="424541">
+              <a:tr h="357112">
                 <a:tc>
                   <a:txBody>
                     <a:bodyPr/>
@@ -5657,7 +7922,7 @@
                   </a:ext>
                 </a:extLst>
               </a:tr>
-              <a:tr h="424541">
+              <a:tr h="357112">
                 <a:tc>
                   <a:txBody>
                     <a:bodyPr/>
@@ -6029,7 +8294,7 @@
                   </a:ext>
                 </a:extLst>
               </a:tr>
-              <a:tr h="747576">
+              <a:tr h="628839">
                 <a:tc>
                   <a:txBody>
                     <a:bodyPr/>
@@ -6401,7 +8666,7 @@
                   </a:ext>
                 </a:extLst>
               </a:tr>
-              <a:tr h="424541">
+              <a:tr h="357112">
                 <a:tc>
                   <a:txBody>
                     <a:bodyPr/>
@@ -6758,7 +9023,7 @@
                   </a:ext>
                 </a:extLst>
               </a:tr>
-              <a:tr h="424541">
+              <a:tr h="563026">
                 <a:tc>
                   <a:txBody>
                     <a:bodyPr/>
@@ -6818,7 +9083,7 @@
                       <a:headEnd type="none" w="sm" len="sm"/>
                       <a:tailEnd type="none" w="sm" len="sm"/>
                     </a:lnT>
-                    <a:lnB w="9525" cap="flat" cmpd="sng">
+                    <a:lnB w="9525" cap="flat" cmpd="sng" algn="ctr">
                       <a:solidFill>
                         <a:srgbClr val="000000"/>
                       </a:solidFill>
@@ -6888,7 +9153,7 @@
                       <a:headEnd type="none" w="sm" len="sm"/>
                       <a:tailEnd type="none" w="sm" len="sm"/>
                     </a:lnT>
-                    <a:lnB w="9525" cap="flat" cmpd="sng">
+                    <a:lnB w="9525" cap="flat" cmpd="sng" algn="ctr">
                       <a:solidFill>
                         <a:srgbClr val="000000"/>
                       </a:solidFill>
@@ -6958,7 +9223,7 @@
                       <a:headEnd type="none" w="sm" len="sm"/>
                       <a:tailEnd type="none" w="sm" len="sm"/>
                     </a:lnT>
-                    <a:lnB w="9525" cap="flat" cmpd="sng">
+                    <a:lnB w="9525" cap="flat" cmpd="sng" algn="ctr">
                       <a:solidFill>
                         <a:srgbClr val="000000"/>
                       </a:solidFill>
@@ -7028,7 +9293,7 @@
                       <a:headEnd type="none" w="sm" len="sm"/>
                       <a:tailEnd type="none" w="sm" len="sm"/>
                     </a:lnT>
-                    <a:lnB w="9525" cap="flat" cmpd="sng">
+                    <a:lnB w="9525" cap="flat" cmpd="sng" algn="ctr">
                       <a:solidFill>
                         <a:srgbClr val="000000"/>
                       </a:solidFill>
@@ -7098,7 +9363,7 @@
                       <a:headEnd type="none" w="sm" len="sm"/>
                       <a:tailEnd type="none" w="sm" len="sm"/>
                     </a:lnT>
-                    <a:lnB w="9525" cap="flat" cmpd="sng">
+                    <a:lnB w="9525" cap="flat" cmpd="sng" algn="ctr">
                       <a:solidFill>
                         <a:srgbClr val="000000"/>
                       </a:solidFill>
@@ -7112,6 +9377,363 @@
                 <a:extLst>
                   <a:ext uri="{0D108BD9-81ED-4DB2-BD59-A6C34878D82A}">
                     <a16:rowId xmlns:a16="http://schemas.microsoft.com/office/drawing/2014/main" val="3058480231"/>
+                  </a:ext>
+                </a:extLst>
+              </a:tr>
+              <a:tr h="563026">
+                <a:tc>
+                  <a:txBody>
+                    <a:bodyPr/>
+                    <a:lstStyle/>
+                    <a:p>
+                      <a:pPr marL="0" marR="0" lvl="0" indent="0" algn="l" rtl="0">
+                        <a:spcBef>
+                          <a:spcPts val="0"/>
+                        </a:spcBef>
+                        <a:spcAft>
+                          <a:spcPts val="0"/>
+                        </a:spcAft>
+                        <a:buNone/>
+                      </a:pPr>
+                      <a:r>
+                        <a:rPr lang="en-US" sz="1800" u="none" strike="noStrike" cap="none" dirty="0">
+                          <a:latin typeface="Arial"/>
+                          <a:ea typeface="Arial"/>
+                          <a:cs typeface="Arial"/>
+                          <a:sym typeface="Arial"/>
+                        </a:rPr>
+                        <a:t>compile</a:t>
+                      </a:r>
+                      <a:endParaRPr sz="1800" u="none" strike="noStrike" cap="none" dirty="0">
+                        <a:latin typeface="Arial"/>
+                        <a:ea typeface="Arial"/>
+                        <a:cs typeface="Arial"/>
+                        <a:sym typeface="Arial"/>
+                      </a:endParaRPr>
+                    </a:p>
+                  </a:txBody>
+                  <a:tcPr marL="43100" marR="43100" marT="43100" marB="43100">
+                    <a:lnL w="9525" cap="flat" cmpd="sng">
+                      <a:solidFill>
+                        <a:srgbClr val="000000"/>
+                      </a:solidFill>
+                      <a:prstDash val="solid"/>
+                      <a:round/>
+                      <a:headEnd type="none" w="sm" len="sm"/>
+                      <a:tailEnd type="none" w="sm" len="sm"/>
+                    </a:lnL>
+                    <a:lnR w="9525" cap="flat" cmpd="sng" algn="ctr">
+                      <a:solidFill>
+                        <a:srgbClr val="000000"/>
+                      </a:solidFill>
+                      <a:prstDash val="solid"/>
+                      <a:round/>
+                      <a:headEnd type="none" w="sm" len="sm"/>
+                      <a:tailEnd type="none" w="sm" len="sm"/>
+                    </a:lnR>
+                    <a:lnT w="9525" cap="flat" cmpd="sng">
+                      <a:solidFill>
+                        <a:srgbClr val="000000"/>
+                      </a:solidFill>
+                      <a:prstDash val="solid"/>
+                      <a:round/>
+                      <a:headEnd type="none" w="sm" len="sm"/>
+                      <a:tailEnd type="none" w="sm" len="sm"/>
+                    </a:lnT>
+                    <a:lnB w="9525" cap="flat" cmpd="sng">
+                      <a:solidFill>
+                        <a:srgbClr val="000000"/>
+                      </a:solidFill>
+                      <a:prstDash val="solid"/>
+                      <a:round/>
+                      <a:headEnd type="none" w="sm" len="sm"/>
+                      <a:tailEnd type="none" w="sm" len="sm"/>
+                    </a:lnB>
+                  </a:tcPr>
+                </a:tc>
+                <a:tc>
+                  <a:txBody>
+                    <a:bodyPr/>
+                    <a:lstStyle/>
+                    <a:p>
+                      <a:pPr marL="0" marR="0" lvl="0" indent="0" algn="l" rtl="0">
+                        <a:spcBef>
+                          <a:spcPts val="0"/>
+                        </a:spcBef>
+                        <a:spcAft>
+                          <a:spcPts val="0"/>
+                        </a:spcAft>
+                        <a:buNone/>
+                      </a:pPr>
+                      <a:r>
+                        <a:rPr lang="en-US" sz="1800" u="none" strike="noStrike" cap="none" dirty="0">
+                          <a:latin typeface="Arial"/>
+                          <a:ea typeface="Arial"/>
+                          <a:cs typeface="Arial"/>
+                          <a:sym typeface="Arial"/>
+                        </a:rPr>
+                        <a:t>For jobs submitted to compile partition</a:t>
+                      </a:r>
+                      <a:endParaRPr sz="1800" u="none" strike="noStrike" cap="none" dirty="0">
+                        <a:latin typeface="Arial"/>
+                        <a:ea typeface="Arial"/>
+                        <a:cs typeface="Arial"/>
+                        <a:sym typeface="Arial"/>
+                      </a:endParaRPr>
+                    </a:p>
+                  </a:txBody>
+                  <a:tcPr marL="43100" marR="43100" marT="43100" marB="43100">
+                    <a:lnL w="9525" cap="flat" cmpd="sng" algn="ctr">
+                      <a:solidFill>
+                        <a:srgbClr val="000000"/>
+                      </a:solidFill>
+                      <a:prstDash val="solid"/>
+                      <a:round/>
+                      <a:headEnd type="none" w="sm" len="sm"/>
+                      <a:tailEnd type="none" w="sm" len="sm"/>
+                    </a:lnL>
+                    <a:lnR w="9525" cap="flat" cmpd="sng" algn="ctr">
+                      <a:solidFill>
+                        <a:srgbClr val="000000"/>
+                      </a:solidFill>
+                      <a:prstDash val="solid"/>
+                      <a:round/>
+                      <a:headEnd type="none" w="sm" len="sm"/>
+                      <a:tailEnd type="none" w="sm" len="sm"/>
+                    </a:lnR>
+                    <a:lnT w="9525" cap="flat" cmpd="sng">
+                      <a:solidFill>
+                        <a:srgbClr val="000000"/>
+                      </a:solidFill>
+                      <a:prstDash val="solid"/>
+                      <a:round/>
+                      <a:headEnd type="none" w="sm" len="sm"/>
+                      <a:tailEnd type="none" w="sm" len="sm"/>
+                    </a:lnT>
+                    <a:lnB w="9525" cap="flat" cmpd="sng">
+                      <a:solidFill>
+                        <a:srgbClr val="000000"/>
+                      </a:solidFill>
+                      <a:prstDash val="solid"/>
+                      <a:round/>
+                      <a:headEnd type="none" w="sm" len="sm"/>
+                      <a:tailEnd type="none" w="sm" len="sm"/>
+                    </a:lnB>
+                  </a:tcPr>
+                </a:tc>
+                <a:tc>
+                  <a:txBody>
+                    <a:bodyPr/>
+                    <a:lstStyle/>
+                    <a:p>
+                      <a:pPr marL="0" marR="0" lvl="0" indent="0" algn="l" rtl="0">
+                        <a:spcBef>
+                          <a:spcPts val="0"/>
+                        </a:spcBef>
+                        <a:spcAft>
+                          <a:spcPts val="0"/>
+                        </a:spcAft>
+                        <a:buNone/>
+                      </a:pPr>
+                      <a:r>
+                        <a:rPr lang="en-US" sz="1800" u="none" strike="noStrike" cap="none" dirty="0">
+                          <a:latin typeface="Arial"/>
+                          <a:ea typeface="Arial"/>
+                          <a:cs typeface="Arial"/>
+                          <a:sym typeface="Arial"/>
+                        </a:rPr>
+                        <a:t>12 H</a:t>
+                      </a:r>
+                      <a:endParaRPr sz="1800" u="none" strike="noStrike" cap="none" dirty="0">
+                        <a:latin typeface="Arial"/>
+                        <a:ea typeface="Arial"/>
+                        <a:cs typeface="Arial"/>
+                        <a:sym typeface="Arial"/>
+                      </a:endParaRPr>
+                    </a:p>
+                  </a:txBody>
+                  <a:tcPr marL="43100" marR="43100" marT="43100" marB="43100">
+                    <a:lnL w="9525" cap="flat" cmpd="sng" algn="ctr">
+                      <a:solidFill>
+                        <a:srgbClr val="000000"/>
+                      </a:solidFill>
+                      <a:prstDash val="solid"/>
+                      <a:round/>
+                      <a:headEnd type="none" w="sm" len="sm"/>
+                      <a:tailEnd type="none" w="sm" len="sm"/>
+                    </a:lnL>
+                    <a:lnR w="9525" cap="flat" cmpd="sng" algn="ctr">
+                      <a:solidFill>
+                        <a:srgbClr val="000000"/>
+                      </a:solidFill>
+                      <a:prstDash val="solid"/>
+                      <a:round/>
+                      <a:headEnd type="none" w="sm" len="sm"/>
+                      <a:tailEnd type="none" w="sm" len="sm"/>
+                    </a:lnR>
+                    <a:lnT w="9525" cap="flat" cmpd="sng">
+                      <a:solidFill>
+                        <a:srgbClr val="000000"/>
+                      </a:solidFill>
+                      <a:prstDash val="solid"/>
+                      <a:round/>
+                      <a:headEnd type="none" w="sm" len="sm"/>
+                      <a:tailEnd type="none" w="sm" len="sm"/>
+                    </a:lnT>
+                    <a:lnB w="9525" cap="flat" cmpd="sng">
+                      <a:solidFill>
+                        <a:srgbClr val="000000"/>
+                      </a:solidFill>
+                      <a:prstDash val="solid"/>
+                      <a:round/>
+                      <a:headEnd type="none" w="sm" len="sm"/>
+                      <a:tailEnd type="none" w="sm" len="sm"/>
+                    </a:lnB>
+                  </a:tcPr>
+                </a:tc>
+                <a:tc>
+                  <a:txBody>
+                    <a:bodyPr/>
+                    <a:lstStyle/>
+                    <a:p>
+                      <a:pPr marL="0" marR="0" lvl="0" indent="0" algn="l" rtl="0">
+                        <a:spcBef>
+                          <a:spcPts val="0"/>
+                        </a:spcBef>
+                        <a:spcAft>
+                          <a:spcPts val="0"/>
+                        </a:spcAft>
+                        <a:buNone/>
+                      </a:pPr>
+                      <a:r>
+                        <a:rPr lang="en-US" sz="1800" u="none" strike="noStrike" cap="none" dirty="0">
+                          <a:latin typeface="Arial"/>
+                          <a:ea typeface="Arial"/>
+                          <a:cs typeface="Arial"/>
+                          <a:sym typeface="Arial"/>
+                        </a:rPr>
+                        <a:t>1</a:t>
+                      </a:r>
+                      <a:endParaRPr sz="1800" u="none" strike="noStrike" cap="none" dirty="0">
+                        <a:latin typeface="Arial"/>
+                        <a:ea typeface="Arial"/>
+                        <a:cs typeface="Arial"/>
+                        <a:sym typeface="Arial"/>
+                      </a:endParaRPr>
+                    </a:p>
+                  </a:txBody>
+                  <a:tcPr marL="43100" marR="43100" marT="43100" marB="43100">
+                    <a:lnL w="9525" cap="flat" cmpd="sng" algn="ctr">
+                      <a:solidFill>
+                        <a:srgbClr val="000000"/>
+                      </a:solidFill>
+                      <a:prstDash val="solid"/>
+                      <a:round/>
+                      <a:headEnd type="none" w="sm" len="sm"/>
+                      <a:tailEnd type="none" w="sm" len="sm"/>
+                    </a:lnL>
+                    <a:lnR w="9525" cap="flat" cmpd="sng" algn="ctr">
+                      <a:solidFill>
+                        <a:srgbClr val="000000"/>
+                      </a:solidFill>
+                      <a:prstDash val="solid"/>
+                      <a:round/>
+                      <a:headEnd type="none" w="sm" len="sm"/>
+                      <a:tailEnd type="none" w="sm" len="sm"/>
+                    </a:lnR>
+                    <a:lnT w="9525" cap="flat" cmpd="sng">
+                      <a:solidFill>
+                        <a:srgbClr val="000000"/>
+                      </a:solidFill>
+                      <a:prstDash val="solid"/>
+                      <a:round/>
+                      <a:headEnd type="none" w="sm" len="sm"/>
+                      <a:tailEnd type="none" w="sm" len="sm"/>
+                    </a:lnT>
+                    <a:lnB w="9525" cap="flat" cmpd="sng">
+                      <a:solidFill>
+                        <a:srgbClr val="000000"/>
+                      </a:solidFill>
+                      <a:prstDash val="solid"/>
+                      <a:round/>
+                      <a:headEnd type="none" w="sm" len="sm"/>
+                      <a:tailEnd type="none" w="sm" len="sm"/>
+                    </a:lnB>
+                  </a:tcPr>
+                </a:tc>
+                <a:tc>
+                  <a:txBody>
+                    <a:bodyPr/>
+                    <a:lstStyle/>
+                    <a:p>
+                      <a:pPr marL="0" marR="0" lvl="0" indent="0" algn="l" rtl="0">
+                        <a:spcBef>
+                          <a:spcPts val="0"/>
+                        </a:spcBef>
+                        <a:spcAft>
+                          <a:spcPts val="0"/>
+                        </a:spcAft>
+                        <a:buNone/>
+                      </a:pPr>
+                      <a:r>
+                        <a:rPr lang="en-US" sz="1800" u="none" strike="noStrike" cap="none" dirty="0">
+                          <a:latin typeface="Arial"/>
+                          <a:ea typeface="Arial"/>
+                          <a:cs typeface="Arial"/>
+                          <a:sym typeface="Arial"/>
+                        </a:rPr>
+                        <a:t>n/a</a:t>
+                      </a:r>
+                      <a:endParaRPr sz="1800" u="none" strike="noStrike" cap="none" dirty="0">
+                        <a:latin typeface="Arial"/>
+                        <a:ea typeface="Arial"/>
+                        <a:cs typeface="Arial"/>
+                        <a:sym typeface="Arial"/>
+                      </a:endParaRPr>
+                    </a:p>
+                  </a:txBody>
+                  <a:tcPr marL="43100" marR="43100" marT="43100" marB="43100">
+                    <a:lnL w="9525" cap="flat" cmpd="sng" algn="ctr">
+                      <a:solidFill>
+                        <a:srgbClr val="000000"/>
+                      </a:solidFill>
+                      <a:prstDash val="solid"/>
+                      <a:round/>
+                      <a:headEnd type="none" w="sm" len="sm"/>
+                      <a:tailEnd type="none" w="sm" len="sm"/>
+                    </a:lnL>
+                    <a:lnR w="9525" cap="flat" cmpd="sng">
+                      <a:solidFill>
+                        <a:srgbClr val="000000"/>
+                      </a:solidFill>
+                      <a:prstDash val="solid"/>
+                      <a:round/>
+                      <a:headEnd type="none" w="sm" len="sm"/>
+                      <a:tailEnd type="none" w="sm" len="sm"/>
+                    </a:lnR>
+                    <a:lnT w="9525" cap="flat" cmpd="sng">
+                      <a:solidFill>
+                        <a:srgbClr val="000000"/>
+                      </a:solidFill>
+                      <a:prstDash val="solid"/>
+                      <a:round/>
+                      <a:headEnd type="none" w="sm" len="sm"/>
+                      <a:tailEnd type="none" w="sm" len="sm"/>
+                    </a:lnT>
+                    <a:lnB w="9525" cap="flat" cmpd="sng">
+                      <a:solidFill>
+                        <a:srgbClr val="000000"/>
+                      </a:solidFill>
+                      <a:prstDash val="solid"/>
+                      <a:round/>
+                      <a:headEnd type="none" w="sm" len="sm"/>
+                      <a:tailEnd type="none" w="sm" len="sm"/>
+                    </a:lnB>
+                  </a:tcPr>
+                </a:tc>
+                <a:extLst>
+                  <a:ext uri="{0D108BD9-81ED-4DB2-BD59-A6C34878D82A}">
+                    <a16:rowId xmlns:a16="http://schemas.microsoft.com/office/drawing/2014/main" val="4022593831"/>
                   </a:ext>
                 </a:extLst>
               </a:tr>
@@ -7132,7 +9754,7 @@
 </p:sld>
 </file>
 
-<file path=ppt/slides/slide14.xml><?xml version="1.0" encoding="utf-8"?>
+<file path=ppt/slides/slide15.xml><?xml version="1.0" encoding="utf-8"?>
 <p:sld xmlns:a="http://schemas.openxmlformats.org/drawingml/2006/main" xmlns:r="http://schemas.openxmlformats.org/officeDocument/2006/relationships" xmlns:p="http://schemas.openxmlformats.org/presentationml/2006/main">
   <p:cSld>
     <p:spTree>
@@ -7304,7 +9926,7 @@
             <a:pPr algn="ctr"/>
             <a:r>
               <a:rPr lang="en-US"/>
-              <a:t>8/14/24</a:t>
+              <a:t>1/9/25</a:t>
             </a:r>
           </a:p>
         </p:txBody>
@@ -7332,7 +9954,7 @@
           <a:p>
             <a:fld id="{ABDA560F-461C-6043-9BC4-489BA92F7161}" type="slidenum">
               <a:rPr lang="en-US" smtClean="0"/>
-              <a:t>14</a:t>
+              <a:t>15</a:t>
             </a:fld>
             <a:endParaRPr lang="en-US"/>
           </a:p>
@@ -7351,7 +9973,7 @@
 </p:sld>
 </file>
 
-<file path=ppt/slides/slide15.xml><?xml version="1.0" encoding="utf-8"?>
+<file path=ppt/slides/slide16.xml><?xml version="1.0" encoding="utf-8"?>
 <p:sld xmlns:a="http://schemas.openxmlformats.org/drawingml/2006/main" xmlns:r="http://schemas.openxmlformats.org/officeDocument/2006/relationships" xmlns:p="http://schemas.openxmlformats.org/presentationml/2006/main">
   <p:cSld>
     <p:spTree>
@@ -7426,7 +10048,7 @@
             <a:pPr algn="ctr"/>
             <a:r>
               <a:rPr lang="en-US"/>
-              <a:t>8/14/24</a:t>
+              <a:t>1/9/25</a:t>
             </a:r>
           </a:p>
         </p:txBody>
@@ -7454,7 +10076,7 @@
           <a:p>
             <a:fld id="{ABDA560F-461C-6043-9BC4-489BA92F7161}" type="slidenum">
               <a:rPr lang="en-US" smtClean="0"/>
-              <a:t>15</a:t>
+              <a:t>16</a:t>
             </a:fld>
             <a:endParaRPr lang="en-US"/>
           </a:p>
@@ -7806,7 +10428,7 @@
 </p:sld>
 </file>
 
-<file path=ppt/slides/slide16.xml><?xml version="1.0" encoding="utf-8"?>
+<file path=ppt/slides/slide17.xml><?xml version="1.0" encoding="utf-8"?>
 <p:sld xmlns:a="http://schemas.openxmlformats.org/drawingml/2006/main" xmlns:r="http://schemas.openxmlformats.org/officeDocument/2006/relationships" xmlns:p="http://schemas.openxmlformats.org/presentationml/2006/main">
   <p:cSld>
     <p:spTree>
@@ -7934,7 +10556,7 @@
             <a:pPr algn="ctr"/>
             <a:r>
               <a:rPr lang="en-US"/>
-              <a:t>8/14/24</a:t>
+              <a:t>1/9/25</a:t>
             </a:r>
           </a:p>
         </p:txBody>
@@ -7962,7 +10584,7 @@
           <a:p>
             <a:fld id="{ABDA560F-461C-6043-9BC4-489BA92F7161}" type="slidenum">
               <a:rPr lang="en-US" smtClean="0"/>
-              <a:t>16</a:t>
+              <a:t>17</a:t>
             </a:fld>
             <a:endParaRPr lang="en-US"/>
           </a:p>
@@ -7981,7 +10603,7 @@
 </p:sld>
 </file>
 
-<file path=ppt/slides/slide17.xml><?xml version="1.0" encoding="utf-8"?>
+<file path=ppt/slides/slide18.xml><?xml version="1.0" encoding="utf-8"?>
 <p:sld xmlns:a="http://schemas.openxmlformats.org/drawingml/2006/main" xmlns:r="http://schemas.openxmlformats.org/officeDocument/2006/relationships" xmlns:p="http://schemas.openxmlformats.org/presentationml/2006/main">
   <p:cSld>
     <p:spTree>
@@ -8050,7 +10672,7 @@
             <a:pPr algn="ctr"/>
             <a:r>
               <a:rPr lang="en-US"/>
-              <a:t>8/14/24</a:t>
+              <a:t>1/9/25</a:t>
             </a:r>
           </a:p>
         </p:txBody>
@@ -8078,7 +10700,7 @@
           <a:p>
             <a:fld id="{ABDA560F-461C-6043-9BC4-489BA92F7161}" type="slidenum">
               <a:rPr lang="en-US" smtClean="0"/>
-              <a:t>17</a:t>
+              <a:t>18</a:t>
             </a:fld>
             <a:endParaRPr lang="en-US"/>
           </a:p>
@@ -8639,7 +11261,7 @@
 </p:sld>
 </file>
 
-<file path=ppt/slides/slide18.xml><?xml version="1.0" encoding="utf-8"?>
+<file path=ppt/slides/slide19.xml><?xml version="1.0" encoding="utf-8"?>
 <p:sld xmlns:a="http://schemas.openxmlformats.org/drawingml/2006/main" xmlns:r="http://schemas.openxmlformats.org/officeDocument/2006/relationships" xmlns:p="http://schemas.openxmlformats.org/presentationml/2006/main">
   <p:cSld>
     <p:spTree>
@@ -8778,7 +11400,7 @@
             <a:pPr algn="ctr"/>
             <a:r>
               <a:rPr lang="en-US"/>
-              <a:t>8/14/24</a:t>
+              <a:t>1/9/25</a:t>
             </a:r>
           </a:p>
         </p:txBody>
@@ -8806,7 +11428,7 @@
           <a:p>
             <a:fld id="{ABDA560F-461C-6043-9BC4-489BA92F7161}" type="slidenum">
               <a:rPr lang="en-US" smtClean="0"/>
-              <a:t>18</a:t>
+              <a:t>19</a:t>
             </a:fld>
             <a:endParaRPr lang="en-US"/>
           </a:p>
@@ -9052,346 +11674,6 @@
     <p:extLst>
       <p:ext uri="{BB962C8B-B14F-4D97-AF65-F5344CB8AC3E}">
         <p14:creationId xmlns:p14="http://schemas.microsoft.com/office/powerpoint/2010/main" val="2223687286"/>
-      </p:ext>
-    </p:extLst>
-  </p:cSld>
-  <p:clrMapOvr>
-    <a:masterClrMapping/>
-  </p:clrMapOvr>
-</p:sld>
-</file>
-
-<file path=ppt/slides/slide19.xml><?xml version="1.0" encoding="utf-8"?>
-<p:sld xmlns:a="http://schemas.openxmlformats.org/drawingml/2006/main" xmlns:r="http://schemas.openxmlformats.org/officeDocument/2006/relationships" xmlns:p="http://schemas.openxmlformats.org/presentationml/2006/main">
-  <p:cSld>
-    <p:spTree>
-      <p:nvGrpSpPr>
-        <p:cNvPr id="1" name=""/>
-        <p:cNvGrpSpPr/>
-        <p:nvPr/>
-      </p:nvGrpSpPr>
-      <p:grpSpPr>
-        <a:xfrm>
-          <a:off x="0" y="0"/>
-          <a:ext cx="0" cy="0"/>
-          <a:chOff x="0" y="0"/>
-          <a:chExt cx="0" cy="0"/>
-        </a:xfrm>
-      </p:grpSpPr>
-      <p:sp>
-        <p:nvSpPr>
-          <p:cNvPr id="2" name="Title 1">
-            <a:extLst>
-              <a:ext uri="{FF2B5EF4-FFF2-40B4-BE49-F238E27FC236}">
-                <a16:creationId xmlns:a16="http://schemas.microsoft.com/office/drawing/2014/main" id="{2C40115A-840C-5AF8-2E78-FBF510397E59}"/>
-              </a:ext>
-            </a:extLst>
-          </p:cNvPr>
-          <p:cNvSpPr>
-            <a:spLocks noGrp="1"/>
-          </p:cNvSpPr>
-          <p:nvPr>
-            <p:ph type="title"/>
-          </p:nvPr>
-        </p:nvSpPr>
-        <p:spPr/>
-        <p:txBody>
-          <a:bodyPr/>
-          <a:lstStyle/>
-          <a:p>
-            <a:r>
-              <a:rPr lang="en-US" dirty="0"/>
-              <a:t>Job output</a:t>
-            </a:r>
-          </a:p>
-        </p:txBody>
-      </p:sp>
-      <p:sp>
-        <p:nvSpPr>
-          <p:cNvPr id="3" name="Content Placeholder 2">
-            <a:extLst>
-              <a:ext uri="{FF2B5EF4-FFF2-40B4-BE49-F238E27FC236}">
-                <a16:creationId xmlns:a16="http://schemas.microsoft.com/office/drawing/2014/main" id="{AE7BEDD6-7036-93C6-793A-10B1A333CE33}"/>
-              </a:ext>
-            </a:extLst>
-          </p:cNvPr>
-          <p:cNvSpPr>
-            <a:spLocks noGrp="1"/>
-          </p:cNvSpPr>
-          <p:nvPr>
-            <p:ph idx="1"/>
-          </p:nvPr>
-        </p:nvSpPr>
-        <p:spPr>
-          <a:xfrm>
-            <a:off x="838200" y="2101849"/>
-            <a:ext cx="10515600" cy="3203575"/>
-          </a:xfrm>
-        </p:spPr>
-        <p:txBody>
-          <a:bodyPr/>
-          <a:lstStyle/>
-          <a:p>
-            <a:pPr marL="228600" marR="0" lvl="0" indent="-222250" algn="l" rtl="0">
-              <a:lnSpc>
-                <a:spcPct val="90000"/>
-              </a:lnSpc>
-              <a:spcBef>
-                <a:spcPts val="0"/>
-              </a:spcBef>
-              <a:spcAft>
-                <a:spcPts val="0"/>
-              </a:spcAft>
-              <a:buClr>
-                <a:schemeClr val="dk1"/>
-              </a:buClr>
-              <a:buSzPts val="2700"/>
-              <a:buChar char="•"/>
-            </a:pPr>
-            <a:r>
-              <a:rPr lang="en-US" sz="2700" dirty="0">
-                <a:solidFill>
-                  <a:schemeClr val="dk1"/>
-                </a:solidFill>
-              </a:rPr>
-              <a:t>Once a job completes its execution, the standard output of the script will be redirected to an output file.</a:t>
-            </a:r>
-            <a:endParaRPr lang="en-US" sz="1300" dirty="0"/>
-          </a:p>
-          <a:p>
-            <a:pPr marL="685800" marR="0" lvl="1" indent="-335915" algn="l" rtl="0">
-              <a:lnSpc>
-                <a:spcPct val="90000"/>
-              </a:lnSpc>
-              <a:spcBef>
-                <a:spcPts val="500"/>
-              </a:spcBef>
-              <a:spcAft>
-                <a:spcPts val="0"/>
-              </a:spcAft>
-              <a:buClr>
-                <a:schemeClr val="dk1"/>
-              </a:buClr>
-              <a:buSzPts val="2300"/>
-              <a:buChar char="•"/>
-            </a:pPr>
-            <a:r>
-              <a:rPr lang="en-US" sz="2300" i="0" u="none" strike="noStrike" cap="none" dirty="0">
-                <a:solidFill>
-                  <a:schemeClr val="dk1"/>
-                </a:solidFill>
-              </a:rPr>
-              <a:t>Great for debugging!</a:t>
-            </a:r>
-            <a:endParaRPr lang="en-US" sz="1300" dirty="0"/>
-          </a:p>
-          <a:p>
-            <a:pPr marL="685800" marR="0" lvl="1" indent="-335915" algn="l" rtl="0">
-              <a:lnSpc>
-                <a:spcPct val="90000"/>
-              </a:lnSpc>
-              <a:spcBef>
-                <a:spcPts val="500"/>
-              </a:spcBef>
-              <a:spcAft>
-                <a:spcPts val="0"/>
-              </a:spcAft>
-              <a:buClr>
-                <a:schemeClr val="dk1"/>
-              </a:buClr>
-              <a:buSzPts val="2300"/>
-              <a:buChar char="•"/>
-            </a:pPr>
-            <a:r>
-              <a:rPr lang="en-US" sz="2300" i="0" u="none" strike="noStrike" cap="none" dirty="0">
-                <a:solidFill>
-                  <a:schemeClr val="dk1"/>
-                </a:solidFill>
-              </a:rPr>
-              <a:t>Could be different from output generated by your application</a:t>
-            </a:r>
-            <a:endParaRPr lang="en-US" sz="1300" dirty="0"/>
-          </a:p>
-          <a:p>
-            <a:pPr marL="685800" marR="0" lvl="1" indent="-335915" algn="l" rtl="0">
-              <a:lnSpc>
-                <a:spcPct val="90000"/>
-              </a:lnSpc>
-              <a:spcBef>
-                <a:spcPts val="500"/>
-              </a:spcBef>
-              <a:spcAft>
-                <a:spcPts val="0"/>
-              </a:spcAft>
-              <a:buClr>
-                <a:schemeClr val="dk1"/>
-              </a:buClr>
-              <a:buSzPts val="2300"/>
-              <a:buChar char="•"/>
-            </a:pPr>
-            <a:r>
-              <a:rPr lang="en-US" sz="2300" i="0" u="none" strike="noStrike" cap="none" dirty="0">
-                <a:solidFill>
-                  <a:schemeClr val="dk1"/>
-                </a:solidFill>
-              </a:rPr>
-              <a:t>File is created in directory job was run unless specified in your </a:t>
-            </a:r>
-            <a:br>
-              <a:rPr lang="en-US" sz="2300" i="0" u="none" strike="noStrike" cap="none" dirty="0">
-                <a:solidFill>
-                  <a:schemeClr val="dk1"/>
-                </a:solidFill>
-              </a:rPr>
-            </a:br>
-            <a:r>
-              <a:rPr lang="en-US" sz="2300" i="0" u="none" strike="noStrike" cap="none" dirty="0">
-                <a:solidFill>
-                  <a:srgbClr val="0070C0"/>
-                </a:solidFill>
-              </a:rPr>
-              <a:t>--output </a:t>
-            </a:r>
-            <a:r>
-              <a:rPr lang="en-US" sz="2300" i="0" u="none" strike="noStrike" cap="none" dirty="0">
-                <a:solidFill>
-                  <a:schemeClr val="dk1"/>
-                </a:solidFill>
-              </a:rPr>
-              <a:t>directive.</a:t>
-            </a:r>
-            <a:endParaRPr lang="en-US" sz="1300" dirty="0"/>
-          </a:p>
-          <a:p>
-            <a:pPr marL="685800" marR="0" lvl="1" indent="-335915" algn="l" rtl="0">
-              <a:lnSpc>
-                <a:spcPct val="90000"/>
-              </a:lnSpc>
-              <a:spcBef>
-                <a:spcPts val="500"/>
-              </a:spcBef>
-              <a:spcAft>
-                <a:spcPts val="0"/>
-              </a:spcAft>
-              <a:buClr>
-                <a:schemeClr val="dk1"/>
-              </a:buClr>
-              <a:buSzPts val="2300"/>
-              <a:buChar char="•"/>
-            </a:pPr>
-            <a:r>
-              <a:rPr lang="en-US" sz="2300" i="0" u="none" strike="noStrike" cap="none" dirty="0">
-                <a:solidFill>
-                  <a:schemeClr val="dk1"/>
-                </a:solidFill>
-              </a:rPr>
-              <a:t>If the </a:t>
-            </a:r>
-            <a:r>
-              <a:rPr lang="en-US" sz="2300" i="0" u="none" strike="noStrike" cap="none" dirty="0">
-                <a:solidFill>
-                  <a:srgbClr val="000000"/>
-                </a:solidFill>
-              </a:rPr>
-              <a:t>directive </a:t>
-            </a:r>
-            <a:r>
-              <a:rPr lang="en-US" sz="2300" i="0" u="none" strike="noStrike" cap="none" dirty="0">
-                <a:solidFill>
-                  <a:srgbClr val="0070C0"/>
-                </a:solidFill>
-              </a:rPr>
-              <a:t>--output </a:t>
-            </a:r>
-            <a:r>
-              <a:rPr lang="en-US" sz="2300" i="0" u="none" strike="noStrike" cap="none" dirty="0">
-                <a:solidFill>
-                  <a:schemeClr val="dk1"/>
-                </a:solidFill>
-              </a:rPr>
-              <a:t>is not provided, then a generic file name will be used (</a:t>
-            </a:r>
-            <a:r>
-              <a:rPr lang="en-US" sz="2300" i="0" u="none" strike="noStrike" cap="none" dirty="0" err="1">
-                <a:solidFill>
-                  <a:schemeClr val="dk1"/>
-                </a:solidFill>
-              </a:rPr>
-              <a:t>slurm_xxxxxx.out</a:t>
-            </a:r>
-            <a:r>
-              <a:rPr lang="en-US" sz="2300" i="0" u="none" strike="noStrike" cap="none" dirty="0">
-                <a:solidFill>
-                  <a:schemeClr val="dk1"/>
-                </a:solidFill>
-              </a:rPr>
-              <a:t>).</a:t>
-            </a:r>
-          </a:p>
-        </p:txBody>
-      </p:sp>
-      <p:sp>
-        <p:nvSpPr>
-          <p:cNvPr id="4" name="Date Placeholder 3">
-            <a:extLst>
-              <a:ext uri="{FF2B5EF4-FFF2-40B4-BE49-F238E27FC236}">
-                <a16:creationId xmlns:a16="http://schemas.microsoft.com/office/drawing/2014/main" id="{17555D82-6283-7363-24EF-7EDA92D09849}"/>
-              </a:ext>
-            </a:extLst>
-          </p:cNvPr>
-          <p:cNvSpPr>
-            <a:spLocks noGrp="1"/>
-          </p:cNvSpPr>
-          <p:nvPr>
-            <p:ph type="dt" sz="half" idx="10"/>
-          </p:nvPr>
-        </p:nvSpPr>
-        <p:spPr/>
-        <p:txBody>
-          <a:bodyPr/>
-          <a:lstStyle/>
-          <a:p>
-            <a:pPr algn="ctr"/>
-            <a:r>
-              <a:rPr lang="en-US"/>
-              <a:t>8/14/24</a:t>
-            </a:r>
-          </a:p>
-        </p:txBody>
-      </p:sp>
-      <p:sp>
-        <p:nvSpPr>
-          <p:cNvPr id="5" name="Slide Number Placeholder 4">
-            <a:extLst>
-              <a:ext uri="{FF2B5EF4-FFF2-40B4-BE49-F238E27FC236}">
-                <a16:creationId xmlns:a16="http://schemas.microsoft.com/office/drawing/2014/main" id="{1F50737D-66FA-C703-124B-F9796C11B486}"/>
-              </a:ext>
-            </a:extLst>
-          </p:cNvPr>
-          <p:cNvSpPr>
-            <a:spLocks noGrp="1"/>
-          </p:cNvSpPr>
-          <p:nvPr>
-            <p:ph type="sldNum" sz="quarter" idx="12"/>
-          </p:nvPr>
-        </p:nvSpPr>
-        <p:spPr/>
-        <p:txBody>
-          <a:bodyPr/>
-          <a:lstStyle/>
-          <a:p>
-            <a:fld id="{ABDA560F-461C-6043-9BC4-489BA92F7161}" type="slidenum">
-              <a:rPr lang="en-US" smtClean="0"/>
-              <a:t>19</a:t>
-            </a:fld>
-            <a:endParaRPr lang="en-US"/>
-          </a:p>
-        </p:txBody>
-      </p:sp>
-    </p:spTree>
-    <p:extLst>
-      <p:ext uri="{BB962C8B-B14F-4D97-AF65-F5344CB8AC3E}">
-        <p14:creationId xmlns:p14="http://schemas.microsoft.com/office/powerpoint/2010/main" val="3742081296"/>
       </p:ext>
     </p:extLst>
   </p:cSld>
@@ -9442,7 +11724,7 @@
             <a:pPr algn="ctr"/>
             <a:r>
               <a:rPr lang="en-US"/>
-              <a:t>8/14/24</a:t>
+              <a:t>1/9/25</a:t>
             </a:r>
             <a:endParaRPr lang="en-US" dirty="0"/>
           </a:p>
@@ -9616,6 +11898,346 @@
           <p:cNvPr id="2" name="Title 1">
             <a:extLst>
               <a:ext uri="{FF2B5EF4-FFF2-40B4-BE49-F238E27FC236}">
+                <a16:creationId xmlns:a16="http://schemas.microsoft.com/office/drawing/2014/main" id="{2C40115A-840C-5AF8-2E78-FBF510397E59}"/>
+              </a:ext>
+            </a:extLst>
+          </p:cNvPr>
+          <p:cNvSpPr>
+            <a:spLocks noGrp="1"/>
+          </p:cNvSpPr>
+          <p:nvPr>
+            <p:ph type="title"/>
+          </p:nvPr>
+        </p:nvSpPr>
+        <p:spPr/>
+        <p:txBody>
+          <a:bodyPr/>
+          <a:lstStyle/>
+          <a:p>
+            <a:r>
+              <a:rPr lang="en-US" dirty="0"/>
+              <a:t>Job output</a:t>
+            </a:r>
+          </a:p>
+        </p:txBody>
+      </p:sp>
+      <p:sp>
+        <p:nvSpPr>
+          <p:cNvPr id="3" name="Content Placeholder 2">
+            <a:extLst>
+              <a:ext uri="{FF2B5EF4-FFF2-40B4-BE49-F238E27FC236}">
+                <a16:creationId xmlns:a16="http://schemas.microsoft.com/office/drawing/2014/main" id="{AE7BEDD6-7036-93C6-793A-10B1A333CE33}"/>
+              </a:ext>
+            </a:extLst>
+          </p:cNvPr>
+          <p:cNvSpPr>
+            <a:spLocks noGrp="1"/>
+          </p:cNvSpPr>
+          <p:nvPr>
+            <p:ph idx="1"/>
+          </p:nvPr>
+        </p:nvSpPr>
+        <p:spPr>
+          <a:xfrm>
+            <a:off x="838200" y="2101849"/>
+            <a:ext cx="10515600" cy="3203575"/>
+          </a:xfrm>
+        </p:spPr>
+        <p:txBody>
+          <a:bodyPr/>
+          <a:lstStyle/>
+          <a:p>
+            <a:pPr marL="228600" marR="0" lvl="0" indent="-222250" algn="l" rtl="0">
+              <a:lnSpc>
+                <a:spcPct val="90000"/>
+              </a:lnSpc>
+              <a:spcBef>
+                <a:spcPts val="0"/>
+              </a:spcBef>
+              <a:spcAft>
+                <a:spcPts val="0"/>
+              </a:spcAft>
+              <a:buClr>
+                <a:schemeClr val="dk1"/>
+              </a:buClr>
+              <a:buSzPts val="2700"/>
+              <a:buChar char="•"/>
+            </a:pPr>
+            <a:r>
+              <a:rPr lang="en-US" sz="2700" dirty="0">
+                <a:solidFill>
+                  <a:schemeClr val="dk1"/>
+                </a:solidFill>
+              </a:rPr>
+              <a:t>Once a job completes its execution, the standard output of the script will be redirected to an output file.</a:t>
+            </a:r>
+            <a:endParaRPr lang="en-US" sz="1300" dirty="0"/>
+          </a:p>
+          <a:p>
+            <a:pPr marL="685800" marR="0" lvl="1" indent="-335915" algn="l" rtl="0">
+              <a:lnSpc>
+                <a:spcPct val="90000"/>
+              </a:lnSpc>
+              <a:spcBef>
+                <a:spcPts val="500"/>
+              </a:spcBef>
+              <a:spcAft>
+                <a:spcPts val="0"/>
+              </a:spcAft>
+              <a:buClr>
+                <a:schemeClr val="dk1"/>
+              </a:buClr>
+              <a:buSzPts val="2300"/>
+              <a:buChar char="•"/>
+            </a:pPr>
+            <a:r>
+              <a:rPr lang="en-US" sz="2300" i="0" u="none" strike="noStrike" cap="none" dirty="0">
+                <a:solidFill>
+                  <a:schemeClr val="dk1"/>
+                </a:solidFill>
+              </a:rPr>
+              <a:t>Great for debugging!</a:t>
+            </a:r>
+            <a:endParaRPr lang="en-US" sz="1300" dirty="0"/>
+          </a:p>
+          <a:p>
+            <a:pPr marL="685800" marR="0" lvl="1" indent="-335915" algn="l" rtl="0">
+              <a:lnSpc>
+                <a:spcPct val="90000"/>
+              </a:lnSpc>
+              <a:spcBef>
+                <a:spcPts val="500"/>
+              </a:spcBef>
+              <a:spcAft>
+                <a:spcPts val="0"/>
+              </a:spcAft>
+              <a:buClr>
+                <a:schemeClr val="dk1"/>
+              </a:buClr>
+              <a:buSzPts val="2300"/>
+              <a:buChar char="•"/>
+            </a:pPr>
+            <a:r>
+              <a:rPr lang="en-US" sz="2300" i="0" u="none" strike="noStrike" cap="none" dirty="0">
+                <a:solidFill>
+                  <a:schemeClr val="dk1"/>
+                </a:solidFill>
+              </a:rPr>
+              <a:t>Could be different from output generated by your application</a:t>
+            </a:r>
+            <a:endParaRPr lang="en-US" sz="1300" dirty="0"/>
+          </a:p>
+          <a:p>
+            <a:pPr marL="685800" marR="0" lvl="1" indent="-335915" algn="l" rtl="0">
+              <a:lnSpc>
+                <a:spcPct val="90000"/>
+              </a:lnSpc>
+              <a:spcBef>
+                <a:spcPts val="500"/>
+              </a:spcBef>
+              <a:spcAft>
+                <a:spcPts val="0"/>
+              </a:spcAft>
+              <a:buClr>
+                <a:schemeClr val="dk1"/>
+              </a:buClr>
+              <a:buSzPts val="2300"/>
+              <a:buChar char="•"/>
+            </a:pPr>
+            <a:r>
+              <a:rPr lang="en-US" sz="2300" i="0" u="none" strike="noStrike" cap="none" dirty="0">
+                <a:solidFill>
+                  <a:schemeClr val="dk1"/>
+                </a:solidFill>
+              </a:rPr>
+              <a:t>File is created in directory job was run unless specified in your </a:t>
+            </a:r>
+            <a:br>
+              <a:rPr lang="en-US" sz="2300" i="0" u="none" strike="noStrike" cap="none" dirty="0">
+                <a:solidFill>
+                  <a:schemeClr val="dk1"/>
+                </a:solidFill>
+              </a:rPr>
+            </a:br>
+            <a:r>
+              <a:rPr lang="en-US" sz="2300" i="0" u="none" strike="noStrike" cap="none" dirty="0">
+                <a:solidFill>
+                  <a:srgbClr val="0070C0"/>
+                </a:solidFill>
+              </a:rPr>
+              <a:t>--output </a:t>
+            </a:r>
+            <a:r>
+              <a:rPr lang="en-US" sz="2300" i="0" u="none" strike="noStrike" cap="none" dirty="0">
+                <a:solidFill>
+                  <a:schemeClr val="dk1"/>
+                </a:solidFill>
+              </a:rPr>
+              <a:t>directive.</a:t>
+            </a:r>
+            <a:endParaRPr lang="en-US" sz="1300" dirty="0"/>
+          </a:p>
+          <a:p>
+            <a:pPr marL="685800" marR="0" lvl="1" indent="-335915" algn="l" rtl="0">
+              <a:lnSpc>
+                <a:spcPct val="90000"/>
+              </a:lnSpc>
+              <a:spcBef>
+                <a:spcPts val="500"/>
+              </a:spcBef>
+              <a:spcAft>
+                <a:spcPts val="0"/>
+              </a:spcAft>
+              <a:buClr>
+                <a:schemeClr val="dk1"/>
+              </a:buClr>
+              <a:buSzPts val="2300"/>
+              <a:buChar char="•"/>
+            </a:pPr>
+            <a:r>
+              <a:rPr lang="en-US" sz="2300" i="0" u="none" strike="noStrike" cap="none" dirty="0">
+                <a:solidFill>
+                  <a:schemeClr val="dk1"/>
+                </a:solidFill>
+              </a:rPr>
+              <a:t>If the </a:t>
+            </a:r>
+            <a:r>
+              <a:rPr lang="en-US" sz="2300" i="0" u="none" strike="noStrike" cap="none" dirty="0">
+                <a:solidFill>
+                  <a:srgbClr val="000000"/>
+                </a:solidFill>
+              </a:rPr>
+              <a:t>directive </a:t>
+            </a:r>
+            <a:r>
+              <a:rPr lang="en-US" sz="2300" i="0" u="none" strike="noStrike" cap="none" dirty="0">
+                <a:solidFill>
+                  <a:srgbClr val="0070C0"/>
+                </a:solidFill>
+              </a:rPr>
+              <a:t>--output </a:t>
+            </a:r>
+            <a:r>
+              <a:rPr lang="en-US" sz="2300" i="0" u="none" strike="noStrike" cap="none" dirty="0">
+                <a:solidFill>
+                  <a:schemeClr val="dk1"/>
+                </a:solidFill>
+              </a:rPr>
+              <a:t>is not provided, then a generic file name will be used (</a:t>
+            </a:r>
+            <a:r>
+              <a:rPr lang="en-US" sz="2300" i="0" u="none" strike="noStrike" cap="none" dirty="0" err="1">
+                <a:solidFill>
+                  <a:schemeClr val="dk1"/>
+                </a:solidFill>
+              </a:rPr>
+              <a:t>slurm_xxxxxx.out</a:t>
+            </a:r>
+            <a:r>
+              <a:rPr lang="en-US" sz="2300" i="0" u="none" strike="noStrike" cap="none" dirty="0">
+                <a:solidFill>
+                  <a:schemeClr val="dk1"/>
+                </a:solidFill>
+              </a:rPr>
+              <a:t>).</a:t>
+            </a:r>
+          </a:p>
+        </p:txBody>
+      </p:sp>
+      <p:sp>
+        <p:nvSpPr>
+          <p:cNvPr id="4" name="Date Placeholder 3">
+            <a:extLst>
+              <a:ext uri="{FF2B5EF4-FFF2-40B4-BE49-F238E27FC236}">
+                <a16:creationId xmlns:a16="http://schemas.microsoft.com/office/drawing/2014/main" id="{17555D82-6283-7363-24EF-7EDA92D09849}"/>
+              </a:ext>
+            </a:extLst>
+          </p:cNvPr>
+          <p:cNvSpPr>
+            <a:spLocks noGrp="1"/>
+          </p:cNvSpPr>
+          <p:nvPr>
+            <p:ph type="dt" sz="half" idx="10"/>
+          </p:nvPr>
+        </p:nvSpPr>
+        <p:spPr/>
+        <p:txBody>
+          <a:bodyPr/>
+          <a:lstStyle/>
+          <a:p>
+            <a:pPr algn="ctr"/>
+            <a:r>
+              <a:rPr lang="en-US"/>
+              <a:t>1/9/25</a:t>
+            </a:r>
+          </a:p>
+        </p:txBody>
+      </p:sp>
+      <p:sp>
+        <p:nvSpPr>
+          <p:cNvPr id="5" name="Slide Number Placeholder 4">
+            <a:extLst>
+              <a:ext uri="{FF2B5EF4-FFF2-40B4-BE49-F238E27FC236}">
+                <a16:creationId xmlns:a16="http://schemas.microsoft.com/office/drawing/2014/main" id="{1F50737D-66FA-C703-124B-F9796C11B486}"/>
+              </a:ext>
+            </a:extLst>
+          </p:cNvPr>
+          <p:cNvSpPr>
+            <a:spLocks noGrp="1"/>
+          </p:cNvSpPr>
+          <p:nvPr>
+            <p:ph type="sldNum" sz="quarter" idx="12"/>
+          </p:nvPr>
+        </p:nvSpPr>
+        <p:spPr/>
+        <p:txBody>
+          <a:bodyPr/>
+          <a:lstStyle/>
+          <a:p>
+            <a:fld id="{ABDA560F-461C-6043-9BC4-489BA92F7161}" type="slidenum">
+              <a:rPr lang="en-US" smtClean="0"/>
+              <a:t>20</a:t>
+            </a:fld>
+            <a:endParaRPr lang="en-US"/>
+          </a:p>
+        </p:txBody>
+      </p:sp>
+    </p:spTree>
+    <p:extLst>
+      <p:ext uri="{BB962C8B-B14F-4D97-AF65-F5344CB8AC3E}">
+        <p14:creationId xmlns:p14="http://schemas.microsoft.com/office/powerpoint/2010/main" val="3742081296"/>
+      </p:ext>
+    </p:extLst>
+  </p:cSld>
+  <p:clrMapOvr>
+    <a:masterClrMapping/>
+  </p:clrMapOvr>
+</p:sld>
+</file>
+
+<file path=ppt/slides/slide21.xml><?xml version="1.0" encoding="utf-8"?>
+<p:sld xmlns:a="http://schemas.openxmlformats.org/drawingml/2006/main" xmlns:r="http://schemas.openxmlformats.org/officeDocument/2006/relationships" xmlns:p="http://schemas.openxmlformats.org/presentationml/2006/main">
+  <p:cSld>
+    <p:spTree>
+      <p:nvGrpSpPr>
+        <p:cNvPr id="1" name=""/>
+        <p:cNvGrpSpPr/>
+        <p:nvPr/>
+      </p:nvGrpSpPr>
+      <p:grpSpPr>
+        <a:xfrm>
+          <a:off x="0" y="0"/>
+          <a:ext cx="0" cy="0"/>
+          <a:chOff x="0" y="0"/>
+          <a:chExt cx="0" cy="0"/>
+        </a:xfrm>
+      </p:grpSpPr>
+      <p:sp>
+        <p:nvSpPr>
+          <p:cNvPr id="2" name="Title 1">
+            <a:extLst>
+              <a:ext uri="{FF2B5EF4-FFF2-40B4-BE49-F238E27FC236}">
                 <a16:creationId xmlns:a16="http://schemas.microsoft.com/office/drawing/2014/main" id="{F5275463-50BF-24AF-3C10-D30FBDDEC803}"/>
               </a:ext>
             </a:extLst>
@@ -9668,9 +12290,10 @@
           <a:p>
             <a:pPr algn="ctr"/>
             <a:r>
-              <a:rPr lang="en-US" dirty="0"/>
-              <a:t>8/14/24</a:t>
-            </a:r>
+              <a:rPr lang="en-US"/>
+              <a:t>1/9/25</a:t>
+            </a:r>
+            <a:endParaRPr lang="en-US" dirty="0"/>
           </a:p>
         </p:txBody>
       </p:sp>
@@ -9697,7 +12320,7 @@
           <a:p>
             <a:fld id="{ABDA560F-461C-6043-9BC4-489BA92F7161}" type="slidenum">
               <a:rPr lang="en-US" smtClean="0"/>
-              <a:t>20</a:t>
+              <a:t>21</a:t>
             </a:fld>
             <a:endParaRPr lang="en-US"/>
           </a:p>
@@ -10293,7 +12916,7 @@
 </p:sld>
 </file>
 
-<file path=ppt/slides/slide21.xml><?xml version="1.0" encoding="utf-8"?>
+<file path=ppt/slides/slide22.xml><?xml version="1.0" encoding="utf-8"?>
 <p:sld xmlns:a="http://schemas.openxmlformats.org/drawingml/2006/main" xmlns:r="http://schemas.openxmlformats.org/officeDocument/2006/relationships" xmlns:p="http://schemas.openxmlformats.org/presentationml/2006/main">
   <p:cSld>
     <p:spTree>
@@ -10459,7 +13082,7 @@
             <a:pPr algn="ctr"/>
             <a:r>
               <a:rPr lang="en-US"/>
-              <a:t>8/14/24</a:t>
+              <a:t>1/9/25</a:t>
             </a:r>
           </a:p>
         </p:txBody>
@@ -10487,7 +13110,7 @@
           <a:p>
             <a:fld id="{ABDA560F-461C-6043-9BC4-489BA92F7161}" type="slidenum">
               <a:rPr lang="en-US" smtClean="0"/>
-              <a:t>21</a:t>
+              <a:t>22</a:t>
             </a:fld>
             <a:endParaRPr lang="en-US"/>
           </a:p>
@@ -10762,7 +13385,7 @@
 </p:sld>
 </file>
 
-<file path=ppt/slides/slide22.xml><?xml version="1.0" encoding="utf-8"?>
+<file path=ppt/slides/slide23.xml><?xml version="1.0" encoding="utf-8"?>
 <p:sld xmlns:a="http://schemas.openxmlformats.org/drawingml/2006/main" xmlns:r="http://schemas.openxmlformats.org/officeDocument/2006/relationships" xmlns:p="http://schemas.openxmlformats.org/presentationml/2006/main">
   <p:cSld>
     <p:spTree>
@@ -10897,7 +13520,7 @@
             <a:pPr algn="ctr"/>
             <a:r>
               <a:rPr lang="en-US"/>
-              <a:t>8/14/24</a:t>
+              <a:t>1/9/25</a:t>
             </a:r>
           </a:p>
         </p:txBody>
@@ -10925,7 +13548,7 @@
           <a:p>
             <a:fld id="{ABDA560F-461C-6043-9BC4-489BA92F7161}" type="slidenum">
               <a:rPr lang="en-US" smtClean="0"/>
-              <a:t>22</a:t>
+              <a:t>23</a:t>
             </a:fld>
             <a:endParaRPr lang="en-US"/>
           </a:p>
@@ -10944,7 +13567,7 @@
 </p:sld>
 </file>
 
-<file path=ppt/slides/slide23.xml><?xml version="1.0" encoding="utf-8"?>
+<file path=ppt/slides/slide24.xml><?xml version="1.0" encoding="utf-8"?>
 <p:sld xmlns:a="http://schemas.openxmlformats.org/drawingml/2006/main" xmlns:r="http://schemas.openxmlformats.org/officeDocument/2006/relationships" xmlns:p="http://schemas.openxmlformats.org/presentationml/2006/main">
   <p:cSld>
     <p:spTree>
@@ -11018,7 +13641,7 @@
             <a:pPr algn="ctr"/>
             <a:r>
               <a:rPr lang="en-US"/>
-              <a:t>8/14/24</a:t>
+              <a:t>1/9/25</a:t>
             </a:r>
           </a:p>
         </p:txBody>
@@ -11046,7 +13669,7 @@
           <a:p>
             <a:fld id="{ABDA560F-461C-6043-9BC4-489BA92F7161}" type="slidenum">
               <a:rPr lang="en-US" smtClean="0"/>
-              <a:t>23</a:t>
+              <a:t>24</a:t>
             </a:fld>
             <a:endParaRPr lang="en-US"/>
           </a:p>
@@ -11723,7 +14346,7 @@
 </p:sld>
 </file>
 
-<file path=ppt/slides/slide24.xml><?xml version="1.0" encoding="utf-8"?>
+<file path=ppt/slides/slide25.xml><?xml version="1.0" encoding="utf-8"?>
 <p:sld xmlns:a="http://schemas.openxmlformats.org/drawingml/2006/main" xmlns:r="http://schemas.openxmlformats.org/officeDocument/2006/relationships" xmlns:p="http://schemas.openxmlformats.org/presentationml/2006/main">
   <p:cSld>
     <p:spTree>
@@ -11937,9 +14560,10 @@
           <a:p>
             <a:pPr algn="ctr"/>
             <a:r>
-              <a:rPr lang="en-US" dirty="0"/>
-              <a:t>8/14/24</a:t>
-            </a:r>
+              <a:rPr lang="en-US"/>
+              <a:t>1/9/25</a:t>
+            </a:r>
+            <a:endParaRPr lang="en-US" dirty="0"/>
           </a:p>
         </p:txBody>
       </p:sp>
@@ -11966,7 +14590,7 @@
           <a:p>
             <a:fld id="{ABDA560F-461C-6043-9BC4-489BA92F7161}" type="slidenum">
               <a:rPr lang="en-US" smtClean="0"/>
-              <a:t>24</a:t>
+              <a:t>25</a:t>
             </a:fld>
             <a:endParaRPr lang="en-US"/>
           </a:p>
@@ -11985,7 +14609,7 @@
 </p:sld>
 </file>
 
-<file path=ppt/slides/slide25.xml><?xml version="1.0" encoding="utf-8"?>
+<file path=ppt/slides/slide26.xml><?xml version="1.0" encoding="utf-8"?>
 <p:sld xmlns:a="http://schemas.openxmlformats.org/drawingml/2006/main" xmlns:r="http://schemas.openxmlformats.org/officeDocument/2006/relationships" xmlns:p="http://schemas.openxmlformats.org/presentationml/2006/main">
   <p:cSld>
     <p:spTree>
@@ -12137,7 +14761,7 @@
             <a:pPr algn="ctr"/>
             <a:r>
               <a:rPr lang="en-US"/>
-              <a:t>8/14/24</a:t>
+              <a:t>1/9/25</a:t>
             </a:r>
           </a:p>
         </p:txBody>
@@ -12165,7 +14789,7 @@
           <a:p>
             <a:fld id="{ABDA560F-461C-6043-9BC4-489BA92F7161}" type="slidenum">
               <a:rPr lang="en-US" smtClean="0"/>
-              <a:t>25</a:t>
+              <a:t>26</a:t>
             </a:fld>
             <a:endParaRPr lang="en-US"/>
           </a:p>
@@ -12502,7 +15126,227 @@
 </p:sld>
 </file>
 
-<file path=ppt/slides/slide26.xml><?xml version="1.0" encoding="utf-8"?>
+<file path=ppt/slides/slide27.xml><?xml version="1.0" encoding="utf-8"?>
+<p:sld xmlns:a="http://schemas.openxmlformats.org/drawingml/2006/main" xmlns:r="http://schemas.openxmlformats.org/officeDocument/2006/relationships" xmlns:p="http://schemas.openxmlformats.org/presentationml/2006/main">
+  <p:cSld>
+    <p:spTree>
+      <p:nvGrpSpPr>
+        <p:cNvPr id="1" name="">
+          <a:extLst>
+            <a:ext uri="{FF2B5EF4-FFF2-40B4-BE49-F238E27FC236}">
+              <a16:creationId xmlns:a16="http://schemas.microsoft.com/office/drawing/2014/main" id="{5A03FCA2-3D56-9CCE-3F1F-F99FA28C57DC}"/>
+            </a:ext>
+          </a:extLst>
+        </p:cNvPr>
+        <p:cNvGrpSpPr/>
+        <p:nvPr/>
+      </p:nvGrpSpPr>
+      <p:grpSpPr>
+        <a:xfrm>
+          <a:off x="0" y="0"/>
+          <a:ext cx="0" cy="0"/>
+          <a:chOff x="0" y="0"/>
+          <a:chExt cx="0" cy="0"/>
+        </a:xfrm>
+      </p:grpSpPr>
+      <p:sp>
+        <p:nvSpPr>
+          <p:cNvPr id="2" name="Title 1">
+            <a:extLst>
+              <a:ext uri="{FF2B5EF4-FFF2-40B4-BE49-F238E27FC236}">
+                <a16:creationId xmlns:a16="http://schemas.microsoft.com/office/drawing/2014/main" id="{E6A05F78-3771-4F08-898B-21255DB54219}"/>
+              </a:ext>
+            </a:extLst>
+          </p:cNvPr>
+          <p:cNvSpPr>
+            <a:spLocks noGrp="1"/>
+          </p:cNvSpPr>
+          <p:nvPr>
+            <p:ph type="title"/>
+          </p:nvPr>
+        </p:nvSpPr>
+        <p:spPr>
+          <a:xfrm>
+            <a:off x="838200" y="0"/>
+            <a:ext cx="10515600" cy="1325563"/>
+          </a:xfrm>
+        </p:spPr>
+        <p:txBody>
+          <a:bodyPr/>
+          <a:lstStyle/>
+          <a:p>
+            <a:r>
+              <a:rPr lang="en-US" dirty="0">
+                <a:latin typeface="Helvetica Neue Light"/>
+                <a:ea typeface="Helvetica Neue Light"/>
+                <a:cs typeface="Helvetica Neue Light"/>
+                <a:sym typeface="Helvetica Neue Light"/>
+              </a:rPr>
+              <a:t>Interactive GUI job</a:t>
+            </a:r>
+            <a:endParaRPr lang="en-US" dirty="0"/>
+          </a:p>
+        </p:txBody>
+      </p:sp>
+      <p:sp>
+        <p:nvSpPr>
+          <p:cNvPr id="3" name="Content Placeholder 2">
+            <a:extLst>
+              <a:ext uri="{FF2B5EF4-FFF2-40B4-BE49-F238E27FC236}">
+                <a16:creationId xmlns:a16="http://schemas.microsoft.com/office/drawing/2014/main" id="{C5878834-7310-DD41-9E49-3A770B54F7C3}"/>
+              </a:ext>
+            </a:extLst>
+          </p:cNvPr>
+          <p:cNvSpPr>
+            <a:spLocks noGrp="1"/>
+          </p:cNvSpPr>
+          <p:nvPr>
+            <p:ph idx="1"/>
+          </p:nvPr>
+        </p:nvSpPr>
+        <p:spPr>
+          <a:xfrm>
+            <a:off x="838200" y="1274323"/>
+            <a:ext cx="10515600" cy="4351338"/>
+          </a:xfrm>
+        </p:spPr>
+        <p:txBody>
+          <a:bodyPr/>
+          <a:lstStyle/>
+          <a:p>
+            <a:r>
+              <a:rPr lang="en-US" dirty="0"/>
+              <a:t>If you have software that has a Graphical User Interface (GUI) it is sometimes possible to display that GUI on your local machine.</a:t>
+            </a:r>
+          </a:p>
+          <a:p>
+            <a:pPr lvl="1"/>
+            <a:r>
+              <a:rPr lang="en-US" dirty="0"/>
+              <a:t>This is done using X11 forwarding</a:t>
+            </a:r>
+          </a:p>
+          <a:p>
+            <a:pPr lvl="1"/>
+            <a:r>
+              <a:rPr lang="en-US" dirty="0"/>
+              <a:t>This GUI may be laggy if you are on a compute node or if your connection is unstable </a:t>
+            </a:r>
+          </a:p>
+          <a:p>
+            <a:pPr lvl="1"/>
+            <a:r>
+              <a:rPr lang="en-US" dirty="0"/>
+              <a:t>See our documentation: </a:t>
+            </a:r>
+            <a:r>
+              <a:rPr lang="en-US" dirty="0">
+                <a:solidFill>
+                  <a:srgbClr val="0070C0"/>
+                </a:solidFill>
+              </a:rPr>
+              <a:t>https://curc.readthedocs.io/en/latest/running-jobs/interactive-jobs.html#interactive-gui-applications </a:t>
+            </a:r>
+          </a:p>
+          <a:p>
+            <a:pPr marL="457200" lvl="1" indent="0">
+              <a:buNone/>
+            </a:pPr>
+            <a:endParaRPr lang="en-US" dirty="0"/>
+          </a:p>
+          <a:p>
+            <a:pPr marL="457200" lvl="1" indent="0">
+              <a:buNone/>
+            </a:pPr>
+            <a:r>
+              <a:rPr lang="en-US" u="sng" dirty="0"/>
+              <a:t>Note:</a:t>
+            </a:r>
+            <a:r>
+              <a:rPr lang="en-US" dirty="0"/>
+              <a:t> you can also use our Open OnDemand “Core Desktop” application to display a GUI. This tends to be more stable than X11 forwarding. </a:t>
+            </a:r>
+          </a:p>
+          <a:p>
+            <a:pPr marL="0" indent="0">
+              <a:buNone/>
+            </a:pPr>
+            <a:endParaRPr lang="en-US" dirty="0"/>
+          </a:p>
+        </p:txBody>
+      </p:sp>
+      <p:sp>
+        <p:nvSpPr>
+          <p:cNvPr id="4" name="Date Placeholder 3">
+            <a:extLst>
+              <a:ext uri="{FF2B5EF4-FFF2-40B4-BE49-F238E27FC236}">
+                <a16:creationId xmlns:a16="http://schemas.microsoft.com/office/drawing/2014/main" id="{3A2D8BA4-8690-BB63-7CD2-CE1B8E63498D}"/>
+              </a:ext>
+            </a:extLst>
+          </p:cNvPr>
+          <p:cNvSpPr>
+            <a:spLocks noGrp="1"/>
+          </p:cNvSpPr>
+          <p:nvPr>
+            <p:ph type="dt" sz="half" idx="10"/>
+          </p:nvPr>
+        </p:nvSpPr>
+        <p:spPr/>
+        <p:txBody>
+          <a:bodyPr/>
+          <a:lstStyle/>
+          <a:p>
+            <a:pPr algn="ctr"/>
+            <a:r>
+              <a:rPr lang="en-US"/>
+              <a:t>1/9/25</a:t>
+            </a:r>
+          </a:p>
+        </p:txBody>
+      </p:sp>
+      <p:sp>
+        <p:nvSpPr>
+          <p:cNvPr id="5" name="Slide Number Placeholder 4">
+            <a:extLst>
+              <a:ext uri="{FF2B5EF4-FFF2-40B4-BE49-F238E27FC236}">
+                <a16:creationId xmlns:a16="http://schemas.microsoft.com/office/drawing/2014/main" id="{C65E6C70-B83E-24F1-D16B-02295BCF1D88}"/>
+              </a:ext>
+            </a:extLst>
+          </p:cNvPr>
+          <p:cNvSpPr>
+            <a:spLocks noGrp="1"/>
+          </p:cNvSpPr>
+          <p:nvPr>
+            <p:ph type="sldNum" sz="quarter" idx="12"/>
+          </p:nvPr>
+        </p:nvSpPr>
+        <p:spPr/>
+        <p:txBody>
+          <a:bodyPr/>
+          <a:lstStyle/>
+          <a:p>
+            <a:fld id="{ABDA560F-461C-6043-9BC4-489BA92F7161}" type="slidenum">
+              <a:rPr lang="en-US" smtClean="0"/>
+              <a:t>27</a:t>
+            </a:fld>
+            <a:endParaRPr lang="en-US"/>
+          </a:p>
+        </p:txBody>
+      </p:sp>
+    </p:spTree>
+    <p:extLst>
+      <p:ext uri="{BB962C8B-B14F-4D97-AF65-F5344CB8AC3E}">
+        <p14:creationId xmlns:p14="http://schemas.microsoft.com/office/powerpoint/2010/main" val="2466157391"/>
+      </p:ext>
+    </p:extLst>
+  </p:cSld>
+  <p:clrMapOvr>
+    <a:masterClrMapping/>
+  </p:clrMapOvr>
+</p:sld>
+</file>
+
+<file path=ppt/slides/slide28.xml><?xml version="1.0" encoding="utf-8"?>
 <p:sld xmlns:a="http://schemas.openxmlformats.org/drawingml/2006/main" xmlns:r="http://schemas.openxmlformats.org/officeDocument/2006/relationships" xmlns:p="http://schemas.openxmlformats.org/presentationml/2006/main">
   <p:cSld>
     <p:spTree>
@@ -12613,7 +15457,7 @@
             <a:pPr algn="ctr"/>
             <a:r>
               <a:rPr lang="en-US"/>
-              <a:t>8/14/24</a:t>
+              <a:t>1/9/25</a:t>
             </a:r>
             <a:endParaRPr lang="en-US" dirty="0"/>
           </a:p>
@@ -12642,7 +15486,7 @@
           <a:p>
             <a:fld id="{ABDA560F-461C-6043-9BC4-489BA92F7161}" type="slidenum">
               <a:rPr lang="en-US" smtClean="0"/>
-              <a:t>26</a:t>
+              <a:t>28</a:t>
             </a:fld>
             <a:endParaRPr lang="en-US"/>
           </a:p>
@@ -12788,7 +15632,7 @@
             <a:pPr algn="ctr"/>
             <a:r>
               <a:rPr lang="en-US"/>
-              <a:t>8/14/24</a:t>
+              <a:t>1/9/25</a:t>
             </a:r>
             <a:endParaRPr lang="en-US" dirty="0"/>
           </a:p>
@@ -13125,7 +15969,7 @@
             <a:pPr algn="ctr"/>
             <a:r>
               <a:rPr lang="en-US"/>
-              <a:t>8/14/24</a:t>
+              <a:t>1/9/25</a:t>
             </a:r>
             <a:endParaRPr lang="en-US" dirty="0"/>
           </a:p>
@@ -13573,7 +16417,7 @@
             <a:pPr algn="ctr"/>
             <a:r>
               <a:rPr lang="en-US"/>
-              <a:t>8/14/24</a:t>
+              <a:t>1/9/25</a:t>
             </a:r>
           </a:p>
         </p:txBody>
@@ -13661,7 +16505,7 @@
             <a:pPr algn="ctr"/>
             <a:r>
               <a:rPr lang="en-US"/>
-              <a:t>8/14/24</a:t>
+              <a:t>1/9/25</a:t>
             </a:r>
           </a:p>
         </p:txBody>
@@ -14712,7 +17556,7 @@
             <a:pPr algn="ctr"/>
             <a:r>
               <a:rPr lang="en-US"/>
-              <a:t>8/14/24</a:t>
+              <a:t>1/9/25</a:t>
             </a:r>
           </a:p>
         </p:txBody>
@@ -14800,7 +17644,7 @@
             <a:pPr algn="ctr"/>
             <a:r>
               <a:rPr lang="en-US"/>
-              <a:t>8/14/24</a:t>
+              <a:t>1/9/25</a:t>
             </a:r>
           </a:p>
         </p:txBody>
@@ -15623,7 +18467,7 @@
             <a:pPr algn="ctr"/>
             <a:r>
               <a:rPr lang="en-US"/>
-              <a:t>8/14/24</a:t>
+              <a:t>1/9/25</a:t>
             </a:r>
           </a:p>
         </p:txBody>
@@ -16236,6 +19080,17 @@
 </file>
 
 <file path=customXml/item2.xml><?xml version="1.0" encoding="utf-8"?>
+<p:properties xmlns:p="http://schemas.microsoft.com/office/2006/metadata/properties" xmlns:xsi="http://www.w3.org/2001/XMLSchema-instance" xmlns:pc="http://schemas.microsoft.com/office/infopath/2007/PartnerControls">
+  <documentManagement>
+    <TaxCatchAll xmlns="92c16b9d-8c83-445e-a4f4-1fe3d2f43f13" xsi:nil="true"/>
+    <lcf76f155ced4ddcb4097134ff3c332f xmlns="7e49f7d3-8802-46ca-9604-495ce27f67f4">
+      <Terms xmlns="http://schemas.microsoft.com/office/infopath/2007/PartnerControls"/>
+    </lcf76f155ced4ddcb4097134ff3c332f>
+  </documentManagement>
+</p:properties>
+</file>
+
+<file path=customXml/item3.xml><?xml version="1.0" encoding="utf-8"?>
 <ct:contentTypeSchema xmlns:ct="http://schemas.microsoft.com/office/2006/metadata/contentType" xmlns:ma="http://schemas.microsoft.com/office/2006/metadata/properties/metaAttributes" ct:_="" ma:_="" ma:contentTypeName="Document" ma:contentTypeID="0x010100DC7320DB280744439FF1CC777D09ECA4" ma:contentTypeVersion="15" ma:contentTypeDescription="Create a new document." ma:contentTypeScope="" ma:versionID="e50b92032c956cc777cf00ac7d475189">
   <xsd:schema xmlns:xsd="http://www.w3.org/2001/XMLSchema" xmlns:xs="http://www.w3.org/2001/XMLSchema" xmlns:p="http://schemas.microsoft.com/office/2006/metadata/properties" xmlns:ns2="7e49f7d3-8802-46ca-9604-495ce27f67f4" xmlns:ns3="a1519f9a-9d6a-41c1-afc9-552e4069f82f" xmlns:ns4="92c16b9d-8c83-445e-a4f4-1fe3d2f43f13" targetNamespace="http://schemas.microsoft.com/office/2006/metadata/properties" ma:root="true" ma:fieldsID="fcd7cab68a23f1df7b42ced4f3edf141" ns2:_="" ns3:_="" ns4:_="">
     <xsd:import namespace="7e49f7d3-8802-46ca-9604-495ce27f67f4"/>
@@ -16477,17 +19332,6 @@
 </ct:contentTypeSchema>
 </file>
 
-<file path=customXml/item3.xml><?xml version="1.0" encoding="utf-8"?>
-<p:properties xmlns:p="http://schemas.microsoft.com/office/2006/metadata/properties" xmlns:xsi="http://www.w3.org/2001/XMLSchema-instance" xmlns:pc="http://schemas.microsoft.com/office/infopath/2007/PartnerControls">
-  <documentManagement>
-    <TaxCatchAll xmlns="92c16b9d-8c83-445e-a4f4-1fe3d2f43f13" xsi:nil="true"/>
-    <lcf76f155ced4ddcb4097134ff3c332f xmlns="7e49f7d3-8802-46ca-9604-495ce27f67f4">
-      <Terms xmlns="http://schemas.microsoft.com/office/infopath/2007/PartnerControls"/>
-    </lcf76f155ced4ddcb4097134ff3c332f>
-  </documentManagement>
-</p:properties>
-</file>
-
 <file path=customXml/itemProps1.xml><?xml version="1.0" encoding="utf-8"?>
 <ds:datastoreItem xmlns:ds="http://schemas.openxmlformats.org/officeDocument/2006/customXml" ds:itemID="{06B4C708-AA43-4CE7-BE2D-F9D9A02F4940}">
   <ds:schemaRefs>
@@ -16497,6 +19341,24 @@
 </file>
 
 <file path=customXml/itemProps2.xml><?xml version="1.0" encoding="utf-8"?>
+<ds:datastoreItem xmlns:ds="http://schemas.openxmlformats.org/officeDocument/2006/customXml" ds:itemID="{4AB02FF4-25A1-49FE-9DF7-DD19F525B7FA}">
+  <ds:schemaRefs>
+    <ds:schemaRef ds:uri="7e49f7d3-8802-46ca-9604-495ce27f67f4"/>
+    <ds:schemaRef ds:uri="92c16b9d-8c83-445e-a4f4-1fe3d2f43f13"/>
+    <ds:schemaRef ds:uri="a1519f9a-9d6a-41c1-afc9-552e4069f82f"/>
+    <ds:schemaRef ds:uri="http://purl.org/dc/dcmitype/"/>
+    <ds:schemaRef ds:uri="http://purl.org/dc/elements/1.1/"/>
+    <ds:schemaRef ds:uri="http://purl.org/dc/terms/"/>
+    <ds:schemaRef ds:uri="http://schemas.microsoft.com/office/2006/documentManagement/types"/>
+    <ds:schemaRef ds:uri="http://schemas.microsoft.com/office/2006/metadata/properties"/>
+    <ds:schemaRef ds:uri="http://schemas.microsoft.com/office/infopath/2007/PartnerControls"/>
+    <ds:schemaRef ds:uri="http://schemas.openxmlformats.org/package/2006/metadata/core-properties"/>
+    <ds:schemaRef ds:uri="http://www.w3.org/XML/1998/namespace"/>
+  </ds:schemaRefs>
+</ds:datastoreItem>
+</file>
+
+<file path=customXml/itemProps3.xml><?xml version="1.0" encoding="utf-8"?>
 <ds:datastoreItem xmlns:ds="http://schemas.openxmlformats.org/officeDocument/2006/customXml" ds:itemID="{6BBC22CE-40EC-4545-8FE9-90326628051D}">
   <ds:schemaRefs>
     <ds:schemaRef ds:uri="7e49f7d3-8802-46ca-9604-495ce27f67f4"/>
@@ -16514,22 +19376,4 @@
     <ds:schemaRef ds:uri="http://www.w3.org/2001/XMLSchema"/>
   </ds:schemaRefs>
 </ds:datastoreItem>
-</file>
-
-<file path=customXml/itemProps3.xml><?xml version="1.0" encoding="utf-8"?>
-<ds:datastoreItem xmlns:ds="http://schemas.openxmlformats.org/officeDocument/2006/customXml" ds:itemID="{4AB02FF4-25A1-49FE-9DF7-DD19F525B7FA}">
-  <ds:schemaRefs>
-    <ds:schemaRef ds:uri="7e49f7d3-8802-46ca-9604-495ce27f67f4"/>
-    <ds:schemaRef ds:uri="92c16b9d-8c83-445e-a4f4-1fe3d2f43f13"/>
-    <ds:schemaRef ds:uri="a1519f9a-9d6a-41c1-afc9-552e4069f82f"/>
-    <ds:schemaRef ds:uri="http://purl.org/dc/dcmitype/"/>
-    <ds:schemaRef ds:uri="http://purl.org/dc/elements/1.1/"/>
-    <ds:schemaRef ds:uri="http://purl.org/dc/terms/"/>
-    <ds:schemaRef ds:uri="http://schemas.microsoft.com/office/2006/documentManagement/types"/>
-    <ds:schemaRef ds:uri="http://schemas.microsoft.com/office/2006/metadata/properties"/>
-    <ds:schemaRef ds:uri="http://schemas.microsoft.com/office/infopath/2007/PartnerControls"/>
-    <ds:schemaRef ds:uri="http://schemas.openxmlformats.org/package/2006/metadata/core-properties"/>
-    <ds:schemaRef ds:uri="http://www.w3.org/XML/1998/namespace"/>
-  </ds:schemaRefs>
-</ds:datastoreItem>
 </file>
</xml_diff>

<commit_message>
remove use of slurmtools on slide 22
</commit_message>
<xml_diff>
--- a/scheduling_jobs/scheduling_jobs.pptx
+++ b/scheduling_jobs/scheduling_jobs.pptx
@@ -13237,7 +13237,7 @@
         <p:spPr>
           <a:xfrm>
             <a:off x="1589766" y="5417212"/>
-            <a:ext cx="7263300" cy="738900"/>
+            <a:ext cx="7263300" cy="508685"/>
           </a:xfrm>
           <a:prstGeom prst="rect">
             <a:avLst/>
@@ -13258,50 +13258,6 @@
             <a:noAutofit/>
           </a:bodyPr>
           <a:lstStyle/>
-          <a:p>
-            <a:pPr marL="0" marR="0" lvl="0" indent="0" algn="l" rtl="0">
-              <a:spcBef>
-                <a:spcPts val="0"/>
-              </a:spcBef>
-              <a:spcAft>
-                <a:spcPts val="0"/>
-              </a:spcAft>
-              <a:buNone/>
-            </a:pPr>
-            <a:r>
-              <a:rPr lang="en-US" sz="2000" dirty="0">
-                <a:solidFill>
-                  <a:srgbClr val="0070C0"/>
-                </a:solidFill>
-                <a:latin typeface="Consolas"/>
-                <a:ea typeface="Consolas"/>
-                <a:cs typeface="Consolas"/>
-                <a:sym typeface="Consolas"/>
-              </a:rPr>
-              <a:t>$ module load </a:t>
-            </a:r>
-            <a:r>
-              <a:rPr lang="en-US" sz="2000" dirty="0" err="1">
-                <a:solidFill>
-                  <a:srgbClr val="0070C0"/>
-                </a:solidFill>
-                <a:latin typeface="Consolas"/>
-                <a:ea typeface="Consolas"/>
-                <a:cs typeface="Consolas"/>
-                <a:sym typeface="Consolas"/>
-              </a:rPr>
-              <a:t>slurmtools</a:t>
-            </a:r>
-            <a:endParaRPr sz="2000" dirty="0">
-              <a:solidFill>
-                <a:srgbClr val="0070C0"/>
-              </a:solidFill>
-              <a:latin typeface="Consolas"/>
-              <a:ea typeface="Consolas"/>
-              <a:cs typeface="Consolas"/>
-              <a:sym typeface="Consolas"/>
-            </a:endParaRPr>
-          </a:p>
           <a:p>
             <a:pPr marL="0" marR="0" lvl="0" indent="0" algn="l" rtl="0">
               <a:spcBef>

</xml_diff>

<commit_message>
change date on presentation, update amilan node numbers, mark now required partitions, modify job scripts to include QoS
</commit_message>
<xml_diff>
--- a/scheduling_jobs/scheduling_jobs.pptx
+++ b/scheduling_jobs/scheduling_jobs.pptx
@@ -241,7 +241,7 @@
           <a:p>
             <a:fld id="{EFDA08D6-E137-3341-A5EE-84219A24203E}" type="datetimeFigureOut">
               <a:rPr lang="en-US" smtClean="0"/>
-              <a:t>1/6/25</a:t>
+              <a:t>8/11/25</a:t>
             </a:fld>
             <a:endParaRPr lang="en-US"/>
           </a:p>
@@ -748,7 +748,7 @@
             <a:pPr algn="ctr"/>
             <a:r>
               <a:rPr lang="en-US"/>
-              <a:t>1/9/25</a:t>
+              <a:t>8/20/25</a:t>
             </a:r>
           </a:p>
         </p:txBody>
@@ -929,7 +929,7 @@
             <a:pPr algn="ctr"/>
             <a:r>
               <a:rPr lang="en-US"/>
-              <a:t>1/9/25</a:t>
+              <a:t>8/20/25</a:t>
             </a:r>
           </a:p>
         </p:txBody>
@@ -1222,7 +1222,7 @@
             <a:pPr algn="ctr"/>
             <a:r>
               <a:rPr lang="en-US"/>
-              <a:t>1/9/25</a:t>
+              <a:t>8/20/25</a:t>
             </a:r>
           </a:p>
         </p:txBody>
@@ -1239,7 +1239,7 @@
     <p:sldLayoutId id="2147483661" r:id="rId1"/>
     <p:sldLayoutId id="2147483662" r:id="rId2"/>
   </p:sldLayoutIdLst>
-  <p:hf hdr="0" ftr="0"/>
+  <p:hf sldNum="0" hdr="0" ftr="0"/>
   <p:txStyles>
     <p:titleStyle>
       <a:lvl1pPr algn="l" defTabSz="914400" rtl="0" eaLnBrk="1" latinLnBrk="0" hangingPunct="1">
@@ -1668,7 +1668,7 @@
               <a:rPr lang="en-US" sz="2800" dirty="0">
                 <a:latin typeface="Century Gothic" panose="020B0502020202020204" pitchFamily="34" charset="0"/>
               </a:rPr>
-              <a:t>January 9, 2025</a:t>
+              <a:t>August 20, 2025</a:t>
             </a:r>
           </a:p>
         </p:txBody>
@@ -1755,37 +1755,8 @@
             <a:pPr algn="ctr"/>
             <a:r>
               <a:rPr lang="en-US"/>
-              <a:t>1/9/25</a:t>
-            </a:r>
-          </a:p>
-        </p:txBody>
-      </p:sp>
-      <p:sp>
-        <p:nvSpPr>
-          <p:cNvPr id="5" name="Slide Number Placeholder 4">
-            <a:extLst>
-              <a:ext uri="{FF2B5EF4-FFF2-40B4-BE49-F238E27FC236}">
-                <a16:creationId xmlns:a16="http://schemas.microsoft.com/office/drawing/2014/main" id="{C1319F6E-CAC3-D948-328A-7F0F8E814AA3}"/>
-              </a:ext>
-            </a:extLst>
-          </p:cNvPr>
-          <p:cNvSpPr>
-            <a:spLocks noGrp="1"/>
-          </p:cNvSpPr>
-          <p:nvPr>
-            <p:ph type="sldNum" sz="quarter" idx="12"/>
-          </p:nvPr>
-        </p:nvSpPr>
-        <p:spPr/>
-        <p:txBody>
-          <a:bodyPr/>
-          <a:lstStyle/>
-          <a:p>
-            <a:fld id="{ABDA560F-461C-6043-9BC4-489BA92F7161}" type="slidenum">
-              <a:rPr lang="en-US" smtClean="0"/>
-              <a:t>10</a:t>
-            </a:fld>
-            <a:endParaRPr lang="en-US" dirty="0"/>
+              <a:t>8/20/25</a:t>
+            </a:r>
           </a:p>
         </p:txBody>
       </p:sp>
@@ -2297,6 +2268,203 @@
               <a:cs typeface="Arial"/>
               <a:sym typeface="Arial"/>
             </a:endParaRPr>
+          </a:p>
+        </p:txBody>
+      </p:sp>
+      <p:sp>
+        <p:nvSpPr>
+          <p:cNvPr id="3" name="5-Point Star 2">
+            <a:extLst>
+              <a:ext uri="{FF2B5EF4-FFF2-40B4-BE49-F238E27FC236}">
+                <a16:creationId xmlns:a16="http://schemas.microsoft.com/office/drawing/2014/main" id="{4EEE6623-C3C9-752E-F4CF-F8072D588BD0}"/>
+              </a:ext>
+            </a:extLst>
+          </p:cNvPr>
+          <p:cNvSpPr/>
+          <p:nvPr/>
+        </p:nvSpPr>
+        <p:spPr>
+          <a:xfrm>
+            <a:off x="644768" y="1990293"/>
+            <a:ext cx="193431" cy="202224"/>
+          </a:xfrm>
+          <a:prstGeom prst="star5">
+            <a:avLst/>
+          </a:prstGeom>
+          <a:solidFill>
+            <a:srgbClr val="FF0000"/>
+          </a:solidFill>
+          <a:ln>
+            <a:solidFill>
+              <a:schemeClr val="tx1"/>
+            </a:solidFill>
+          </a:ln>
+        </p:spPr>
+        <p:style>
+          <a:lnRef idx="2">
+            <a:schemeClr val="accent1">
+              <a:shade val="15000"/>
+            </a:schemeClr>
+          </a:lnRef>
+          <a:fillRef idx="1">
+            <a:schemeClr val="accent1"/>
+          </a:fillRef>
+          <a:effectRef idx="0">
+            <a:schemeClr val="accent1"/>
+          </a:effectRef>
+          <a:fontRef idx="minor">
+            <a:schemeClr val="lt1"/>
+          </a:fontRef>
+        </p:style>
+        <p:txBody>
+          <a:bodyPr rtlCol="0" anchor="ctr"/>
+          <a:lstStyle/>
+          <a:p>
+            <a:pPr algn="ctr"/>
+            <a:endParaRPr lang="en-US"/>
+          </a:p>
+        </p:txBody>
+      </p:sp>
+      <p:sp>
+        <p:nvSpPr>
+          <p:cNvPr id="7" name="5-Point Star 6">
+            <a:extLst>
+              <a:ext uri="{FF2B5EF4-FFF2-40B4-BE49-F238E27FC236}">
+                <a16:creationId xmlns:a16="http://schemas.microsoft.com/office/drawing/2014/main" id="{5639F9B9-9754-5B7F-2FDD-E46A1FEFB179}"/>
+              </a:ext>
+            </a:extLst>
+          </p:cNvPr>
+          <p:cNvSpPr/>
+          <p:nvPr/>
+        </p:nvSpPr>
+        <p:spPr>
+          <a:xfrm>
+            <a:off x="644768" y="2679024"/>
+            <a:ext cx="193431" cy="202224"/>
+          </a:xfrm>
+          <a:prstGeom prst="star5">
+            <a:avLst/>
+          </a:prstGeom>
+          <a:solidFill>
+            <a:srgbClr val="FF0000"/>
+          </a:solidFill>
+          <a:ln>
+            <a:solidFill>
+              <a:schemeClr val="tx1"/>
+            </a:solidFill>
+          </a:ln>
+        </p:spPr>
+        <p:style>
+          <a:lnRef idx="2">
+            <a:schemeClr val="accent1">
+              <a:shade val="15000"/>
+            </a:schemeClr>
+          </a:lnRef>
+          <a:fillRef idx="1">
+            <a:schemeClr val="accent1"/>
+          </a:fillRef>
+          <a:effectRef idx="0">
+            <a:schemeClr val="accent1"/>
+          </a:effectRef>
+          <a:fontRef idx="minor">
+            <a:schemeClr val="lt1"/>
+          </a:fontRef>
+        </p:style>
+        <p:txBody>
+          <a:bodyPr rtlCol="0" anchor="ctr"/>
+          <a:lstStyle/>
+          <a:p>
+            <a:pPr algn="ctr"/>
+            <a:endParaRPr lang="en-US"/>
+          </a:p>
+        </p:txBody>
+      </p:sp>
+      <p:sp>
+        <p:nvSpPr>
+          <p:cNvPr id="8" name="5-Point Star 7">
+            <a:extLst>
+              <a:ext uri="{FF2B5EF4-FFF2-40B4-BE49-F238E27FC236}">
+                <a16:creationId xmlns:a16="http://schemas.microsoft.com/office/drawing/2014/main" id="{F862C7AF-E8A5-5F80-AAFD-3FD27FA38385}"/>
+              </a:ext>
+            </a:extLst>
+          </p:cNvPr>
+          <p:cNvSpPr/>
+          <p:nvPr/>
+        </p:nvSpPr>
+        <p:spPr>
+          <a:xfrm>
+            <a:off x="644768" y="5767573"/>
+            <a:ext cx="193431" cy="202224"/>
+          </a:xfrm>
+          <a:prstGeom prst="star5">
+            <a:avLst/>
+          </a:prstGeom>
+          <a:solidFill>
+            <a:srgbClr val="FF0000"/>
+          </a:solidFill>
+          <a:ln>
+            <a:solidFill>
+              <a:schemeClr val="tx1"/>
+            </a:solidFill>
+          </a:ln>
+        </p:spPr>
+        <p:style>
+          <a:lnRef idx="2">
+            <a:schemeClr val="accent1">
+              <a:shade val="15000"/>
+            </a:schemeClr>
+          </a:lnRef>
+          <a:fillRef idx="1">
+            <a:schemeClr val="accent1"/>
+          </a:fillRef>
+          <a:effectRef idx="0">
+            <a:schemeClr val="accent1"/>
+          </a:effectRef>
+          <a:fontRef idx="minor">
+            <a:schemeClr val="lt1"/>
+          </a:fontRef>
+        </p:style>
+        <p:txBody>
+          <a:bodyPr rtlCol="0" anchor="ctr"/>
+          <a:lstStyle/>
+          <a:p>
+            <a:pPr algn="ctr"/>
+            <a:endParaRPr lang="en-US"/>
+          </a:p>
+        </p:txBody>
+      </p:sp>
+      <p:sp>
+        <p:nvSpPr>
+          <p:cNvPr id="9" name="TextBox 8">
+            <a:extLst>
+              <a:ext uri="{FF2B5EF4-FFF2-40B4-BE49-F238E27FC236}">
+                <a16:creationId xmlns:a16="http://schemas.microsoft.com/office/drawing/2014/main" id="{05C7483B-D188-6DB3-DF85-24BF47975F1C}"/>
+              </a:ext>
+            </a:extLst>
+          </p:cNvPr>
+          <p:cNvSpPr txBox="1"/>
+          <p:nvPr/>
+        </p:nvSpPr>
+        <p:spPr>
+          <a:xfrm>
+            <a:off x="893887" y="5684019"/>
+            <a:ext cx="3454792" cy="369332"/>
+          </a:xfrm>
+          <a:prstGeom prst="rect">
+            <a:avLst/>
+          </a:prstGeom>
+          <a:noFill/>
+        </p:spPr>
+        <p:txBody>
+          <a:bodyPr wrap="none" rtlCol="0">
+            <a:spAutoFit/>
+          </a:bodyPr>
+          <a:lstStyle/>
+          <a:p>
+            <a:r>
+              <a:rPr lang="en-US" dirty="0"/>
+              <a:t>- Must be specified for every job</a:t>
+            </a:r>
           </a:p>
         </p:txBody>
       </p:sp>
@@ -2387,37 +2555,8 @@
             <a:pPr algn="ctr"/>
             <a:r>
               <a:rPr lang="en-US"/>
-              <a:t>1/9/25</a:t>
-            </a:r>
-          </a:p>
-        </p:txBody>
-      </p:sp>
-      <p:sp>
-        <p:nvSpPr>
-          <p:cNvPr id="5" name="Slide Number Placeholder 4">
-            <a:extLst>
-              <a:ext uri="{FF2B5EF4-FFF2-40B4-BE49-F238E27FC236}">
-                <a16:creationId xmlns:a16="http://schemas.microsoft.com/office/drawing/2014/main" id="{3B6A805B-C113-0B84-EB76-8333FADD151C}"/>
-              </a:ext>
-            </a:extLst>
-          </p:cNvPr>
-          <p:cNvSpPr>
-            <a:spLocks noGrp="1"/>
-          </p:cNvSpPr>
-          <p:nvPr>
-            <p:ph type="sldNum" sz="quarter" idx="12"/>
-          </p:nvPr>
-        </p:nvSpPr>
-        <p:spPr/>
-        <p:txBody>
-          <a:bodyPr/>
-          <a:lstStyle/>
-          <a:p>
-            <a:fld id="{ABDA560F-461C-6043-9BC4-489BA92F7161}" type="slidenum">
-              <a:rPr lang="en-US" smtClean="0"/>
-              <a:t>11</a:t>
-            </a:fld>
-            <a:endParaRPr lang="en-US"/>
+              <a:t>8/20/25</a:t>
+            </a:r>
           </a:p>
         </p:txBody>
       </p:sp>
@@ -2794,6 +2933,149 @@
               </a:rPr>
               <a:t>&lt;user&gt;</a:t>
             </a:r>
+          </a:p>
+        </p:txBody>
+      </p:sp>
+      <p:sp>
+        <p:nvSpPr>
+          <p:cNvPr id="3" name="5-Point Star 2">
+            <a:extLst>
+              <a:ext uri="{FF2B5EF4-FFF2-40B4-BE49-F238E27FC236}">
+                <a16:creationId xmlns:a16="http://schemas.microsoft.com/office/drawing/2014/main" id="{DC5BBFBC-E827-A9B9-94EF-46575B0FE125}"/>
+              </a:ext>
+            </a:extLst>
+          </p:cNvPr>
+          <p:cNvSpPr/>
+          <p:nvPr/>
+        </p:nvSpPr>
+        <p:spPr>
+          <a:xfrm>
+            <a:off x="548052" y="5746724"/>
+            <a:ext cx="193431" cy="202224"/>
+          </a:xfrm>
+          <a:prstGeom prst="star5">
+            <a:avLst/>
+          </a:prstGeom>
+          <a:solidFill>
+            <a:srgbClr val="FF0000"/>
+          </a:solidFill>
+          <a:ln>
+            <a:solidFill>
+              <a:schemeClr val="tx1"/>
+            </a:solidFill>
+          </a:ln>
+        </p:spPr>
+        <p:style>
+          <a:lnRef idx="2">
+            <a:schemeClr val="accent1">
+              <a:shade val="15000"/>
+            </a:schemeClr>
+          </a:lnRef>
+          <a:fillRef idx="1">
+            <a:schemeClr val="accent1"/>
+          </a:fillRef>
+          <a:effectRef idx="0">
+            <a:schemeClr val="accent1"/>
+          </a:effectRef>
+          <a:fontRef idx="minor">
+            <a:schemeClr val="lt1"/>
+          </a:fontRef>
+        </p:style>
+        <p:txBody>
+          <a:bodyPr rtlCol="0" anchor="ctr"/>
+          <a:lstStyle/>
+          <a:p>
+            <a:pPr algn="ctr"/>
+            <a:endParaRPr lang="en-US"/>
+          </a:p>
+        </p:txBody>
+      </p:sp>
+      <p:sp>
+        <p:nvSpPr>
+          <p:cNvPr id="7" name="TextBox 6">
+            <a:extLst>
+              <a:ext uri="{FF2B5EF4-FFF2-40B4-BE49-F238E27FC236}">
+                <a16:creationId xmlns:a16="http://schemas.microsoft.com/office/drawing/2014/main" id="{E0EA139F-8910-56E7-1812-C8566D3695D4}"/>
+              </a:ext>
+            </a:extLst>
+          </p:cNvPr>
+          <p:cNvSpPr txBox="1"/>
+          <p:nvPr/>
+        </p:nvSpPr>
+        <p:spPr>
+          <a:xfrm>
+            <a:off x="797171" y="5663170"/>
+            <a:ext cx="3454792" cy="369332"/>
+          </a:xfrm>
+          <a:prstGeom prst="rect">
+            <a:avLst/>
+          </a:prstGeom>
+          <a:noFill/>
+        </p:spPr>
+        <p:txBody>
+          <a:bodyPr wrap="none" rtlCol="0">
+            <a:spAutoFit/>
+          </a:bodyPr>
+          <a:lstStyle/>
+          <a:p>
+            <a:r>
+              <a:rPr lang="en-US" dirty="0"/>
+              <a:t>- Must be specified for every job</a:t>
+            </a:r>
+          </a:p>
+        </p:txBody>
+      </p:sp>
+      <p:sp>
+        <p:nvSpPr>
+          <p:cNvPr id="8" name="5-Point Star 7">
+            <a:extLst>
+              <a:ext uri="{FF2B5EF4-FFF2-40B4-BE49-F238E27FC236}">
+                <a16:creationId xmlns:a16="http://schemas.microsoft.com/office/drawing/2014/main" id="{EA5E6197-07E0-53DA-9A59-24C0D1AC9B3C}"/>
+              </a:ext>
+            </a:extLst>
+          </p:cNvPr>
+          <p:cNvSpPr/>
+          <p:nvPr/>
+        </p:nvSpPr>
+        <p:spPr>
+          <a:xfrm>
+            <a:off x="548052" y="1808863"/>
+            <a:ext cx="193431" cy="202224"/>
+          </a:xfrm>
+          <a:prstGeom prst="star5">
+            <a:avLst/>
+          </a:prstGeom>
+          <a:solidFill>
+            <a:srgbClr val="FF0000"/>
+          </a:solidFill>
+          <a:ln>
+            <a:solidFill>
+              <a:schemeClr val="tx1"/>
+            </a:solidFill>
+          </a:ln>
+        </p:spPr>
+        <p:style>
+          <a:lnRef idx="2">
+            <a:schemeClr val="accent1">
+              <a:shade val="15000"/>
+            </a:schemeClr>
+          </a:lnRef>
+          <a:fillRef idx="1">
+            <a:schemeClr val="accent1"/>
+          </a:fillRef>
+          <a:effectRef idx="0">
+            <a:schemeClr val="accent1"/>
+          </a:effectRef>
+          <a:fontRef idx="minor">
+            <a:schemeClr val="lt1"/>
+          </a:fontRef>
+        </p:style>
+        <p:txBody>
+          <a:bodyPr rtlCol="0" anchor="ctr"/>
+          <a:lstStyle/>
+          <a:p>
+            <a:pPr algn="ctr"/>
+            <a:endParaRPr lang="en-US"/>
           </a:p>
         </p:txBody>
       </p:sp>
@@ -2917,37 +3199,8 @@
             <a:pPr algn="ctr"/>
             <a:r>
               <a:rPr lang="en-US"/>
-              <a:t>1/9/25</a:t>
-            </a:r>
-          </a:p>
-        </p:txBody>
-      </p:sp>
-      <p:sp>
-        <p:nvSpPr>
-          <p:cNvPr id="5" name="Slide Number Placeholder 4">
-            <a:extLst>
-              <a:ext uri="{FF2B5EF4-FFF2-40B4-BE49-F238E27FC236}">
-                <a16:creationId xmlns:a16="http://schemas.microsoft.com/office/drawing/2014/main" id="{21F6395C-A1E9-1534-5A8A-FFC2C70A4000}"/>
-              </a:ext>
-            </a:extLst>
-          </p:cNvPr>
-          <p:cNvSpPr>
-            <a:spLocks noGrp="1"/>
-          </p:cNvSpPr>
-          <p:nvPr>
-            <p:ph type="sldNum" sz="quarter" idx="12"/>
-          </p:nvPr>
-        </p:nvSpPr>
-        <p:spPr/>
-        <p:txBody>
-          <a:bodyPr/>
-          <a:lstStyle/>
-          <a:p>
-            <a:fld id="{ABDA560F-461C-6043-9BC4-489BA92F7161}" type="slidenum">
-              <a:rPr lang="en-US" smtClean="0"/>
-              <a:t>12</a:t>
-            </a:fld>
-            <a:endParaRPr lang="en-US"/>
+              <a:t>8/20/25</a:t>
+            </a:r>
           </a:p>
         </p:txBody>
       </p:sp>
@@ -2964,7 +3217,7 @@
           <p:nvPr>
             <p:extLst>
               <p:ext uri="{D42A27DB-BD31-4B8C-83A1-F6EECF244321}">
-                <p14:modId xmlns:p14="http://schemas.microsoft.com/office/powerpoint/2010/main" val="2213664949"/>
+                <p14:modId xmlns:p14="http://schemas.microsoft.com/office/powerpoint/2010/main" val="2685975893"/>
               </p:ext>
             </p:extLst>
           </p:nvPr>
@@ -3599,7 +3852,7 @@
                       </a:pPr>
                       <a:r>
                         <a:rPr lang="en-US" sz="1800" u="none" strike="noStrike" cap="none" dirty="0"/>
-                        <a:t>376</a:t>
+                        <a:t>406</a:t>
                       </a:r>
                       <a:endParaRPr sz="1800" u="none" strike="noStrike" cap="none" dirty="0"/>
                     </a:p>
@@ -5191,37 +5444,8 @@
             <a:pPr algn="ctr"/>
             <a:r>
               <a:rPr lang="en-US"/>
-              <a:t>1/9/25</a:t>
-            </a:r>
-          </a:p>
-        </p:txBody>
-      </p:sp>
-      <p:sp>
-        <p:nvSpPr>
-          <p:cNvPr id="5" name="Slide Number Placeholder 4">
-            <a:extLst>
-              <a:ext uri="{FF2B5EF4-FFF2-40B4-BE49-F238E27FC236}">
-                <a16:creationId xmlns:a16="http://schemas.microsoft.com/office/drawing/2014/main" id="{9F9D8319-47C3-5F6F-C07C-46B390B3683D}"/>
-              </a:ext>
-            </a:extLst>
-          </p:cNvPr>
-          <p:cNvSpPr>
-            <a:spLocks noGrp="1"/>
-          </p:cNvSpPr>
-          <p:nvPr>
-            <p:ph type="sldNum" sz="quarter" idx="12"/>
-          </p:nvPr>
-        </p:nvSpPr>
-        <p:spPr/>
-        <p:txBody>
-          <a:bodyPr/>
-          <a:lstStyle/>
-          <a:p>
-            <a:fld id="{ABDA560F-461C-6043-9BC4-489BA92F7161}" type="slidenum">
-              <a:rPr lang="en-US" smtClean="0"/>
-              <a:t>13</a:t>
-            </a:fld>
-            <a:endParaRPr lang="en-US"/>
+              <a:t>8/20/25</a:t>
+            </a:r>
           </a:p>
         </p:txBody>
       </p:sp>
@@ -7451,37 +7675,8 @@
             <a:pPr algn="ctr"/>
             <a:r>
               <a:rPr lang="en-US"/>
-              <a:t>1/9/25</a:t>
-            </a:r>
-          </a:p>
-        </p:txBody>
-      </p:sp>
-      <p:sp>
-        <p:nvSpPr>
-          <p:cNvPr id="5" name="Slide Number Placeholder 4">
-            <a:extLst>
-              <a:ext uri="{FF2B5EF4-FFF2-40B4-BE49-F238E27FC236}">
-                <a16:creationId xmlns:a16="http://schemas.microsoft.com/office/drawing/2014/main" id="{28B92659-919B-A35F-BA96-33BA1925F641}"/>
-              </a:ext>
-            </a:extLst>
-          </p:cNvPr>
-          <p:cNvSpPr>
-            <a:spLocks noGrp="1"/>
-          </p:cNvSpPr>
-          <p:nvPr>
-            <p:ph type="sldNum" sz="quarter" idx="12"/>
-          </p:nvPr>
-        </p:nvSpPr>
-        <p:spPr/>
-        <p:txBody>
-          <a:bodyPr/>
-          <a:lstStyle/>
-          <a:p>
-            <a:fld id="{ABDA560F-461C-6043-9BC4-489BA92F7161}" type="slidenum">
-              <a:rPr lang="en-US" smtClean="0"/>
-              <a:t>14</a:t>
-            </a:fld>
-            <a:endParaRPr lang="en-US"/>
+              <a:t>8/20/25</a:t>
+            </a:r>
           </a:p>
         </p:txBody>
       </p:sp>
@@ -9926,37 +10121,8 @@
             <a:pPr algn="ctr"/>
             <a:r>
               <a:rPr lang="en-US"/>
-              <a:t>1/9/25</a:t>
-            </a:r>
-          </a:p>
-        </p:txBody>
-      </p:sp>
-      <p:sp>
-        <p:nvSpPr>
-          <p:cNvPr id="5" name="Slide Number Placeholder 4">
-            <a:extLst>
-              <a:ext uri="{FF2B5EF4-FFF2-40B4-BE49-F238E27FC236}">
-                <a16:creationId xmlns:a16="http://schemas.microsoft.com/office/drawing/2014/main" id="{60E085E6-3FF9-B283-DB43-4334640E2A15}"/>
-              </a:ext>
-            </a:extLst>
-          </p:cNvPr>
-          <p:cNvSpPr>
-            <a:spLocks noGrp="1"/>
-          </p:cNvSpPr>
-          <p:nvPr>
-            <p:ph type="sldNum" sz="quarter" idx="12"/>
-          </p:nvPr>
-        </p:nvSpPr>
-        <p:spPr/>
-        <p:txBody>
-          <a:bodyPr/>
-          <a:lstStyle/>
-          <a:p>
-            <a:fld id="{ABDA560F-461C-6043-9BC4-489BA92F7161}" type="slidenum">
-              <a:rPr lang="en-US" smtClean="0"/>
-              <a:t>15</a:t>
-            </a:fld>
-            <a:endParaRPr lang="en-US"/>
+              <a:t>8/20/25</a:t>
+            </a:r>
           </a:p>
         </p:txBody>
       </p:sp>
@@ -10048,37 +10214,8 @@
             <a:pPr algn="ctr"/>
             <a:r>
               <a:rPr lang="en-US"/>
-              <a:t>1/9/25</a:t>
-            </a:r>
-          </a:p>
-        </p:txBody>
-      </p:sp>
-      <p:sp>
-        <p:nvSpPr>
-          <p:cNvPr id="5" name="Slide Number Placeholder 4">
-            <a:extLst>
-              <a:ext uri="{FF2B5EF4-FFF2-40B4-BE49-F238E27FC236}">
-                <a16:creationId xmlns:a16="http://schemas.microsoft.com/office/drawing/2014/main" id="{B56EA042-C86E-8A83-DDA4-9FCEA90C050F}"/>
-              </a:ext>
-            </a:extLst>
-          </p:cNvPr>
-          <p:cNvSpPr>
-            <a:spLocks noGrp="1"/>
-          </p:cNvSpPr>
-          <p:nvPr>
-            <p:ph type="sldNum" sz="quarter" idx="12"/>
-          </p:nvPr>
-        </p:nvSpPr>
-        <p:spPr/>
-        <p:txBody>
-          <a:bodyPr/>
-          <a:lstStyle/>
-          <a:p>
-            <a:fld id="{ABDA560F-461C-6043-9BC4-489BA92F7161}" type="slidenum">
-              <a:rPr lang="en-US" smtClean="0"/>
-              <a:t>16</a:t>
-            </a:fld>
-            <a:endParaRPr lang="en-US"/>
+              <a:t>8/20/25</a:t>
+            </a:r>
           </a:p>
         </p:txBody>
       </p:sp>
@@ -10556,37 +10693,8 @@
             <a:pPr algn="ctr"/>
             <a:r>
               <a:rPr lang="en-US"/>
-              <a:t>1/9/25</a:t>
-            </a:r>
-          </a:p>
-        </p:txBody>
-      </p:sp>
-      <p:sp>
-        <p:nvSpPr>
-          <p:cNvPr id="5" name="Slide Number Placeholder 4">
-            <a:extLst>
-              <a:ext uri="{FF2B5EF4-FFF2-40B4-BE49-F238E27FC236}">
-                <a16:creationId xmlns:a16="http://schemas.microsoft.com/office/drawing/2014/main" id="{A5817518-7C3C-7486-7550-B240F33363D0}"/>
-              </a:ext>
-            </a:extLst>
-          </p:cNvPr>
-          <p:cNvSpPr>
-            <a:spLocks noGrp="1"/>
-          </p:cNvSpPr>
-          <p:nvPr>
-            <p:ph type="sldNum" sz="quarter" idx="12"/>
-          </p:nvPr>
-        </p:nvSpPr>
-        <p:spPr/>
-        <p:txBody>
-          <a:bodyPr/>
-          <a:lstStyle/>
-          <a:p>
-            <a:fld id="{ABDA560F-461C-6043-9BC4-489BA92F7161}" type="slidenum">
-              <a:rPr lang="en-US" smtClean="0"/>
-              <a:t>17</a:t>
-            </a:fld>
-            <a:endParaRPr lang="en-US"/>
+              <a:t>8/20/25</a:t>
+            </a:r>
           </a:p>
         </p:txBody>
       </p:sp>
@@ -10672,37 +10780,8 @@
             <a:pPr algn="ctr"/>
             <a:r>
               <a:rPr lang="en-US"/>
-              <a:t>1/9/25</a:t>
-            </a:r>
-          </a:p>
-        </p:txBody>
-      </p:sp>
-      <p:sp>
-        <p:nvSpPr>
-          <p:cNvPr id="5" name="Slide Number Placeholder 4">
-            <a:extLst>
-              <a:ext uri="{FF2B5EF4-FFF2-40B4-BE49-F238E27FC236}">
-                <a16:creationId xmlns:a16="http://schemas.microsoft.com/office/drawing/2014/main" id="{CD975F59-F345-4EA8-1AA4-9325A5760832}"/>
-              </a:ext>
-            </a:extLst>
-          </p:cNvPr>
-          <p:cNvSpPr>
-            <a:spLocks noGrp="1"/>
-          </p:cNvSpPr>
-          <p:nvPr>
-            <p:ph type="sldNum" sz="quarter" idx="12"/>
-          </p:nvPr>
-        </p:nvSpPr>
-        <p:spPr/>
-        <p:txBody>
-          <a:bodyPr/>
-          <a:lstStyle/>
-          <a:p>
-            <a:fld id="{ABDA560F-461C-6043-9BC4-489BA92F7161}" type="slidenum">
-              <a:rPr lang="en-US" smtClean="0"/>
-              <a:t>18</a:t>
-            </a:fld>
-            <a:endParaRPr lang="en-US"/>
+              <a:t>8/20/25</a:t>
+            </a:r>
           </a:p>
         </p:txBody>
       </p:sp>
@@ -10721,7 +10800,7 @@
         <p:spPr>
           <a:xfrm>
             <a:off x="812442" y="1830091"/>
-            <a:ext cx="10515600" cy="4014900"/>
+            <a:ext cx="10515600" cy="4321671"/>
           </a:xfrm>
           <a:prstGeom prst="rect">
             <a:avLst/>
@@ -10989,6 +11068,58 @@
                 <a:sym typeface="Consolas"/>
               </a:rPr>
               <a:t>      	# Specify Alpine CPU node</a:t>
+            </a:r>
+          </a:p>
+          <a:p>
+            <a:pPr marL="0" marR="0" lvl="0" indent="0" algn="l" rtl="0">
+              <a:spcBef>
+                <a:spcPts val="0"/>
+              </a:spcBef>
+              <a:spcAft>
+                <a:spcPts val="0"/>
+              </a:spcAft>
+              <a:buClr>
+                <a:schemeClr val="dk1"/>
+              </a:buClr>
+              <a:buSzPts val="1100"/>
+              <a:buFont typeface="Arial"/>
+              <a:buNone/>
+            </a:pPr>
+            <a:r>
+              <a:rPr lang="en-US" sz="2000" b="1" dirty="0">
+                <a:solidFill>
+                  <a:srgbClr val="0070C0"/>
+                </a:solidFill>
+                <a:latin typeface="Consolas"/>
+                <a:ea typeface="Consolas"/>
+                <a:cs typeface="Consolas"/>
+                <a:sym typeface="Consolas"/>
+              </a:rPr>
+              <a:t> #SBATCH –-</a:t>
+            </a:r>
+            <a:r>
+              <a:rPr lang="en-US" sz="2000" b="1" dirty="0" err="1">
+                <a:solidFill>
+                  <a:srgbClr val="0070C0"/>
+                </a:solidFill>
+                <a:latin typeface="Consolas"/>
+                <a:ea typeface="Consolas"/>
+                <a:cs typeface="Consolas"/>
+                <a:sym typeface="Consolas"/>
+              </a:rPr>
+              <a:t>qos</a:t>
+            </a:r>
+            <a:r>
+              <a:rPr lang="en-US" sz="2000" b="1" dirty="0">
+                <a:solidFill>
+                  <a:srgbClr val="0070C0"/>
+                </a:solidFill>
+                <a:latin typeface="Consolas"/>
+                <a:ea typeface="Consolas"/>
+                <a:cs typeface="Consolas"/>
+                <a:sym typeface="Consolas"/>
+              </a:rPr>
+              <a:t>=normal                  # Specify QoS</a:t>
             </a:r>
             <a:endParaRPr sz="2000" b="1" dirty="0">
               <a:solidFill>
@@ -11400,37 +11531,8 @@
             <a:pPr algn="ctr"/>
             <a:r>
               <a:rPr lang="en-US"/>
-              <a:t>1/9/25</a:t>
-            </a:r>
-          </a:p>
-        </p:txBody>
-      </p:sp>
-      <p:sp>
-        <p:nvSpPr>
-          <p:cNvPr id="5" name="Slide Number Placeholder 4">
-            <a:extLst>
-              <a:ext uri="{FF2B5EF4-FFF2-40B4-BE49-F238E27FC236}">
-                <a16:creationId xmlns:a16="http://schemas.microsoft.com/office/drawing/2014/main" id="{C7A43A6D-36CC-2497-91D7-3D0FF7E061FC}"/>
-              </a:ext>
-            </a:extLst>
-          </p:cNvPr>
-          <p:cNvSpPr>
-            <a:spLocks noGrp="1"/>
-          </p:cNvSpPr>
-          <p:nvPr>
-            <p:ph type="sldNum" sz="quarter" idx="12"/>
-          </p:nvPr>
-        </p:nvSpPr>
-        <p:spPr/>
-        <p:txBody>
-          <a:bodyPr/>
-          <a:lstStyle/>
-          <a:p>
-            <a:fld id="{ABDA560F-461C-6043-9BC4-489BA92F7161}" type="slidenum">
-              <a:rPr lang="en-US" smtClean="0"/>
-              <a:t>19</a:t>
-            </a:fld>
-            <a:endParaRPr lang="en-US"/>
+              <a:t>8/20/25</a:t>
+            </a:r>
           </a:p>
         </p:txBody>
       </p:sp>
@@ -11724,38 +11826,9 @@
             <a:pPr algn="ctr"/>
             <a:r>
               <a:rPr lang="en-US"/>
-              <a:t>1/9/25</a:t>
+              <a:t>8/20/25</a:t>
             </a:r>
             <a:endParaRPr lang="en-US" dirty="0"/>
-          </a:p>
-        </p:txBody>
-      </p:sp>
-      <p:sp>
-        <p:nvSpPr>
-          <p:cNvPr id="7" name="Slide Number Placeholder 6">
-            <a:extLst>
-              <a:ext uri="{FF2B5EF4-FFF2-40B4-BE49-F238E27FC236}">
-                <a16:creationId xmlns:a16="http://schemas.microsoft.com/office/drawing/2014/main" id="{CA99CC0F-C097-D682-7893-512CA8823C8D}"/>
-              </a:ext>
-            </a:extLst>
-          </p:cNvPr>
-          <p:cNvSpPr>
-            <a:spLocks noGrp="1"/>
-          </p:cNvSpPr>
-          <p:nvPr>
-            <p:ph type="sldNum" sz="quarter" idx="12"/>
-          </p:nvPr>
-        </p:nvSpPr>
-        <p:spPr/>
-        <p:txBody>
-          <a:bodyPr/>
-          <a:lstStyle/>
-          <a:p>
-            <a:fld id="{ABDA560F-461C-6043-9BC4-489BA92F7161}" type="slidenum">
-              <a:rPr lang="en-US" smtClean="0"/>
-              <a:t>2</a:t>
-            </a:fld>
-            <a:endParaRPr lang="en-US"/>
           </a:p>
         </p:txBody>
       </p:sp>
@@ -12169,37 +12242,8 @@
             <a:pPr algn="ctr"/>
             <a:r>
               <a:rPr lang="en-US"/>
-              <a:t>1/9/25</a:t>
-            </a:r>
-          </a:p>
-        </p:txBody>
-      </p:sp>
-      <p:sp>
-        <p:nvSpPr>
-          <p:cNvPr id="5" name="Slide Number Placeholder 4">
-            <a:extLst>
-              <a:ext uri="{FF2B5EF4-FFF2-40B4-BE49-F238E27FC236}">
-                <a16:creationId xmlns:a16="http://schemas.microsoft.com/office/drawing/2014/main" id="{1F50737D-66FA-C703-124B-F9796C11B486}"/>
-              </a:ext>
-            </a:extLst>
-          </p:cNvPr>
-          <p:cNvSpPr>
-            <a:spLocks noGrp="1"/>
-          </p:cNvSpPr>
-          <p:nvPr>
-            <p:ph type="sldNum" sz="quarter" idx="12"/>
-          </p:nvPr>
-        </p:nvSpPr>
-        <p:spPr/>
-        <p:txBody>
-          <a:bodyPr/>
-          <a:lstStyle/>
-          <a:p>
-            <a:fld id="{ABDA560F-461C-6043-9BC4-489BA92F7161}" type="slidenum">
-              <a:rPr lang="en-US" smtClean="0"/>
-              <a:t>20</a:t>
-            </a:fld>
-            <a:endParaRPr lang="en-US"/>
+              <a:t>8/20/25</a:t>
+            </a:r>
           </a:p>
         </p:txBody>
       </p:sp>
@@ -12291,38 +12335,9 @@
             <a:pPr algn="ctr"/>
             <a:r>
               <a:rPr lang="en-US"/>
-              <a:t>1/9/25</a:t>
+              <a:t>8/20/25</a:t>
             </a:r>
             <a:endParaRPr lang="en-US" dirty="0"/>
-          </a:p>
-        </p:txBody>
-      </p:sp>
-      <p:sp>
-        <p:nvSpPr>
-          <p:cNvPr id="5" name="Slide Number Placeholder 4">
-            <a:extLst>
-              <a:ext uri="{FF2B5EF4-FFF2-40B4-BE49-F238E27FC236}">
-                <a16:creationId xmlns:a16="http://schemas.microsoft.com/office/drawing/2014/main" id="{83D3D142-3965-8480-1AB8-3F2A8FDE4AF0}"/>
-              </a:ext>
-            </a:extLst>
-          </p:cNvPr>
-          <p:cNvSpPr>
-            <a:spLocks noGrp="1"/>
-          </p:cNvSpPr>
-          <p:nvPr>
-            <p:ph type="sldNum" sz="quarter" idx="12"/>
-          </p:nvPr>
-        </p:nvSpPr>
-        <p:spPr/>
-        <p:txBody>
-          <a:bodyPr/>
-          <a:lstStyle/>
-          <a:p>
-            <a:fld id="{ABDA560F-461C-6043-9BC4-489BA92F7161}" type="slidenum">
-              <a:rPr lang="en-US" smtClean="0"/>
-              <a:t>21</a:t>
-            </a:fld>
-            <a:endParaRPr lang="en-US"/>
           </a:p>
         </p:txBody>
       </p:sp>
@@ -13082,37 +13097,8 @@
             <a:pPr algn="ctr"/>
             <a:r>
               <a:rPr lang="en-US"/>
-              <a:t>1/9/25</a:t>
-            </a:r>
-          </a:p>
-        </p:txBody>
-      </p:sp>
-      <p:sp>
-        <p:nvSpPr>
-          <p:cNvPr id="5" name="Slide Number Placeholder 4">
-            <a:extLst>
-              <a:ext uri="{FF2B5EF4-FFF2-40B4-BE49-F238E27FC236}">
-                <a16:creationId xmlns:a16="http://schemas.microsoft.com/office/drawing/2014/main" id="{7FE68F90-C29C-92B8-8CDB-03DAFA15308E}"/>
-              </a:ext>
-            </a:extLst>
-          </p:cNvPr>
-          <p:cNvSpPr>
-            <a:spLocks noGrp="1"/>
-          </p:cNvSpPr>
-          <p:nvPr>
-            <p:ph type="sldNum" sz="quarter" idx="12"/>
-          </p:nvPr>
-        </p:nvSpPr>
-        <p:spPr/>
-        <p:txBody>
-          <a:bodyPr/>
-          <a:lstStyle/>
-          <a:p>
-            <a:fld id="{ABDA560F-461C-6043-9BC4-489BA92F7161}" type="slidenum">
-              <a:rPr lang="en-US" smtClean="0"/>
-              <a:t>22</a:t>
-            </a:fld>
-            <a:endParaRPr lang="en-US"/>
+              <a:t>8/20/25</a:t>
+            </a:r>
           </a:p>
         </p:txBody>
       </p:sp>
@@ -13476,37 +13462,8 @@
             <a:pPr algn="ctr"/>
             <a:r>
               <a:rPr lang="en-US"/>
-              <a:t>1/9/25</a:t>
-            </a:r>
-          </a:p>
-        </p:txBody>
-      </p:sp>
-      <p:sp>
-        <p:nvSpPr>
-          <p:cNvPr id="5" name="Slide Number Placeholder 4">
-            <a:extLst>
-              <a:ext uri="{FF2B5EF4-FFF2-40B4-BE49-F238E27FC236}">
-                <a16:creationId xmlns:a16="http://schemas.microsoft.com/office/drawing/2014/main" id="{813D1D42-9544-C2DC-C78C-716268421B35}"/>
-              </a:ext>
-            </a:extLst>
-          </p:cNvPr>
-          <p:cNvSpPr>
-            <a:spLocks noGrp="1"/>
-          </p:cNvSpPr>
-          <p:nvPr>
-            <p:ph type="sldNum" sz="quarter" idx="12"/>
-          </p:nvPr>
-        </p:nvSpPr>
-        <p:spPr/>
-        <p:txBody>
-          <a:bodyPr/>
-          <a:lstStyle/>
-          <a:p>
-            <a:fld id="{ABDA560F-461C-6043-9BC4-489BA92F7161}" type="slidenum">
-              <a:rPr lang="en-US" smtClean="0"/>
-              <a:t>23</a:t>
-            </a:fld>
-            <a:endParaRPr lang="en-US"/>
+              <a:t>8/20/25</a:t>
+            </a:r>
           </a:p>
         </p:txBody>
       </p:sp>
@@ -13597,37 +13554,8 @@
             <a:pPr algn="ctr"/>
             <a:r>
               <a:rPr lang="en-US"/>
-              <a:t>1/9/25</a:t>
-            </a:r>
-          </a:p>
-        </p:txBody>
-      </p:sp>
-      <p:sp>
-        <p:nvSpPr>
-          <p:cNvPr id="5" name="Slide Number Placeholder 4">
-            <a:extLst>
-              <a:ext uri="{FF2B5EF4-FFF2-40B4-BE49-F238E27FC236}">
-                <a16:creationId xmlns:a16="http://schemas.microsoft.com/office/drawing/2014/main" id="{A80EC109-3C13-7E3C-DDC8-A445DE8CF4CC}"/>
-              </a:ext>
-            </a:extLst>
-          </p:cNvPr>
-          <p:cNvSpPr>
-            <a:spLocks noGrp="1"/>
-          </p:cNvSpPr>
-          <p:nvPr>
-            <p:ph type="sldNum" sz="quarter" idx="12"/>
-          </p:nvPr>
-        </p:nvSpPr>
-        <p:spPr/>
-        <p:txBody>
-          <a:bodyPr/>
-          <a:lstStyle/>
-          <a:p>
-            <a:fld id="{ABDA560F-461C-6043-9BC4-489BA92F7161}" type="slidenum">
-              <a:rPr lang="en-US" smtClean="0"/>
-              <a:t>24</a:t>
-            </a:fld>
-            <a:endParaRPr lang="en-US"/>
+              <a:t>8/20/25</a:t>
+            </a:r>
           </a:p>
         </p:txBody>
       </p:sp>
@@ -13645,8 +13573,8 @@
         </p:nvSpPr>
         <p:spPr>
           <a:xfrm>
-            <a:off x="838200" y="1496716"/>
-            <a:ext cx="10515600" cy="4629447"/>
+            <a:off x="838200" y="1206570"/>
+            <a:ext cx="10515600" cy="4937224"/>
           </a:xfrm>
           <a:prstGeom prst="rect">
             <a:avLst/>
@@ -13914,6 +13842,50 @@
                 <a:sym typeface="Consolas"/>
               </a:rPr>
               <a:t>      	# Specify Alpine CPU node</a:t>
+            </a:r>
+          </a:p>
+          <a:p>
+            <a:pPr>
+              <a:buClr>
+                <a:schemeClr val="dk1"/>
+              </a:buClr>
+              <a:buSzPts val="1100"/>
+            </a:pPr>
+            <a:r>
+              <a:rPr lang="en-US" sz="2000" b="1" dirty="0">
+                <a:solidFill>
+                  <a:srgbClr val="0070C0"/>
+                </a:solidFill>
+                <a:latin typeface="Consolas"/>
+                <a:ea typeface="Consolas"/>
+                <a:cs typeface="Consolas"/>
+                <a:sym typeface="Consolas"/>
+              </a:rPr>
+              <a:t> #SBATCH –-</a:t>
+            </a:r>
+            <a:r>
+              <a:rPr lang="en-US" sz="2000" b="1" dirty="0" err="1">
+                <a:solidFill>
+                  <a:srgbClr val="0070C0"/>
+                </a:solidFill>
+                <a:latin typeface="Consolas"/>
+                <a:ea typeface="Consolas"/>
+                <a:cs typeface="Consolas"/>
+                <a:sym typeface="Consolas"/>
+              </a:rPr>
+              <a:t>qos</a:t>
+            </a:r>
+            <a:r>
+              <a:rPr lang="en-US" sz="2000" b="1" dirty="0">
+                <a:solidFill>
+                  <a:srgbClr val="0070C0"/>
+                </a:solidFill>
+                <a:latin typeface="Consolas"/>
+                <a:ea typeface="Consolas"/>
+                <a:cs typeface="Consolas"/>
+                <a:sym typeface="Consolas"/>
+              </a:rPr>
+              <a:t>=normal                  # Specify QoS</a:t>
             </a:r>
             <a:endParaRPr sz="2000" b="1" dirty="0">
               <a:solidFill>
@@ -14517,38 +14489,9 @@
             <a:pPr algn="ctr"/>
             <a:r>
               <a:rPr lang="en-US"/>
-              <a:t>1/9/25</a:t>
+              <a:t>8/20/25</a:t>
             </a:r>
             <a:endParaRPr lang="en-US" dirty="0"/>
-          </a:p>
-        </p:txBody>
-      </p:sp>
-      <p:sp>
-        <p:nvSpPr>
-          <p:cNvPr id="5" name="Slide Number Placeholder 4">
-            <a:extLst>
-              <a:ext uri="{FF2B5EF4-FFF2-40B4-BE49-F238E27FC236}">
-                <a16:creationId xmlns:a16="http://schemas.microsoft.com/office/drawing/2014/main" id="{9B5C126B-89FC-72C8-59A3-0FCCDCDAA3BD}"/>
-              </a:ext>
-            </a:extLst>
-          </p:cNvPr>
-          <p:cNvSpPr>
-            <a:spLocks noGrp="1"/>
-          </p:cNvSpPr>
-          <p:nvPr>
-            <p:ph type="sldNum" sz="quarter" idx="12"/>
-          </p:nvPr>
-        </p:nvSpPr>
-        <p:spPr/>
-        <p:txBody>
-          <a:bodyPr/>
-          <a:lstStyle/>
-          <a:p>
-            <a:fld id="{ABDA560F-461C-6043-9BC4-489BA92F7161}" type="slidenum">
-              <a:rPr lang="en-US" smtClean="0"/>
-              <a:t>25</a:t>
-            </a:fld>
-            <a:endParaRPr lang="en-US"/>
           </a:p>
         </p:txBody>
       </p:sp>
@@ -14717,37 +14660,8 @@
             <a:pPr algn="ctr"/>
             <a:r>
               <a:rPr lang="en-US"/>
-              <a:t>1/9/25</a:t>
-            </a:r>
-          </a:p>
-        </p:txBody>
-      </p:sp>
-      <p:sp>
-        <p:nvSpPr>
-          <p:cNvPr id="5" name="Slide Number Placeholder 4">
-            <a:extLst>
-              <a:ext uri="{FF2B5EF4-FFF2-40B4-BE49-F238E27FC236}">
-                <a16:creationId xmlns:a16="http://schemas.microsoft.com/office/drawing/2014/main" id="{96143048-956C-658F-9280-F986F073F30D}"/>
-              </a:ext>
-            </a:extLst>
-          </p:cNvPr>
-          <p:cNvSpPr>
-            <a:spLocks noGrp="1"/>
-          </p:cNvSpPr>
-          <p:nvPr>
-            <p:ph type="sldNum" sz="quarter" idx="12"/>
-          </p:nvPr>
-        </p:nvSpPr>
-        <p:spPr/>
-        <p:txBody>
-          <a:bodyPr/>
-          <a:lstStyle/>
-          <a:p>
-            <a:fld id="{ABDA560F-461C-6043-9BC4-489BA92F7161}" type="slidenum">
-              <a:rPr lang="en-US" smtClean="0"/>
-              <a:t>26</a:t>
-            </a:fld>
-            <a:endParaRPr lang="en-US"/>
+              <a:t>8/20/25</a:t>
+            </a:r>
           </a:p>
         </p:txBody>
       </p:sp>
@@ -15255,37 +15169,8 @@
             <a:pPr algn="ctr"/>
             <a:r>
               <a:rPr lang="en-US"/>
-              <a:t>1/9/25</a:t>
-            </a:r>
-          </a:p>
-        </p:txBody>
-      </p:sp>
-      <p:sp>
-        <p:nvSpPr>
-          <p:cNvPr id="5" name="Slide Number Placeholder 4">
-            <a:extLst>
-              <a:ext uri="{FF2B5EF4-FFF2-40B4-BE49-F238E27FC236}">
-                <a16:creationId xmlns:a16="http://schemas.microsoft.com/office/drawing/2014/main" id="{C65E6C70-B83E-24F1-D16B-02295BCF1D88}"/>
-              </a:ext>
-            </a:extLst>
-          </p:cNvPr>
-          <p:cNvSpPr>
-            <a:spLocks noGrp="1"/>
-          </p:cNvSpPr>
-          <p:nvPr>
-            <p:ph type="sldNum" sz="quarter" idx="12"/>
-          </p:nvPr>
-        </p:nvSpPr>
-        <p:spPr/>
-        <p:txBody>
-          <a:bodyPr/>
-          <a:lstStyle/>
-          <a:p>
-            <a:fld id="{ABDA560F-461C-6043-9BC4-489BA92F7161}" type="slidenum">
-              <a:rPr lang="en-US" smtClean="0"/>
-              <a:t>27</a:t>
-            </a:fld>
-            <a:endParaRPr lang="en-US"/>
+              <a:t>8/20/25</a:t>
+            </a:r>
           </a:p>
         </p:txBody>
       </p:sp>
@@ -15413,38 +15298,9 @@
             <a:pPr algn="ctr"/>
             <a:r>
               <a:rPr lang="en-US"/>
-              <a:t>1/9/25</a:t>
+              <a:t>8/20/25</a:t>
             </a:r>
             <a:endParaRPr lang="en-US" dirty="0"/>
-          </a:p>
-        </p:txBody>
-      </p:sp>
-      <p:sp>
-        <p:nvSpPr>
-          <p:cNvPr id="6" name="Slide Number Placeholder 5">
-            <a:extLst>
-              <a:ext uri="{FF2B5EF4-FFF2-40B4-BE49-F238E27FC236}">
-                <a16:creationId xmlns:a16="http://schemas.microsoft.com/office/drawing/2014/main" id="{7E7B95E0-165A-0A76-F51A-685152A503D8}"/>
-              </a:ext>
-            </a:extLst>
-          </p:cNvPr>
-          <p:cNvSpPr>
-            <a:spLocks noGrp="1"/>
-          </p:cNvSpPr>
-          <p:nvPr>
-            <p:ph type="sldNum" sz="quarter" idx="12"/>
-          </p:nvPr>
-        </p:nvSpPr>
-        <p:spPr/>
-        <p:txBody>
-          <a:bodyPr/>
-          <a:lstStyle/>
-          <a:p>
-            <a:fld id="{ABDA560F-461C-6043-9BC4-489BA92F7161}" type="slidenum">
-              <a:rPr lang="en-US" smtClean="0"/>
-              <a:t>28</a:t>
-            </a:fld>
-            <a:endParaRPr lang="en-US"/>
           </a:p>
         </p:txBody>
       </p:sp>
@@ -15588,38 +15444,9 @@
             <a:pPr algn="ctr"/>
             <a:r>
               <a:rPr lang="en-US"/>
-              <a:t>1/9/25</a:t>
+              <a:t>8/20/25</a:t>
             </a:r>
             <a:endParaRPr lang="en-US" dirty="0"/>
-          </a:p>
-        </p:txBody>
-      </p:sp>
-      <p:sp>
-        <p:nvSpPr>
-          <p:cNvPr id="7" name="Slide Number Placeholder 6">
-            <a:extLst>
-              <a:ext uri="{FF2B5EF4-FFF2-40B4-BE49-F238E27FC236}">
-                <a16:creationId xmlns:a16="http://schemas.microsoft.com/office/drawing/2014/main" id="{CA99CC0F-C097-D682-7893-512CA8823C8D}"/>
-              </a:ext>
-            </a:extLst>
-          </p:cNvPr>
-          <p:cNvSpPr>
-            <a:spLocks noGrp="1"/>
-          </p:cNvSpPr>
-          <p:nvPr>
-            <p:ph type="sldNum" sz="quarter" idx="12"/>
-          </p:nvPr>
-        </p:nvSpPr>
-        <p:spPr/>
-        <p:txBody>
-          <a:bodyPr/>
-          <a:lstStyle/>
-          <a:p>
-            <a:fld id="{ABDA560F-461C-6043-9BC4-489BA92F7161}" type="slidenum">
-              <a:rPr lang="en-US" smtClean="0"/>
-              <a:t>3</a:t>
-            </a:fld>
-            <a:endParaRPr lang="en-US"/>
           </a:p>
         </p:txBody>
       </p:sp>
@@ -15925,38 +15752,9 @@
             <a:pPr algn="ctr"/>
             <a:r>
               <a:rPr lang="en-US"/>
-              <a:t>1/9/25</a:t>
+              <a:t>8/20/25</a:t>
             </a:r>
             <a:endParaRPr lang="en-US" dirty="0"/>
-          </a:p>
-        </p:txBody>
-      </p:sp>
-      <p:sp>
-        <p:nvSpPr>
-          <p:cNvPr id="7" name="Slide Number Placeholder 6">
-            <a:extLst>
-              <a:ext uri="{FF2B5EF4-FFF2-40B4-BE49-F238E27FC236}">
-                <a16:creationId xmlns:a16="http://schemas.microsoft.com/office/drawing/2014/main" id="{CA99CC0F-C097-D682-7893-512CA8823C8D}"/>
-              </a:ext>
-            </a:extLst>
-          </p:cNvPr>
-          <p:cNvSpPr>
-            <a:spLocks noGrp="1"/>
-          </p:cNvSpPr>
-          <p:nvPr>
-            <p:ph type="sldNum" sz="quarter" idx="12"/>
-          </p:nvPr>
-        </p:nvSpPr>
-        <p:spPr/>
-        <p:txBody>
-          <a:bodyPr/>
-          <a:lstStyle/>
-          <a:p>
-            <a:fld id="{ABDA560F-461C-6043-9BC4-489BA92F7161}" type="slidenum">
-              <a:rPr lang="en-US" smtClean="0"/>
-              <a:t>4</a:t>
-            </a:fld>
-            <a:endParaRPr lang="en-US"/>
           </a:p>
         </p:txBody>
       </p:sp>
@@ -16373,37 +16171,8 @@
             <a:pPr algn="ctr"/>
             <a:r>
               <a:rPr lang="en-US"/>
-              <a:t>1/9/25</a:t>
-            </a:r>
-          </a:p>
-        </p:txBody>
-      </p:sp>
-      <p:sp>
-        <p:nvSpPr>
-          <p:cNvPr id="5" name="Slide Number Placeholder 4">
-            <a:extLst>
-              <a:ext uri="{FF2B5EF4-FFF2-40B4-BE49-F238E27FC236}">
-                <a16:creationId xmlns:a16="http://schemas.microsoft.com/office/drawing/2014/main" id="{67A0DE76-D725-4B32-C77F-39813BFB5C06}"/>
-              </a:ext>
-            </a:extLst>
-          </p:cNvPr>
-          <p:cNvSpPr>
-            <a:spLocks noGrp="1"/>
-          </p:cNvSpPr>
-          <p:nvPr>
-            <p:ph type="sldNum" sz="quarter" idx="12"/>
-          </p:nvPr>
-        </p:nvSpPr>
-        <p:spPr/>
-        <p:txBody>
-          <a:bodyPr/>
-          <a:lstStyle/>
-          <a:p>
-            <a:fld id="{ABDA560F-461C-6043-9BC4-489BA92F7161}" type="slidenum">
-              <a:rPr lang="en-US" smtClean="0"/>
-              <a:t>5</a:t>
-            </a:fld>
-            <a:endParaRPr lang="en-US"/>
+              <a:t>8/20/25</a:t>
+            </a:r>
           </a:p>
         </p:txBody>
       </p:sp>
@@ -16461,37 +16230,8 @@
             <a:pPr algn="ctr"/>
             <a:r>
               <a:rPr lang="en-US"/>
-              <a:t>1/9/25</a:t>
-            </a:r>
-          </a:p>
-        </p:txBody>
-      </p:sp>
-      <p:sp>
-        <p:nvSpPr>
-          <p:cNvPr id="5" name="Slide Number Placeholder 4">
-            <a:extLst>
-              <a:ext uri="{FF2B5EF4-FFF2-40B4-BE49-F238E27FC236}">
-                <a16:creationId xmlns:a16="http://schemas.microsoft.com/office/drawing/2014/main" id="{9EDBB18D-FB7D-F2BF-A154-79E6A3457C0D}"/>
-              </a:ext>
-            </a:extLst>
-          </p:cNvPr>
-          <p:cNvSpPr>
-            <a:spLocks noGrp="1"/>
-          </p:cNvSpPr>
-          <p:nvPr>
-            <p:ph type="sldNum" sz="quarter" idx="12"/>
-          </p:nvPr>
-        </p:nvSpPr>
-        <p:spPr/>
-        <p:txBody>
-          <a:bodyPr/>
-          <a:lstStyle/>
-          <a:p>
-            <a:fld id="{ABDA560F-461C-6043-9BC4-489BA92F7161}" type="slidenum">
-              <a:rPr lang="en-US" smtClean="0"/>
-              <a:t>6</a:t>
-            </a:fld>
-            <a:endParaRPr lang="en-US"/>
+              <a:t>8/20/25</a:t>
+            </a:r>
           </a:p>
         </p:txBody>
       </p:sp>
@@ -17512,37 +17252,8 @@
             <a:pPr algn="ctr"/>
             <a:r>
               <a:rPr lang="en-US"/>
-              <a:t>1/9/25</a:t>
-            </a:r>
-          </a:p>
-        </p:txBody>
-      </p:sp>
-      <p:sp>
-        <p:nvSpPr>
-          <p:cNvPr id="5" name="Slide Number Placeholder 4">
-            <a:extLst>
-              <a:ext uri="{FF2B5EF4-FFF2-40B4-BE49-F238E27FC236}">
-                <a16:creationId xmlns:a16="http://schemas.microsoft.com/office/drawing/2014/main" id="{6BC0BA34-4647-DD97-BF22-5A73D676A452}"/>
-              </a:ext>
-            </a:extLst>
-          </p:cNvPr>
-          <p:cNvSpPr>
-            <a:spLocks noGrp="1"/>
-          </p:cNvSpPr>
-          <p:nvPr>
-            <p:ph type="sldNum" sz="quarter" idx="12"/>
-          </p:nvPr>
-        </p:nvSpPr>
-        <p:spPr/>
-        <p:txBody>
-          <a:bodyPr/>
-          <a:lstStyle/>
-          <a:p>
-            <a:fld id="{ABDA560F-461C-6043-9BC4-489BA92F7161}" type="slidenum">
-              <a:rPr lang="en-US" smtClean="0"/>
-              <a:t>7</a:t>
-            </a:fld>
-            <a:endParaRPr lang="en-US"/>
+              <a:t>8/20/25</a:t>
+            </a:r>
           </a:p>
         </p:txBody>
       </p:sp>
@@ -17600,37 +17311,8 @@
             <a:pPr algn="ctr"/>
             <a:r>
               <a:rPr lang="en-US"/>
-              <a:t>1/9/25</a:t>
-            </a:r>
-          </a:p>
-        </p:txBody>
-      </p:sp>
-      <p:sp>
-        <p:nvSpPr>
-          <p:cNvPr id="5" name="Slide Number Placeholder 4">
-            <a:extLst>
-              <a:ext uri="{FF2B5EF4-FFF2-40B4-BE49-F238E27FC236}">
-                <a16:creationId xmlns:a16="http://schemas.microsoft.com/office/drawing/2014/main" id="{4B535282-6E52-E73D-C39C-46C39573D69A}"/>
-              </a:ext>
-            </a:extLst>
-          </p:cNvPr>
-          <p:cNvSpPr>
-            <a:spLocks noGrp="1"/>
-          </p:cNvSpPr>
-          <p:nvPr>
-            <p:ph type="sldNum" sz="quarter" idx="12"/>
-          </p:nvPr>
-        </p:nvSpPr>
-        <p:spPr/>
-        <p:txBody>
-          <a:bodyPr/>
-          <a:lstStyle/>
-          <a:p>
-            <a:fld id="{ABDA560F-461C-6043-9BC4-489BA92F7161}" type="slidenum">
-              <a:rPr lang="en-US" smtClean="0"/>
-              <a:t>8</a:t>
-            </a:fld>
-            <a:endParaRPr lang="en-US"/>
+              <a:t>8/20/25</a:t>
+            </a:r>
           </a:p>
         </p:txBody>
       </p:sp>
@@ -18423,37 +18105,8 @@
             <a:pPr algn="ctr"/>
             <a:r>
               <a:rPr lang="en-US"/>
-              <a:t>1/9/25</a:t>
-            </a:r>
-          </a:p>
-        </p:txBody>
-      </p:sp>
-      <p:sp>
-        <p:nvSpPr>
-          <p:cNvPr id="5" name="Slide Number Placeholder 4">
-            <a:extLst>
-              <a:ext uri="{FF2B5EF4-FFF2-40B4-BE49-F238E27FC236}">
-                <a16:creationId xmlns:a16="http://schemas.microsoft.com/office/drawing/2014/main" id="{F5F03354-C980-AA71-EAEC-E2C7E4B55E10}"/>
-              </a:ext>
-            </a:extLst>
-          </p:cNvPr>
-          <p:cNvSpPr>
-            <a:spLocks noGrp="1"/>
-          </p:cNvSpPr>
-          <p:nvPr>
-            <p:ph type="sldNum" sz="quarter" idx="12"/>
-          </p:nvPr>
-        </p:nvSpPr>
-        <p:spPr/>
-        <p:txBody>
-          <a:bodyPr/>
-          <a:lstStyle/>
-          <a:p>
-            <a:fld id="{ABDA560F-461C-6043-9BC4-489BA92F7161}" type="slidenum">
-              <a:rPr lang="en-US" smtClean="0"/>
-              <a:t>9</a:t>
-            </a:fld>
-            <a:endParaRPr lang="en-US"/>
+              <a:t>8/20/25</a:t>
+            </a:r>
           </a:p>
         </p:txBody>
       </p:sp>
@@ -19036,17 +18689,6 @@
 </file>
 
 <file path=customXml/item2.xml><?xml version="1.0" encoding="utf-8"?>
-<p:properties xmlns:p="http://schemas.microsoft.com/office/2006/metadata/properties" xmlns:xsi="http://www.w3.org/2001/XMLSchema-instance" xmlns:pc="http://schemas.microsoft.com/office/infopath/2007/PartnerControls">
-  <documentManagement>
-    <TaxCatchAll xmlns="92c16b9d-8c83-445e-a4f4-1fe3d2f43f13" xsi:nil="true"/>
-    <lcf76f155ced4ddcb4097134ff3c332f xmlns="7e49f7d3-8802-46ca-9604-495ce27f67f4">
-      <Terms xmlns="http://schemas.microsoft.com/office/infopath/2007/PartnerControls"/>
-    </lcf76f155ced4ddcb4097134ff3c332f>
-  </documentManagement>
-</p:properties>
-</file>
-
-<file path=customXml/item3.xml><?xml version="1.0" encoding="utf-8"?>
 <ct:contentTypeSchema xmlns:ct="http://schemas.microsoft.com/office/2006/metadata/contentType" xmlns:ma="http://schemas.microsoft.com/office/2006/metadata/properties/metaAttributes" ct:_="" ma:_="" ma:contentTypeName="Document" ma:contentTypeID="0x010100DC7320DB280744439FF1CC777D09ECA4" ma:contentTypeVersion="15" ma:contentTypeDescription="Create a new document." ma:contentTypeScope="" ma:versionID="e50b92032c956cc777cf00ac7d475189">
   <xsd:schema xmlns:xsd="http://www.w3.org/2001/XMLSchema" xmlns:xs="http://www.w3.org/2001/XMLSchema" xmlns:p="http://schemas.microsoft.com/office/2006/metadata/properties" xmlns:ns2="7e49f7d3-8802-46ca-9604-495ce27f67f4" xmlns:ns3="a1519f9a-9d6a-41c1-afc9-552e4069f82f" xmlns:ns4="92c16b9d-8c83-445e-a4f4-1fe3d2f43f13" targetNamespace="http://schemas.microsoft.com/office/2006/metadata/properties" ma:root="true" ma:fieldsID="fcd7cab68a23f1df7b42ced4f3edf141" ns2:_="" ns3:_="" ns4:_="">
     <xsd:import namespace="7e49f7d3-8802-46ca-9604-495ce27f67f4"/>
@@ -19288,6 +18930,17 @@
 </ct:contentTypeSchema>
 </file>
 
+<file path=customXml/item3.xml><?xml version="1.0" encoding="utf-8"?>
+<p:properties xmlns:p="http://schemas.microsoft.com/office/2006/metadata/properties" xmlns:xsi="http://www.w3.org/2001/XMLSchema-instance" xmlns:pc="http://schemas.microsoft.com/office/infopath/2007/PartnerControls">
+  <documentManagement>
+    <TaxCatchAll xmlns="92c16b9d-8c83-445e-a4f4-1fe3d2f43f13" xsi:nil="true"/>
+    <lcf76f155ced4ddcb4097134ff3c332f xmlns="7e49f7d3-8802-46ca-9604-495ce27f67f4">
+      <Terms xmlns="http://schemas.microsoft.com/office/infopath/2007/PartnerControls"/>
+    </lcf76f155ced4ddcb4097134ff3c332f>
+  </documentManagement>
+</p:properties>
+</file>
+
 <file path=customXml/itemProps1.xml><?xml version="1.0" encoding="utf-8"?>
 <ds:datastoreItem xmlns:ds="http://schemas.openxmlformats.org/officeDocument/2006/customXml" ds:itemID="{06B4C708-AA43-4CE7-BE2D-F9D9A02F4940}">
   <ds:schemaRefs>
@@ -19297,24 +18950,6 @@
 </file>
 
 <file path=customXml/itemProps2.xml><?xml version="1.0" encoding="utf-8"?>
-<ds:datastoreItem xmlns:ds="http://schemas.openxmlformats.org/officeDocument/2006/customXml" ds:itemID="{4AB02FF4-25A1-49FE-9DF7-DD19F525B7FA}">
-  <ds:schemaRefs>
-    <ds:schemaRef ds:uri="7e49f7d3-8802-46ca-9604-495ce27f67f4"/>
-    <ds:schemaRef ds:uri="92c16b9d-8c83-445e-a4f4-1fe3d2f43f13"/>
-    <ds:schemaRef ds:uri="a1519f9a-9d6a-41c1-afc9-552e4069f82f"/>
-    <ds:schemaRef ds:uri="http://purl.org/dc/dcmitype/"/>
-    <ds:schemaRef ds:uri="http://purl.org/dc/elements/1.1/"/>
-    <ds:schemaRef ds:uri="http://purl.org/dc/terms/"/>
-    <ds:schemaRef ds:uri="http://schemas.microsoft.com/office/2006/documentManagement/types"/>
-    <ds:schemaRef ds:uri="http://schemas.microsoft.com/office/2006/metadata/properties"/>
-    <ds:schemaRef ds:uri="http://schemas.microsoft.com/office/infopath/2007/PartnerControls"/>
-    <ds:schemaRef ds:uri="http://schemas.openxmlformats.org/package/2006/metadata/core-properties"/>
-    <ds:schemaRef ds:uri="http://www.w3.org/XML/1998/namespace"/>
-  </ds:schemaRefs>
-</ds:datastoreItem>
-</file>
-
-<file path=customXml/itemProps3.xml><?xml version="1.0" encoding="utf-8"?>
 <ds:datastoreItem xmlns:ds="http://schemas.openxmlformats.org/officeDocument/2006/customXml" ds:itemID="{6BBC22CE-40EC-4545-8FE9-90326628051D}">
   <ds:schemaRefs>
     <ds:schemaRef ds:uri="7e49f7d3-8802-46ca-9604-495ce27f67f4"/>
@@ -19332,4 +18967,22 @@
     <ds:schemaRef ds:uri="http://www.w3.org/2001/XMLSchema"/>
   </ds:schemaRefs>
 </ds:datastoreItem>
+</file>
+
+<file path=customXml/itemProps3.xml><?xml version="1.0" encoding="utf-8"?>
+<ds:datastoreItem xmlns:ds="http://schemas.openxmlformats.org/officeDocument/2006/customXml" ds:itemID="{4AB02FF4-25A1-49FE-9DF7-DD19F525B7FA}">
+  <ds:schemaRefs>
+    <ds:schemaRef ds:uri="7e49f7d3-8802-46ca-9604-495ce27f67f4"/>
+    <ds:schemaRef ds:uri="92c16b9d-8c83-445e-a4f4-1fe3d2f43f13"/>
+    <ds:schemaRef ds:uri="a1519f9a-9d6a-41c1-afc9-552e4069f82f"/>
+    <ds:schemaRef ds:uri="http://purl.org/dc/dcmitype/"/>
+    <ds:schemaRef ds:uri="http://purl.org/dc/elements/1.1/"/>
+    <ds:schemaRef ds:uri="http://purl.org/dc/terms/"/>
+    <ds:schemaRef ds:uri="http://schemas.microsoft.com/office/2006/documentManagement/types"/>
+    <ds:schemaRef ds:uri="http://schemas.microsoft.com/office/2006/metadata/properties"/>
+    <ds:schemaRef ds:uri="http://schemas.microsoft.com/office/infopath/2007/PartnerControls"/>
+    <ds:schemaRef ds:uri="http://schemas.openxmlformats.org/package/2006/metadata/core-properties"/>
+    <ds:schemaRef ds:uri="http://www.w3.org/XML/1998/namespace"/>
+  </ds:schemaRefs>
+</ds:datastoreItem>
 </file>
</xml_diff>

<commit_message>
fix double dashes caused by power point format in job submission items
</commit_message>
<xml_diff>
--- a/scheduling_jobs/scheduling_jobs.pptx
+++ b/scheduling_jobs/scheduling_jobs.pptx
@@ -10846,7 +10846,7 @@
                 <a:cs typeface="Consolas"/>
                 <a:sym typeface="Consolas"/>
               </a:rPr>
-              <a:t> #!/bin/bash</a:t>
+              <a:t>#!/bin/bash</a:t>
             </a:r>
             <a:endParaRPr sz="2000" b="1" dirty="0">
               <a:solidFill>
@@ -10908,7 +10908,7 @@
                 <a:cs typeface="Consolas"/>
                 <a:sym typeface="Consolas"/>
               </a:rPr>
-              <a:t> ## Directives</a:t>
+              <a:t>## Directives</a:t>
             </a:r>
             <a:endParaRPr sz="2000" b="1" dirty="0">
               <a:solidFill>
@@ -10945,7 +10945,7 @@
                 <a:cs typeface="Consolas"/>
                 <a:sym typeface="Consolas"/>
               </a:rPr>
-              <a:t> #SBATCH --</a:t>
+              <a:t>#SBATCH --</a:t>
             </a:r>
             <a:r>
               <a:rPr lang="en-US" sz="2000" b="1" dirty="0" err="1">
@@ -11006,7 +11006,7 @@
                 <a:cs typeface="Consolas"/>
                 <a:sym typeface="Consolas"/>
               </a:rPr>
-              <a:t> #SBATCH --time=0:01:00              	# Max run time</a:t>
+              <a:t>#SBATCH --time=0:01:00              	# Max run time</a:t>
             </a:r>
             <a:endParaRPr sz="2000" b="1" dirty="0">
               <a:solidFill>
@@ -11043,7 +11043,7 @@
                 <a:cs typeface="Consolas"/>
                 <a:sym typeface="Consolas"/>
               </a:rPr>
-              <a:t> #SBATCH --partition=</a:t>
+              <a:t>#SBATCH --partition=</a:t>
             </a:r>
             <a:r>
               <a:rPr lang="en-US" sz="2000" b="1" dirty="0" err="1">
@@ -11067,7 +11067,7 @@
                 <a:cs typeface="Consolas"/>
                 <a:sym typeface="Consolas"/>
               </a:rPr>
-              <a:t>      	# Specify Alpine CPU node</a:t>
+              <a:t>      	       # Specify Alpine CPU node</a:t>
             </a:r>
           </a:p>
           <a:p>
@@ -11095,7 +11095,7 @@
                 <a:cs typeface="Consolas"/>
                 <a:sym typeface="Consolas"/>
               </a:rPr>
-              <a:t> #SBATCH –-</a:t>
+              <a:t>#SBATCH --</a:t>
             </a:r>
             <a:r>
               <a:rPr lang="en-US" sz="2000" b="1" dirty="0" err="1">
@@ -11119,7 +11119,7 @@
                 <a:cs typeface="Consolas"/>
                 <a:sym typeface="Consolas"/>
               </a:rPr>
-              <a:t>=normal                  # Specify QoS</a:t>
+              <a:t>=normal                   # Specify QoS</a:t>
             </a:r>
             <a:endParaRPr sz="2000" b="1" dirty="0">
               <a:solidFill>
@@ -11156,7 +11156,7 @@
                 <a:cs typeface="Consolas"/>
                 <a:sym typeface="Consolas"/>
               </a:rPr>
-              <a:t> #SBATCH --output=test_%</a:t>
+              <a:t>#SBATCH --output=test_%</a:t>
             </a:r>
             <a:r>
               <a:rPr lang="en-US" sz="2000" b="1" dirty="0" err="1">
@@ -11242,7 +11242,7 @@
                 <a:cs typeface="Consolas"/>
                 <a:sym typeface="Consolas"/>
               </a:rPr>
-              <a:t> ## Software</a:t>
+              <a:t>## Software</a:t>
             </a:r>
             <a:endParaRPr sz="2000" b="1" dirty="0">
               <a:solidFill>
@@ -11279,7 +11279,7 @@
                 <a:cs typeface="Consolas"/>
                 <a:sym typeface="Consolas"/>
               </a:rPr>
-              <a:t> module purge                          # Purge all existing modules</a:t>
+              <a:t>module purge                          # Purge all existing modules</a:t>
             </a:r>
             <a:endParaRPr sz="2000" b="1" dirty="0">
               <a:solidFill>
@@ -11341,7 +11341,7 @@
                 <a:cs typeface="Consolas"/>
                 <a:sym typeface="Consolas"/>
               </a:rPr>
-              <a:t> ## User commands</a:t>
+              <a:t>## User commands</a:t>
             </a:r>
             <a:endParaRPr sz="2000" b="1" dirty="0">
               <a:solidFill>
@@ -11373,7 +11373,7 @@
                 <a:cs typeface="Consolas"/>
                 <a:sym typeface="Consolas"/>
               </a:rPr>
-              <a:t> echo "This is a test of user $USER" </a:t>
+              <a:t>echo "This is a test submitted by $USER" </a:t>
             </a:r>
             <a:endParaRPr b="1" dirty="0"/>
           </a:p>
@@ -13620,7 +13620,7 @@
                 <a:cs typeface="Consolas"/>
                 <a:sym typeface="Consolas"/>
               </a:rPr>
-              <a:t> #!/bin/bash</a:t>
+              <a:t>#!/bin/bash</a:t>
             </a:r>
             <a:endParaRPr sz="2000" b="1" dirty="0">
               <a:solidFill>
@@ -13682,7 +13682,7 @@
                 <a:cs typeface="Consolas"/>
                 <a:sym typeface="Consolas"/>
               </a:rPr>
-              <a:t> ## Directives</a:t>
+              <a:t>## Directives</a:t>
             </a:r>
             <a:endParaRPr sz="2000" b="1" dirty="0">
               <a:solidFill>
@@ -13719,7 +13719,7 @@
                 <a:cs typeface="Consolas"/>
                 <a:sym typeface="Consolas"/>
               </a:rPr>
-              <a:t> #SBATCH --</a:t>
+              <a:t>#SBATCH --</a:t>
             </a:r>
             <a:r>
               <a:rPr lang="en-US" sz="2000" b="1" dirty="0" err="1">
@@ -13780,7 +13780,7 @@
                 <a:cs typeface="Consolas"/>
                 <a:sym typeface="Consolas"/>
               </a:rPr>
-              <a:t> #SBATCH --time=0:01:00              	# Max run time</a:t>
+              <a:t>#SBATCH --time=0:01:00              	# Max run time</a:t>
             </a:r>
             <a:endParaRPr sz="2000" b="1" dirty="0">
               <a:solidFill>
@@ -13817,7 +13817,7 @@
                 <a:cs typeface="Consolas"/>
                 <a:sym typeface="Consolas"/>
               </a:rPr>
-              <a:t> #SBATCH --partition=</a:t>
+              <a:t>#SBATCH --partition=</a:t>
             </a:r>
             <a:r>
               <a:rPr lang="en-US" sz="2000" b="1" dirty="0" err="1">
@@ -13841,7 +13841,7 @@
                 <a:cs typeface="Consolas"/>
                 <a:sym typeface="Consolas"/>
               </a:rPr>
-              <a:t>      	# Specify Alpine CPU node</a:t>
+              <a:t>      	       # Specify Alpine CPU node</a:t>
             </a:r>
           </a:p>
           <a:p>
@@ -13861,7 +13861,7 @@
                 <a:cs typeface="Consolas"/>
                 <a:sym typeface="Consolas"/>
               </a:rPr>
-              <a:t> #SBATCH –-</a:t>
+              <a:t>#SBATCH --</a:t>
             </a:r>
             <a:r>
               <a:rPr lang="en-US" sz="2000" b="1" dirty="0" err="1">
@@ -13885,7 +13885,7 @@
                 <a:cs typeface="Consolas"/>
                 <a:sym typeface="Consolas"/>
               </a:rPr>
-              <a:t>=normal                  # Specify QoS</a:t>
+              <a:t>=normal                   # Specify QoS</a:t>
             </a:r>
             <a:endParaRPr sz="2000" b="1" dirty="0">
               <a:solidFill>
@@ -13922,7 +13922,7 @@
                 <a:cs typeface="Consolas"/>
                 <a:sym typeface="Consolas"/>
               </a:rPr>
-              <a:t> #SBATCH --output=test_%</a:t>
+              <a:t>#SBATCH --output=test_%</a:t>
             </a:r>
             <a:r>
               <a:rPr lang="en-US" sz="2000" b="1" dirty="0" err="1">
@@ -14008,7 +14008,7 @@
                 <a:cs typeface="Consolas"/>
                 <a:sym typeface="Consolas"/>
               </a:rPr>
-              <a:t> ## Software</a:t>
+              <a:t>## Software</a:t>
             </a:r>
             <a:endParaRPr sz="2000" b="1" dirty="0">
               <a:solidFill>
@@ -14045,7 +14045,7 @@
                 <a:cs typeface="Consolas"/>
                 <a:sym typeface="Consolas"/>
               </a:rPr>
-              <a:t> module purge                            # Purge all existing modules</a:t>
+              <a:t>module purge                            # Purge all existing modules</a:t>
             </a:r>
           </a:p>
           <a:p>
@@ -14073,7 +14073,7 @@
                 <a:cs typeface="Consolas"/>
                 <a:sym typeface="Consolas"/>
               </a:rPr>
-              <a:t> module load anaconda                    # Load Anaconda</a:t>
+              <a:t>module load anaconda                    # Load Anaconda</a:t>
             </a:r>
           </a:p>
           <a:p>
@@ -14091,18 +14091,6 @@
               <a:buFont typeface="Arial"/>
               <a:buNone/>
             </a:pPr>
-            <a:r>
-              <a:rPr lang="en-US" sz="2000" b="1" dirty="0">
-                <a:solidFill>
-                  <a:srgbClr val="0070C0"/>
-                </a:solidFill>
-                <a:latin typeface="Consolas"/>
-                <a:ea typeface="Consolas"/>
-                <a:cs typeface="Consolas"/>
-                <a:sym typeface="Consolas"/>
-              </a:rPr>
-              <a:t> </a:t>
-            </a:r>
             <a:r>
               <a:rPr lang="en-US" sz="2000" b="1" dirty="0" err="1">
                 <a:solidFill>
@@ -14211,7 +14199,7 @@
                 <a:cs typeface="Consolas"/>
                 <a:sym typeface="Consolas"/>
               </a:rPr>
-              <a:t> ## Run Python script</a:t>
+              <a:t>## Run Python script</a:t>
             </a:r>
             <a:endParaRPr sz="2000" b="1" dirty="0">
               <a:solidFill>
@@ -14243,7 +14231,7 @@
                 <a:cs typeface="Consolas"/>
                 <a:sym typeface="Consolas"/>
               </a:rPr>
-              <a:t> python </a:t>
+              <a:t>python </a:t>
             </a:r>
             <a:r>
               <a:rPr lang="en-US" sz="2000" b="1" dirty="0" err="1">
@@ -14769,7 +14757,7 @@
                 <a:cs typeface="Consolas"/>
                 <a:sym typeface="Consolas"/>
               </a:rPr>
-              <a:t> –</a:t>
+              <a:t> --</a:t>
             </a:r>
             <a:r>
               <a:rPr lang="en-US" sz="2000" b="1" dirty="0" err="1">
@@ -14793,7 +14781,7 @@
                 <a:cs typeface="Consolas"/>
                 <a:sym typeface="Consolas"/>
               </a:rPr>
-              <a:t>=compile –-time=00:10:00</a:t>
+              <a:t>=compile --time=00:10:00</a:t>
             </a:r>
             <a:endParaRPr sz="2000" b="1" dirty="0">
               <a:solidFill>

</xml_diff>

<commit_message>
remove seff on slide 22 (will be covered elsewhere), make all titles the same font
</commit_message>
<xml_diff>
--- a/scheduling_jobs/scheduling_jobs.pptx
+++ b/scheduling_jobs/scheduling_jobs.pptx
@@ -1725,7 +1725,9 @@
           <a:lstStyle/>
           <a:p>
             <a:r>
-              <a:rPr lang="en-US" dirty="0"/>
+              <a:rPr lang="en-US" b="1" dirty="0">
+                <a:latin typeface="Century Gothic" panose="020B0502020202020204" pitchFamily="34" charset="0"/>
+              </a:rPr>
               <a:t>Common directives</a:t>
             </a:r>
           </a:p>
@@ -2525,7 +2527,9 @@
           <a:lstStyle/>
           <a:p>
             <a:r>
-              <a:rPr lang="en-US" dirty="0"/>
+              <a:rPr lang="en-US" b="1" dirty="0">
+                <a:latin typeface="Century Gothic" panose="020B0502020202020204" pitchFamily="34" charset="0"/>
+              </a:rPr>
               <a:t>Common directives</a:t>
             </a:r>
           </a:p>
@@ -3131,14 +3135,16 @@
           <a:lstStyle/>
           <a:p>
             <a:r>
-              <a:rPr lang="en-US" dirty="0">
-                <a:latin typeface="Helvetica Neue Light"/>
+              <a:rPr lang="en-US" b="1" dirty="0">
+                <a:latin typeface="Century Gothic" panose="020B0502020202020204" pitchFamily="34" charset="0"/>
                 <a:cs typeface="Helvetica Neue Light"/>
                 <a:sym typeface="Helvetica Neue Light"/>
               </a:rPr>
               <a:t>Alpine Partitions</a:t>
             </a:r>
-            <a:endParaRPr lang="en-US" dirty="0"/>
+            <a:endParaRPr lang="en-US" b="1" dirty="0">
+              <a:latin typeface="Century Gothic" panose="020B0502020202020204" pitchFamily="34" charset="0"/>
+            </a:endParaRPr>
           </a:p>
         </p:txBody>
       </p:sp>
@@ -5361,14 +5367,16 @@
           <a:lstStyle/>
           <a:p>
             <a:r>
-              <a:rPr lang="en-US" dirty="0">
-                <a:latin typeface="Helvetica Neue Light"/>
+              <a:rPr lang="en-US" b="1" dirty="0">
+                <a:latin typeface="Century Gothic" panose="020B0502020202020204" pitchFamily="34" charset="0"/>
                 <a:cs typeface="Helvetica Neue Light"/>
                 <a:sym typeface="Helvetica Neue Light"/>
               </a:rPr>
               <a:t>Alpine Testing Partitions</a:t>
             </a:r>
-            <a:endParaRPr lang="en-US" dirty="0"/>
+            <a:endParaRPr lang="en-US" b="1" dirty="0">
+              <a:latin typeface="Century Gothic" panose="020B0502020202020204" pitchFamily="34" charset="0"/>
+            </a:endParaRPr>
           </a:p>
         </p:txBody>
       </p:sp>
@@ -7584,15 +7592,17 @@
           <a:lstStyle/>
           <a:p>
             <a:r>
-              <a:rPr lang="en-US" dirty="0">
-                <a:latin typeface="Helvetica Neue Light"/>
+              <a:rPr lang="en-US" b="1" dirty="0">
+                <a:latin typeface="Century Gothic" panose="020B0502020202020204" pitchFamily="34" charset="0"/>
                 <a:ea typeface="Helvetica Neue Light"/>
                 <a:cs typeface="Helvetica Neue Light"/>
                 <a:sym typeface="Helvetica Neue Light"/>
               </a:rPr>
               <a:t>Quality of Service (QoS)</a:t>
             </a:r>
-            <a:endParaRPr lang="en-US" dirty="0"/>
+            <a:endParaRPr lang="en-US" b="1" dirty="0">
+              <a:latin typeface="Century Gothic" panose="020B0502020202020204" pitchFamily="34" charset="0"/>
+            </a:endParaRPr>
           </a:p>
         </p:txBody>
       </p:sp>
@@ -9988,15 +9998,17 @@
           <a:lstStyle/>
           <a:p>
             <a:r>
-              <a:rPr lang="en-US" dirty="0">
-                <a:latin typeface="Helvetica Neue Light"/>
+              <a:rPr lang="en-US" b="1" dirty="0">
+                <a:latin typeface="Century Gothic" panose="020B0502020202020204" pitchFamily="34" charset="0"/>
                 <a:ea typeface="Helvetica Neue Light"/>
                 <a:cs typeface="Helvetica Neue Light"/>
                 <a:sym typeface="Helvetica Neue Light"/>
               </a:rPr>
               <a:t>Batch Jobs</a:t>
             </a:r>
-            <a:endParaRPr lang="en-US" dirty="0"/>
+            <a:endParaRPr lang="en-US" b="1" dirty="0">
+              <a:latin typeface="Century Gothic" panose="020B0502020202020204" pitchFamily="34" charset="0"/>
+            </a:endParaRPr>
           </a:p>
         </p:txBody>
       </p:sp>
@@ -10178,15 +10190,17 @@
           <a:lstStyle/>
           <a:p>
             <a:r>
-              <a:rPr lang="en-US" dirty="0">
-                <a:latin typeface="Helvetica Neue Light"/>
+              <a:rPr lang="en-US" b="1" dirty="0">
+                <a:latin typeface="Century Gothic" panose="020B0502020202020204" pitchFamily="34" charset="0"/>
                 <a:ea typeface="Helvetica Neue Light"/>
                 <a:cs typeface="Helvetica Neue Light"/>
                 <a:sym typeface="Helvetica Neue Light"/>
               </a:rPr>
               <a:t>Anatomy of a job script </a:t>
             </a:r>
-            <a:endParaRPr lang="en-US" dirty="0"/>
+            <a:endParaRPr lang="en-US" b="1" dirty="0">
+              <a:latin typeface="Century Gothic" panose="020B0502020202020204" pitchFamily="34" charset="0"/>
+            </a:endParaRPr>
           </a:p>
         </p:txBody>
       </p:sp>
@@ -10604,7 +10618,9 @@
           <a:lstStyle/>
           <a:p>
             <a:r>
-              <a:rPr lang="en-US" dirty="0"/>
+              <a:rPr lang="en-US" b="1" dirty="0">
+                <a:latin typeface="Century Gothic" panose="020B0502020202020204" pitchFamily="34" charset="0"/>
+              </a:rPr>
               <a:t>Directives in a job script</a:t>
             </a:r>
           </a:p>
@@ -10750,7 +10766,9 @@
           <a:lstStyle/>
           <a:p>
             <a:r>
-              <a:rPr lang="en-US" dirty="0"/>
+              <a:rPr lang="en-US" b="1" dirty="0">
+                <a:latin typeface="Century Gothic" panose="020B0502020202020204" pitchFamily="34" charset="0"/>
+              </a:rPr>
               <a:t>Example job script</a:t>
             </a:r>
           </a:p>
@@ -11431,7 +11449,9 @@
           <a:lstStyle/>
           <a:p>
             <a:r>
-              <a:rPr lang="en-US" dirty="0"/>
+              <a:rPr lang="en-US" b="1" dirty="0">
+                <a:latin typeface="Century Gothic" panose="020B0502020202020204" pitchFamily="34" charset="0"/>
+              </a:rPr>
               <a:t>Submitting a Job script</a:t>
             </a:r>
           </a:p>
@@ -11988,7 +12008,9 @@
           <a:lstStyle/>
           <a:p>
             <a:r>
-              <a:rPr lang="en-US" dirty="0"/>
+              <a:rPr lang="en-US" b="1" dirty="0">
+                <a:latin typeface="Century Gothic" panose="020B0502020202020204" pitchFamily="34" charset="0"/>
+              </a:rPr>
               <a:t>Job output</a:t>
             </a:r>
           </a:p>
@@ -12299,15 +12321,17 @@
           <a:lstStyle/>
           <a:p>
             <a:r>
-              <a:rPr lang="en-US" dirty="0">
-                <a:latin typeface="Helvetica Neue Light"/>
+              <a:rPr lang="en-US" b="1" dirty="0">
+                <a:latin typeface="Century Gothic" panose="020B0502020202020204" pitchFamily="34" charset="0"/>
                 <a:ea typeface="Helvetica Neue Light"/>
                 <a:cs typeface="Helvetica Neue Light"/>
                 <a:sym typeface="Helvetica Neue Light"/>
               </a:rPr>
               <a:t>Checking your jobs</a:t>
             </a:r>
-            <a:endParaRPr lang="en-US" dirty="0"/>
+            <a:endParaRPr lang="en-US" b="1" dirty="0">
+              <a:latin typeface="Century Gothic" panose="020B0502020202020204" pitchFamily="34" charset="0"/>
+            </a:endParaRPr>
           </a:p>
         </p:txBody>
       </p:sp>
@@ -12970,7 +12994,9 @@
           <a:lstStyle/>
           <a:p>
             <a:r>
-              <a:rPr lang="en-US" dirty="0"/>
+              <a:rPr lang="en-US" b="1" dirty="0">
+                <a:latin typeface="Century Gothic" panose="020B0502020202020204" pitchFamily="34" charset="0"/>
+              </a:rPr>
               <a:t>Checking your jobs</a:t>
             </a:r>
           </a:p>
@@ -12992,7 +13018,12 @@
             <p:ph idx="1"/>
           </p:nvPr>
         </p:nvSpPr>
-        <p:spPr/>
+        <p:spPr>
+          <a:xfrm>
+            <a:off x="838200" y="2339975"/>
+            <a:ext cx="10515600" cy="2974975"/>
+          </a:xfrm>
+        </p:spPr>
         <p:txBody>
           <a:bodyPr/>
           <a:lstStyle/>
@@ -13043,33 +13074,6 @@
           </a:p>
           <a:p>
             <a:endParaRPr lang="en-US" dirty="0"/>
-          </a:p>
-          <a:p>
-            <a:r>
-              <a:rPr lang="en-US" sz="2800" dirty="0"/>
-              <a:t>To check the percentage of CPU and memory usage of a job </a:t>
-            </a:r>
-            <a:r>
-              <a:rPr lang="en-US" sz="2800" b="1" dirty="0"/>
-              <a:t>after it completes, </a:t>
-            </a:r>
-            <a:r>
-              <a:rPr lang="en-US" sz="2800" dirty="0"/>
-              <a:t>use </a:t>
-            </a:r>
-            <a:r>
-              <a:rPr lang="en-US" sz="2800" dirty="0" err="1">
-                <a:solidFill>
-                  <a:srgbClr val="0070C0"/>
-                </a:solidFill>
-              </a:rPr>
-              <a:t>seff</a:t>
-            </a:r>
-            <a:endParaRPr lang="en-US" dirty="0">
-              <a:solidFill>
-                <a:srgbClr val="0070C0"/>
-              </a:solidFill>
-            </a:endParaRPr>
           </a:p>
         </p:txBody>
       </p:sp>
@@ -13116,7 +13120,7 @@
         </p:nvSpPr>
         <p:spPr>
           <a:xfrm>
-            <a:off x="1589766" y="3675706"/>
+            <a:off x="1599291" y="4037656"/>
             <a:ext cx="7263450" cy="400110"/>
           </a:xfrm>
           <a:prstGeom prst="rect">
@@ -13183,112 +13187,6 @@
                 <a:sym typeface="Consolas"/>
               </a:rPr>
               <a:t> show job </a:t>
-            </a:r>
-            <a:r>
-              <a:rPr lang="en-US" sz="2000" dirty="0">
-                <a:solidFill>
-                  <a:schemeClr val="accent2"/>
-                </a:solidFill>
-                <a:latin typeface="Consolas"/>
-                <a:ea typeface="Consolas"/>
-                <a:cs typeface="Consolas"/>
-                <a:sym typeface="Consolas"/>
-              </a:rPr>
-              <a:t>&lt;job number&gt;</a:t>
-            </a:r>
-            <a:endParaRPr sz="2000" dirty="0">
-              <a:solidFill>
-                <a:schemeClr val="accent2"/>
-              </a:solidFill>
-              <a:latin typeface="Consolas"/>
-              <a:ea typeface="Consolas"/>
-              <a:cs typeface="Consolas"/>
-              <a:sym typeface="Consolas"/>
-            </a:endParaRPr>
-          </a:p>
-        </p:txBody>
-      </p:sp>
-      <p:sp>
-        <p:nvSpPr>
-          <p:cNvPr id="7" name="Google Shape;525;p53">
-            <a:extLst>
-              <a:ext uri="{FF2B5EF4-FFF2-40B4-BE49-F238E27FC236}">
-                <a16:creationId xmlns:a16="http://schemas.microsoft.com/office/drawing/2014/main" id="{5D84A3AA-B607-E8D8-B14E-9655F494AA9B}"/>
-              </a:ext>
-            </a:extLst>
-          </p:cNvPr>
-          <p:cNvSpPr/>
-          <p:nvPr/>
-        </p:nvSpPr>
-        <p:spPr>
-          <a:xfrm>
-            <a:off x="1589766" y="5417212"/>
-            <a:ext cx="7263300" cy="508685"/>
-          </a:xfrm>
-          <a:prstGeom prst="rect">
-            <a:avLst/>
-          </a:prstGeom>
-          <a:noFill/>
-          <a:ln w="9525" cap="flat" cmpd="sng">
-            <a:solidFill>
-              <a:schemeClr val="accent5"/>
-            </a:solidFill>
-            <a:prstDash val="solid"/>
-            <a:round/>
-            <a:headEnd type="none" w="sm" len="sm"/>
-            <a:tailEnd type="none" w="sm" len="sm"/>
-          </a:ln>
-        </p:spPr>
-        <p:txBody>
-          <a:bodyPr spcFirstLastPara="1" wrap="square" lIns="91425" tIns="45700" rIns="91425" bIns="45700" anchor="t" anchorCtr="0">
-            <a:noAutofit/>
-          </a:bodyPr>
-          <a:lstStyle/>
-          <a:p>
-            <a:pPr marL="0" marR="0" lvl="0" indent="0" algn="l" rtl="0">
-              <a:spcBef>
-                <a:spcPts val="0"/>
-              </a:spcBef>
-              <a:spcAft>
-                <a:spcPts val="0"/>
-              </a:spcAft>
-              <a:buNone/>
-            </a:pPr>
-            <a:r>
-              <a:rPr lang="en-US" sz="2000" dirty="0">
-                <a:solidFill>
-                  <a:srgbClr val="0070C0"/>
-                </a:solidFill>
-                <a:latin typeface="Consolas"/>
-                <a:ea typeface="Consolas"/>
-                <a:cs typeface="Consolas"/>
-                <a:sym typeface="Consolas"/>
-              </a:rPr>
-              <a:t>$ </a:t>
-            </a:r>
-            <a:r>
-              <a:rPr lang="en-US" sz="2000" dirty="0" err="1">
-                <a:solidFill>
-                  <a:srgbClr val="0070C0"/>
-                </a:solidFill>
-                <a:latin typeface="Consolas"/>
-                <a:ea typeface="Consolas"/>
-                <a:cs typeface="Consolas"/>
-                <a:sym typeface="Consolas"/>
-              </a:rPr>
-              <a:t>seff</a:t>
-            </a:r>
-            <a:r>
-              <a:rPr lang="en-US" sz="2000" dirty="0">
-                <a:solidFill>
-                  <a:srgbClr val="0070C0"/>
-                </a:solidFill>
-                <a:latin typeface="Consolas"/>
-                <a:ea typeface="Consolas"/>
-                <a:cs typeface="Consolas"/>
-                <a:sym typeface="Consolas"/>
-              </a:rPr>
-              <a:t> </a:t>
             </a:r>
             <a:r>
               <a:rPr lang="en-US" sz="2000" dirty="0">
@@ -13366,15 +13264,17 @@
           <a:lstStyle/>
           <a:p>
             <a:r>
-              <a:rPr lang="en-US" dirty="0">
-                <a:latin typeface="Helvetica Neue Light"/>
+              <a:rPr lang="en-US" b="1" dirty="0">
+                <a:latin typeface="Century Gothic" panose="020B0502020202020204" pitchFamily="34" charset="0"/>
                 <a:ea typeface="Helvetica Neue Light"/>
                 <a:cs typeface="Helvetica Neue Light"/>
                 <a:sym typeface="Helvetica Neue Light"/>
               </a:rPr>
               <a:t>Software and Jobs</a:t>
             </a:r>
-            <a:endParaRPr lang="en-US" dirty="0"/>
+            <a:endParaRPr lang="en-US" b="1" dirty="0">
+              <a:latin typeface="Century Gothic" panose="020B0502020202020204" pitchFamily="34" charset="0"/>
+            </a:endParaRPr>
           </a:p>
         </p:txBody>
       </p:sp>
@@ -13524,7 +13424,9 @@
           <a:lstStyle/>
           <a:p>
             <a:r>
-              <a:rPr lang="en-US" dirty="0"/>
+              <a:rPr lang="en-US" b="1" dirty="0">
+                <a:latin typeface="Century Gothic" panose="020B0502020202020204" pitchFamily="34" charset="0"/>
+              </a:rPr>
               <a:t>Software job script example</a:t>
             </a:r>
           </a:p>
@@ -14301,15 +14203,17 @@
           <a:lstStyle/>
           <a:p>
             <a:r>
-              <a:rPr lang="en-US" dirty="0">
-                <a:latin typeface="Helvetica Neue Light"/>
+              <a:rPr lang="en-US" b="1" dirty="0">
+                <a:latin typeface="Century Gothic" panose="020B0502020202020204" pitchFamily="34" charset="0"/>
                 <a:ea typeface="Helvetica Neue Light"/>
                 <a:cs typeface="Helvetica Neue Light"/>
                 <a:sym typeface="Helvetica Neue Light"/>
               </a:rPr>
               <a:t>Interactive jobs</a:t>
             </a:r>
-            <a:endParaRPr lang="en-US" dirty="0"/>
+            <a:endParaRPr lang="en-US" b="1" dirty="0">
+              <a:latin typeface="Century Gothic" panose="020B0502020202020204" pitchFamily="34" charset="0"/>
+            </a:endParaRPr>
           </a:p>
         </p:txBody>
       </p:sp>
@@ -14540,15 +14444,17 @@
           <a:lstStyle/>
           <a:p>
             <a:r>
-              <a:rPr lang="en-US" dirty="0">
-                <a:latin typeface="Helvetica Neue Light"/>
+              <a:rPr lang="en-US" b="1" dirty="0">
+                <a:latin typeface="Century Gothic" panose="020B0502020202020204" pitchFamily="34" charset="0"/>
                 <a:ea typeface="Helvetica Neue Light"/>
                 <a:cs typeface="Helvetica Neue Light"/>
                 <a:sym typeface="Helvetica Neue Light"/>
               </a:rPr>
               <a:t>Running an interactive job</a:t>
             </a:r>
-            <a:endParaRPr lang="en-US" dirty="0"/>
+            <a:endParaRPr lang="en-US" b="1" dirty="0">
+              <a:latin typeface="Century Gothic" panose="020B0502020202020204" pitchFamily="34" charset="0"/>
+            </a:endParaRPr>
           </a:p>
         </p:txBody>
       </p:sp>
@@ -15034,15 +14940,17 @@
           <a:lstStyle/>
           <a:p>
             <a:r>
-              <a:rPr lang="en-US" dirty="0">
-                <a:latin typeface="Helvetica Neue Light"/>
+              <a:rPr lang="en-US" b="1" dirty="0">
+                <a:latin typeface="Century Gothic" panose="020B0502020202020204" pitchFamily="34" charset="0"/>
                 <a:ea typeface="Helvetica Neue Light"/>
                 <a:cs typeface="Helvetica Neue Light"/>
                 <a:sym typeface="Helvetica Neue Light"/>
               </a:rPr>
               <a:t>Interactive GUI job</a:t>
             </a:r>
-            <a:endParaRPr lang="en-US" dirty="0"/>
+            <a:endParaRPr lang="en-US" b="1" dirty="0">
+              <a:latin typeface="Century Gothic" panose="020B0502020202020204" pitchFamily="34" charset="0"/>
+            </a:endParaRPr>
           </a:p>
         </p:txBody>
       </p:sp>
@@ -15210,8 +15118,8 @@
         </p:nvSpPr>
         <p:spPr>
           <a:xfrm>
-            <a:off x="838200" y="2424553"/>
-            <a:ext cx="10515600" cy="1325563"/>
+            <a:off x="4276725" y="2766218"/>
+            <a:ext cx="3638550" cy="1325563"/>
           </a:xfrm>
         </p:spPr>
         <p:txBody>
@@ -15220,7 +15128,7 @@
           <a:p>
             <a:pPr algn="ctr"/>
             <a:r>
-              <a:rPr lang="en-US" b="1">
+              <a:rPr lang="en-US" b="1" dirty="0">
                 <a:latin typeface="Century Gothic" panose="020B0502020202020204" pitchFamily="34" charset="0"/>
               </a:rPr>
               <a:t>Thank you!</a:t>
@@ -15618,13 +15526,13 @@
           <a:lstStyle/>
           <a:p>
             <a:r>
-              <a:rPr lang="en-US" b="1">
+              <a:rPr lang="en-US" b="1" dirty="0">
                 <a:latin typeface="Century Gothic" panose="020B0502020202020204" pitchFamily="34" charset="0"/>
               </a:rPr>
               <a:t>Session Overview</a:t>
             </a:r>
             <a:r>
-              <a:rPr lang="en-US"/>
+              <a:rPr lang="en-US" dirty="0"/>
               <a:t> </a:t>
             </a:r>
           </a:p>
@@ -16908,14 +16816,16 @@
               <a:buNone/>
             </a:pPr>
             <a:r>
-              <a:rPr lang="en-US" dirty="0">
-                <a:latin typeface="Helvetica Neue Light"/>
+              <a:rPr lang="en-US" b="1" dirty="0">
+                <a:latin typeface="Century Gothic" panose="020B0502020202020204" pitchFamily="34" charset="0"/>
                 <a:ea typeface="Helvetica Neue Light"/>
                 <a:sym typeface="Helvetica Neue Light"/>
               </a:rPr>
               <a:t>General Overview of Job Submission</a:t>
             </a:r>
-            <a:endParaRPr dirty="0"/>
+            <a:endParaRPr b="1" dirty="0">
+              <a:latin typeface="Century Gothic" panose="020B0502020202020204" pitchFamily="34" charset="0"/>
+            </a:endParaRPr>
           </a:p>
         </p:txBody>
       </p:sp>
@@ -16976,7 +16886,9 @@
           <a:lstStyle/>
           <a:p>
             <a:r>
-              <a:rPr lang="en-US" dirty="0"/>
+              <a:rPr lang="en-US" b="1" dirty="0">
+                <a:latin typeface="Century Gothic" panose="020B0502020202020204" pitchFamily="34" charset="0"/>
+              </a:rPr>
               <a:t>Introduction to Jobs</a:t>
             </a:r>
           </a:p>
@@ -17939,15 +17851,17 @@
               <a:buNone/>
             </a:pPr>
             <a:r>
-              <a:rPr lang="en-US" dirty="0">
-                <a:latin typeface="Helvetica Neue Light"/>
+              <a:rPr lang="en-US" b="1" dirty="0">
+                <a:latin typeface="Century Gothic" panose="020B0502020202020204" pitchFamily="34" charset="0"/>
                 <a:ea typeface="Helvetica Neue Light"/>
                 <a:cs typeface="Helvetica Neue Light"/>
                 <a:sym typeface="Helvetica Neue Light"/>
               </a:rPr>
               <a:t>General Overview of Job Submission</a:t>
             </a:r>
-            <a:endParaRPr dirty="0"/>
+            <a:endParaRPr b="1" dirty="0">
+              <a:latin typeface="Century Gothic" panose="020B0502020202020204" pitchFamily="34" charset="0"/>
+            </a:endParaRPr>
           </a:p>
         </p:txBody>
       </p:sp>
@@ -18003,7 +17917,9 @@
           <a:lstStyle/>
           <a:p>
             <a:r>
-              <a:rPr lang="en-US" dirty="0"/>
+              <a:rPr lang="en-US" b="1" dirty="0">
+                <a:latin typeface="Century Gothic" panose="020B0502020202020204" pitchFamily="34" charset="0"/>
+              </a:rPr>
               <a:t>Job directives </a:t>
             </a:r>
           </a:p>

</xml_diff>